<commit_message>
Updated to include new autopsy links.
</commit_message>
<xml_diff>
--- a/slides/classtwo/slides.pptx
+++ b/slides/classtwo/slides.pptx
@@ -8353,688 +8353,6 @@
       <dsp:cNvGrpSpPr/>
     </dsp:nvGrpSpPr>
     <dsp:grpSpPr/>
-    <dsp:sp modelId="{0CE327EB-0566-8748-BFA4-085F7A19257C}">
-      <dsp:nvSpPr>
-        <dsp:cNvPr id="0" name=""/>
-        <dsp:cNvSpPr/>
-      </dsp:nvSpPr>
-      <dsp:spPr>
-        <a:xfrm>
-          <a:off x="2254202" y="704725"/>
-          <a:ext cx="657466" cy="587404"/>
-        </a:xfrm>
-        <a:custGeom>
-          <a:avLst/>
-          <a:gdLst/>
-          <a:ahLst/>
-          <a:cxnLst/>
-          <a:rect l="0" t="0" r="0" b="0"/>
-          <a:pathLst>
-            <a:path>
-              <a:moveTo>
-                <a:pt x="0" y="0"/>
-              </a:moveTo>
-              <a:lnTo>
-                <a:pt x="657466" y="587404"/>
-              </a:lnTo>
-            </a:path>
-          </a:pathLst>
-        </a:custGeom>
-        <a:noFill/>
-        <a:ln w="9525" cap="flat" cmpd="sng" algn="ctr">
-          <a:solidFill>
-            <a:schemeClr val="accent1">
-              <a:shade val="60000"/>
-              <a:hueOff val="0"/>
-              <a:satOff val="0"/>
-              <a:lumOff val="0"/>
-              <a:alphaOff val="0"/>
-            </a:schemeClr>
-          </a:solidFill>
-          <a:prstDash val="solid"/>
-        </a:ln>
-        <a:effectLst/>
-      </dsp:spPr>
-      <dsp:style>
-        <a:lnRef idx="1">
-          <a:scrgbClr r="0" g="0" b="0"/>
-        </a:lnRef>
-        <a:fillRef idx="0">
-          <a:scrgbClr r="0" g="0" b="0"/>
-        </a:fillRef>
-        <a:effectRef idx="0">
-          <a:scrgbClr r="0" g="0" b="0"/>
-        </a:effectRef>
-        <a:fontRef idx="minor"/>
-      </dsp:style>
-    </dsp:sp>
-    <dsp:sp modelId="{7E74B830-BF27-934F-AE86-49257B5A48EB}">
-      <dsp:nvSpPr>
-        <dsp:cNvPr id="0" name=""/>
-        <dsp:cNvSpPr/>
-      </dsp:nvSpPr>
-      <dsp:spPr>
-        <a:xfrm>
-          <a:off x="2254202" y="704725"/>
-          <a:ext cx="1594864" cy="1212624"/>
-        </a:xfrm>
-        <a:custGeom>
-          <a:avLst/>
-          <a:gdLst/>
-          <a:ahLst/>
-          <a:cxnLst/>
-          <a:rect l="0" t="0" r="0" b="0"/>
-          <a:pathLst>
-            <a:path>
-              <a:moveTo>
-                <a:pt x="0" y="0"/>
-              </a:moveTo>
-              <a:lnTo>
-                <a:pt x="0" y="1074227"/>
-              </a:lnTo>
-              <a:lnTo>
-                <a:pt x="1594864" y="1074227"/>
-              </a:lnTo>
-              <a:lnTo>
-                <a:pt x="1594864" y="1212624"/>
-              </a:lnTo>
-            </a:path>
-          </a:pathLst>
-        </a:custGeom>
-        <a:noFill/>
-        <a:ln w="9525" cap="flat" cmpd="sng" algn="ctr">
-          <a:solidFill>
-            <a:schemeClr val="accent1">
-              <a:shade val="60000"/>
-              <a:hueOff val="0"/>
-              <a:satOff val="0"/>
-              <a:lumOff val="0"/>
-              <a:alphaOff val="0"/>
-            </a:schemeClr>
-          </a:solidFill>
-          <a:prstDash val="solid"/>
-        </a:ln>
-        <a:effectLst/>
-      </dsp:spPr>
-      <dsp:style>
-        <a:lnRef idx="1">
-          <a:scrgbClr r="0" g="0" b="0"/>
-        </a:lnRef>
-        <a:fillRef idx="0">
-          <a:scrgbClr r="0" g="0" b="0"/>
-        </a:fillRef>
-        <a:effectRef idx="0">
-          <a:scrgbClr r="0" g="0" b="0"/>
-        </a:effectRef>
-        <a:fontRef idx="minor"/>
-      </dsp:style>
-    </dsp:sp>
-    <dsp:sp modelId="{78958DEB-F014-4244-9F57-C93DFD0C6983}">
-      <dsp:nvSpPr>
-        <dsp:cNvPr id="0" name=""/>
-        <dsp:cNvSpPr/>
-      </dsp:nvSpPr>
-      <dsp:spPr>
-        <a:xfrm>
-          <a:off x="2208482" y="704725"/>
-          <a:ext cx="91440" cy="1212624"/>
-        </a:xfrm>
-        <a:custGeom>
-          <a:avLst/>
-          <a:gdLst/>
-          <a:ahLst/>
-          <a:cxnLst/>
-          <a:rect l="0" t="0" r="0" b="0"/>
-          <a:pathLst>
-            <a:path>
-              <a:moveTo>
-                <a:pt x="45720" y="0"/>
-              </a:moveTo>
-              <a:lnTo>
-                <a:pt x="45720" y="1212624"/>
-              </a:lnTo>
-            </a:path>
-          </a:pathLst>
-        </a:custGeom>
-        <a:noFill/>
-        <a:ln w="9525" cap="flat" cmpd="sng" algn="ctr">
-          <a:solidFill>
-            <a:schemeClr val="accent1">
-              <a:shade val="60000"/>
-              <a:hueOff val="0"/>
-              <a:satOff val="0"/>
-              <a:lumOff val="0"/>
-              <a:alphaOff val="0"/>
-            </a:schemeClr>
-          </a:solidFill>
-          <a:prstDash val="solid"/>
-        </a:ln>
-        <a:effectLst/>
-      </dsp:spPr>
-      <dsp:style>
-        <a:lnRef idx="1">
-          <a:scrgbClr r="0" g="0" b="0"/>
-        </a:lnRef>
-        <a:fillRef idx="0">
-          <a:scrgbClr r="0" g="0" b="0"/>
-        </a:fillRef>
-        <a:effectRef idx="0">
-          <a:scrgbClr r="0" g="0" b="0"/>
-        </a:effectRef>
-        <a:fontRef idx="minor"/>
-      </dsp:style>
-    </dsp:sp>
-    <dsp:sp modelId="{8D185E37-8DCA-364C-AB66-B2A89E254564}">
-      <dsp:nvSpPr>
-        <dsp:cNvPr id="0" name=""/>
-        <dsp:cNvSpPr/>
-      </dsp:nvSpPr>
-      <dsp:spPr>
-        <a:xfrm>
-          <a:off x="659337" y="704725"/>
-          <a:ext cx="1594864" cy="1212624"/>
-        </a:xfrm>
-        <a:custGeom>
-          <a:avLst/>
-          <a:gdLst/>
-          <a:ahLst/>
-          <a:cxnLst/>
-          <a:rect l="0" t="0" r="0" b="0"/>
-          <a:pathLst>
-            <a:path>
-              <a:moveTo>
-                <a:pt x="1594864" y="0"/>
-              </a:moveTo>
-              <a:lnTo>
-                <a:pt x="1594864" y="1074227"/>
-              </a:lnTo>
-              <a:lnTo>
-                <a:pt x="0" y="1074227"/>
-              </a:lnTo>
-              <a:lnTo>
-                <a:pt x="0" y="1212624"/>
-              </a:lnTo>
-            </a:path>
-          </a:pathLst>
-        </a:custGeom>
-        <a:noFill/>
-        <a:ln w="9525" cap="flat" cmpd="sng" algn="ctr">
-          <a:solidFill>
-            <a:schemeClr val="accent1">
-              <a:shade val="60000"/>
-              <a:hueOff val="0"/>
-              <a:satOff val="0"/>
-              <a:lumOff val="0"/>
-              <a:alphaOff val="0"/>
-            </a:schemeClr>
-          </a:solidFill>
-          <a:prstDash val="solid"/>
-        </a:ln>
-        <a:effectLst/>
-      </dsp:spPr>
-      <dsp:style>
-        <a:lnRef idx="1">
-          <a:scrgbClr r="0" g="0" b="0"/>
-        </a:lnRef>
-        <a:fillRef idx="0">
-          <a:scrgbClr r="0" g="0" b="0"/>
-        </a:fillRef>
-        <a:effectRef idx="0">
-          <a:scrgbClr r="0" g="0" b="0"/>
-        </a:effectRef>
-        <a:fontRef idx="minor"/>
-      </dsp:style>
-    </dsp:sp>
-    <dsp:sp modelId="{BCF50F19-E1D6-944F-A305-3A1881F3F899}">
-      <dsp:nvSpPr>
-        <dsp:cNvPr id="0" name=""/>
-        <dsp:cNvSpPr/>
-      </dsp:nvSpPr>
-      <dsp:spPr>
-        <a:xfrm>
-          <a:off x="1595167" y="45690"/>
-          <a:ext cx="1318070" cy="659035"/>
-        </a:xfrm>
-        <a:prstGeom prst="rect">
-          <a:avLst/>
-        </a:prstGeom>
-        <a:gradFill rotWithShape="0">
-          <a:gsLst>
-            <a:gs pos="0">
-              <a:schemeClr val="accent1">
-                <a:hueOff val="0"/>
-                <a:satOff val="0"/>
-                <a:lumOff val="0"/>
-                <a:alphaOff val="0"/>
-              </a:schemeClr>
-            </a:gs>
-            <a:gs pos="100000">
-              <a:schemeClr val="accent1">
-                <a:hueOff val="0"/>
-                <a:satOff val="0"/>
-                <a:lumOff val="0"/>
-                <a:alphaOff val="0"/>
-                <a:shade val="76000"/>
-                <a:lumMod val="90000"/>
-              </a:schemeClr>
-            </a:gs>
-          </a:gsLst>
-          <a:lin ang="5400000" scaled="0"/>
-        </a:gradFill>
-        <a:ln>
-          <a:noFill/>
-        </a:ln>
-        <a:effectLst>
-          <a:outerShdw blurRad="38100" dist="38100" dir="4800000" sx="98000" sy="98000" rotWithShape="0">
-            <a:srgbClr val="000000">
-              <a:alpha val="32000"/>
-            </a:srgbClr>
-          </a:outerShdw>
-        </a:effectLst>
-      </dsp:spPr>
-      <dsp:style>
-        <a:lnRef idx="0">
-          <a:scrgbClr r="0" g="0" b="0"/>
-        </a:lnRef>
-        <a:fillRef idx="3">
-          <a:scrgbClr r="0" g="0" b="0"/>
-        </a:fillRef>
-        <a:effectRef idx="2">
-          <a:scrgbClr r="0" g="0" b="0"/>
-        </a:effectRef>
-        <a:fontRef idx="minor">
-          <a:schemeClr val="lt1"/>
-        </a:fontRef>
-      </dsp:style>
-      <dsp:txBody>
-        <a:bodyPr spcFirstLastPara="0" vert="horz" wrap="square" lIns="13970" tIns="13970" rIns="13970" bIns="13970" numCol="1" spcCol="1270" anchor="ctr" anchorCtr="0">
-          <a:noAutofit/>
-        </a:bodyPr>
-        <a:lstStyle/>
-        <a:p>
-          <a:pPr lvl="0" algn="ctr" defTabSz="977900">
-            <a:lnSpc>
-              <a:spcPct val="90000"/>
-            </a:lnSpc>
-            <a:spcBef>
-              <a:spcPct val="0"/>
-            </a:spcBef>
-            <a:spcAft>
-              <a:spcPct val="35000"/>
-            </a:spcAft>
-          </a:pPr>
-          <a:r>
-            <a:rPr lang="en-US" sz="2200" kern="1200" dirty="0" smtClean="0"/>
-            <a:t>Homepage</a:t>
-          </a:r>
-          <a:endParaRPr lang="en-US" sz="2200" kern="1200" dirty="0"/>
-        </a:p>
-      </dsp:txBody>
-      <dsp:txXfrm>
-        <a:off x="1595167" y="45690"/>
-        <a:ext cx="1318070" cy="659035"/>
-      </dsp:txXfrm>
-    </dsp:sp>
-    <dsp:sp modelId="{A6998BF2-0C7C-5E47-8FAD-A5F74D1A43B7}">
-      <dsp:nvSpPr>
-        <dsp:cNvPr id="0" name=""/>
-        <dsp:cNvSpPr/>
-      </dsp:nvSpPr>
-      <dsp:spPr>
-        <a:xfrm>
-          <a:off x="302" y="1917350"/>
-          <a:ext cx="1318070" cy="659035"/>
-        </a:xfrm>
-        <a:prstGeom prst="rect">
-          <a:avLst/>
-        </a:prstGeom>
-        <a:gradFill rotWithShape="0">
-          <a:gsLst>
-            <a:gs pos="0">
-              <a:schemeClr val="accent1">
-                <a:hueOff val="0"/>
-                <a:satOff val="0"/>
-                <a:lumOff val="0"/>
-                <a:alphaOff val="0"/>
-              </a:schemeClr>
-            </a:gs>
-            <a:gs pos="100000">
-              <a:schemeClr val="accent1">
-                <a:hueOff val="0"/>
-                <a:satOff val="0"/>
-                <a:lumOff val="0"/>
-                <a:alphaOff val="0"/>
-                <a:shade val="76000"/>
-                <a:lumMod val="90000"/>
-              </a:schemeClr>
-            </a:gs>
-          </a:gsLst>
-          <a:lin ang="5400000" scaled="0"/>
-        </a:gradFill>
-        <a:ln>
-          <a:noFill/>
-        </a:ln>
-        <a:effectLst>
-          <a:outerShdw blurRad="38100" dist="38100" dir="4800000" sx="98000" sy="98000" rotWithShape="0">
-            <a:srgbClr val="000000">
-              <a:alpha val="32000"/>
-            </a:srgbClr>
-          </a:outerShdw>
-        </a:effectLst>
-      </dsp:spPr>
-      <dsp:style>
-        <a:lnRef idx="0">
-          <a:scrgbClr r="0" g="0" b="0"/>
-        </a:lnRef>
-        <a:fillRef idx="3">
-          <a:scrgbClr r="0" g="0" b="0"/>
-        </a:fillRef>
-        <a:effectRef idx="2">
-          <a:scrgbClr r="0" g="0" b="0"/>
-        </a:effectRef>
-        <a:fontRef idx="minor">
-          <a:schemeClr val="lt1"/>
-        </a:fontRef>
-      </dsp:style>
-      <dsp:txBody>
-        <a:bodyPr spcFirstLastPara="0" vert="horz" wrap="square" lIns="13970" tIns="13970" rIns="13970" bIns="13970" numCol="1" spcCol="1270" anchor="ctr" anchorCtr="0">
-          <a:noAutofit/>
-        </a:bodyPr>
-        <a:lstStyle/>
-        <a:p>
-          <a:pPr lvl="0" algn="ctr" defTabSz="977900">
-            <a:lnSpc>
-              <a:spcPct val="90000"/>
-            </a:lnSpc>
-            <a:spcBef>
-              <a:spcPct val="0"/>
-            </a:spcBef>
-            <a:spcAft>
-              <a:spcPct val="35000"/>
-            </a:spcAft>
-          </a:pPr>
-          <a:r>
-            <a:rPr lang="en-US" sz="2200" kern="1200" dirty="0" smtClean="0"/>
-            <a:t>Child 1</a:t>
-          </a:r>
-          <a:endParaRPr lang="en-US" sz="2200" kern="1200" dirty="0"/>
-        </a:p>
-      </dsp:txBody>
-      <dsp:txXfrm>
-        <a:off x="302" y="1917350"/>
-        <a:ext cx="1318070" cy="659035"/>
-      </dsp:txXfrm>
-    </dsp:sp>
-    <dsp:sp modelId="{1F6827FC-FA5C-C948-B5D8-A87E0C3058B3}">
-      <dsp:nvSpPr>
-        <dsp:cNvPr id="0" name=""/>
-        <dsp:cNvSpPr/>
-      </dsp:nvSpPr>
-      <dsp:spPr>
-        <a:xfrm>
-          <a:off x="1595167" y="1917350"/>
-          <a:ext cx="1318070" cy="659035"/>
-        </a:xfrm>
-        <a:prstGeom prst="rect">
-          <a:avLst/>
-        </a:prstGeom>
-        <a:gradFill rotWithShape="0">
-          <a:gsLst>
-            <a:gs pos="0">
-              <a:schemeClr val="accent1">
-                <a:hueOff val="0"/>
-                <a:satOff val="0"/>
-                <a:lumOff val="0"/>
-                <a:alphaOff val="0"/>
-              </a:schemeClr>
-            </a:gs>
-            <a:gs pos="100000">
-              <a:schemeClr val="accent1">
-                <a:hueOff val="0"/>
-                <a:satOff val="0"/>
-                <a:lumOff val="0"/>
-                <a:alphaOff val="0"/>
-                <a:shade val="76000"/>
-                <a:lumMod val="90000"/>
-              </a:schemeClr>
-            </a:gs>
-          </a:gsLst>
-          <a:lin ang="5400000" scaled="0"/>
-        </a:gradFill>
-        <a:ln>
-          <a:noFill/>
-        </a:ln>
-        <a:effectLst>
-          <a:outerShdw blurRad="38100" dist="38100" dir="4800000" sx="98000" sy="98000" rotWithShape="0">
-            <a:srgbClr val="000000">
-              <a:alpha val="32000"/>
-            </a:srgbClr>
-          </a:outerShdw>
-        </a:effectLst>
-      </dsp:spPr>
-      <dsp:style>
-        <a:lnRef idx="0">
-          <a:scrgbClr r="0" g="0" b="0"/>
-        </a:lnRef>
-        <a:fillRef idx="3">
-          <a:scrgbClr r="0" g="0" b="0"/>
-        </a:fillRef>
-        <a:effectRef idx="2">
-          <a:scrgbClr r="0" g="0" b="0"/>
-        </a:effectRef>
-        <a:fontRef idx="minor">
-          <a:schemeClr val="lt1"/>
-        </a:fontRef>
-      </dsp:style>
-      <dsp:txBody>
-        <a:bodyPr spcFirstLastPara="0" vert="horz" wrap="square" lIns="13970" tIns="13970" rIns="13970" bIns="13970" numCol="1" spcCol="1270" anchor="ctr" anchorCtr="0">
-          <a:noAutofit/>
-        </a:bodyPr>
-        <a:lstStyle/>
-        <a:p>
-          <a:pPr lvl="0" algn="ctr" defTabSz="977900">
-            <a:lnSpc>
-              <a:spcPct val="90000"/>
-            </a:lnSpc>
-            <a:spcBef>
-              <a:spcPct val="0"/>
-            </a:spcBef>
-            <a:spcAft>
-              <a:spcPct val="35000"/>
-            </a:spcAft>
-          </a:pPr>
-          <a:r>
-            <a:rPr lang="en-US" sz="2200" kern="1200" dirty="0" smtClean="0"/>
-            <a:t>Child 2</a:t>
-          </a:r>
-          <a:endParaRPr lang="en-US" sz="2200" kern="1200" dirty="0"/>
-        </a:p>
-      </dsp:txBody>
-      <dsp:txXfrm>
-        <a:off x="1595167" y="1917350"/>
-        <a:ext cx="1318070" cy="659035"/>
-      </dsp:txXfrm>
-    </dsp:sp>
-    <dsp:sp modelId="{6B9D1F3C-082B-9D40-935D-2EEE06F9AB53}">
-      <dsp:nvSpPr>
-        <dsp:cNvPr id="0" name=""/>
-        <dsp:cNvSpPr/>
-      </dsp:nvSpPr>
-      <dsp:spPr>
-        <a:xfrm>
-          <a:off x="3190032" y="1917350"/>
-          <a:ext cx="1318070" cy="659035"/>
-        </a:xfrm>
-        <a:prstGeom prst="rect">
-          <a:avLst/>
-        </a:prstGeom>
-        <a:gradFill rotWithShape="0">
-          <a:gsLst>
-            <a:gs pos="0">
-              <a:schemeClr val="accent1">
-                <a:hueOff val="0"/>
-                <a:satOff val="0"/>
-                <a:lumOff val="0"/>
-                <a:alphaOff val="0"/>
-              </a:schemeClr>
-            </a:gs>
-            <a:gs pos="100000">
-              <a:schemeClr val="accent1">
-                <a:hueOff val="0"/>
-                <a:satOff val="0"/>
-                <a:lumOff val="0"/>
-                <a:alphaOff val="0"/>
-                <a:shade val="76000"/>
-                <a:lumMod val="90000"/>
-              </a:schemeClr>
-            </a:gs>
-          </a:gsLst>
-          <a:lin ang="5400000" scaled="0"/>
-        </a:gradFill>
-        <a:ln>
-          <a:noFill/>
-        </a:ln>
-        <a:effectLst>
-          <a:outerShdw blurRad="38100" dist="38100" dir="4800000" sx="98000" sy="98000" rotWithShape="0">
-            <a:srgbClr val="000000">
-              <a:alpha val="32000"/>
-            </a:srgbClr>
-          </a:outerShdw>
-        </a:effectLst>
-      </dsp:spPr>
-      <dsp:style>
-        <a:lnRef idx="0">
-          <a:scrgbClr r="0" g="0" b="0"/>
-        </a:lnRef>
-        <a:fillRef idx="3">
-          <a:scrgbClr r="0" g="0" b="0"/>
-        </a:fillRef>
-        <a:effectRef idx="2">
-          <a:scrgbClr r="0" g="0" b="0"/>
-        </a:effectRef>
-        <a:fontRef idx="minor">
-          <a:schemeClr val="lt1"/>
-        </a:fontRef>
-      </dsp:style>
-      <dsp:txBody>
-        <a:bodyPr spcFirstLastPara="0" vert="horz" wrap="square" lIns="13970" tIns="13970" rIns="13970" bIns="13970" numCol="1" spcCol="1270" anchor="ctr" anchorCtr="0">
-          <a:noAutofit/>
-        </a:bodyPr>
-        <a:lstStyle/>
-        <a:p>
-          <a:pPr lvl="0" algn="ctr" defTabSz="977900">
-            <a:lnSpc>
-              <a:spcPct val="90000"/>
-            </a:lnSpc>
-            <a:spcBef>
-              <a:spcPct val="0"/>
-            </a:spcBef>
-            <a:spcAft>
-              <a:spcPct val="35000"/>
-            </a:spcAft>
-          </a:pPr>
-          <a:r>
-            <a:rPr lang="en-US" sz="2200" kern="1200" dirty="0" smtClean="0"/>
-            <a:t>Child 3</a:t>
-          </a:r>
-          <a:endParaRPr lang="en-US" sz="2200" kern="1200" dirty="0"/>
-        </a:p>
-      </dsp:txBody>
-      <dsp:txXfrm>
-        <a:off x="3190032" y="1917350"/>
-        <a:ext cx="1318070" cy="659035"/>
-      </dsp:txXfrm>
-    </dsp:sp>
-    <dsp:sp modelId="{4E2303F9-ACF3-FD4C-9843-B67245D94037}">
-      <dsp:nvSpPr>
-        <dsp:cNvPr id="0" name=""/>
-        <dsp:cNvSpPr/>
-      </dsp:nvSpPr>
-      <dsp:spPr>
-        <a:xfrm>
-          <a:off x="1593598" y="962612"/>
-          <a:ext cx="1318070" cy="659035"/>
-        </a:xfrm>
-        <a:prstGeom prst="rect">
-          <a:avLst/>
-        </a:prstGeom>
-        <a:gradFill rotWithShape="0">
-          <a:gsLst>
-            <a:gs pos="0">
-              <a:schemeClr val="accent1">
-                <a:hueOff val="0"/>
-                <a:satOff val="0"/>
-                <a:lumOff val="0"/>
-                <a:alphaOff val="0"/>
-              </a:schemeClr>
-            </a:gs>
-            <a:gs pos="100000">
-              <a:schemeClr val="accent1">
-                <a:hueOff val="0"/>
-                <a:satOff val="0"/>
-                <a:lumOff val="0"/>
-                <a:alphaOff val="0"/>
-                <a:shade val="76000"/>
-                <a:lumMod val="90000"/>
-              </a:schemeClr>
-            </a:gs>
-          </a:gsLst>
-          <a:lin ang="5400000" scaled="0"/>
-        </a:gradFill>
-        <a:ln>
-          <a:noFill/>
-        </a:ln>
-        <a:effectLst>
-          <a:outerShdw blurRad="38100" dist="38100" dir="4800000" sx="98000" sy="98000" rotWithShape="0">
-            <a:srgbClr val="000000">
-              <a:alpha val="32000"/>
-            </a:srgbClr>
-          </a:outerShdw>
-        </a:effectLst>
-      </dsp:spPr>
-      <dsp:style>
-        <a:lnRef idx="0">
-          <a:scrgbClr r="0" g="0" b="0"/>
-        </a:lnRef>
-        <a:fillRef idx="3">
-          <a:scrgbClr r="0" g="0" b="0"/>
-        </a:fillRef>
-        <a:effectRef idx="2">
-          <a:scrgbClr r="0" g="0" b="0"/>
-        </a:effectRef>
-        <a:fontRef idx="minor">
-          <a:schemeClr val="lt1"/>
-        </a:fontRef>
-      </dsp:style>
-      <dsp:txBody>
-        <a:bodyPr spcFirstLastPara="0" vert="horz" wrap="square" lIns="13970" tIns="13970" rIns="13970" bIns="13970" numCol="1" spcCol="1270" anchor="ctr" anchorCtr="0">
-          <a:noAutofit/>
-        </a:bodyPr>
-        <a:lstStyle/>
-        <a:p>
-          <a:pPr lvl="0" algn="ctr" defTabSz="977900">
-            <a:lnSpc>
-              <a:spcPct val="90000"/>
-            </a:lnSpc>
-            <a:spcBef>
-              <a:spcPct val="0"/>
-            </a:spcBef>
-            <a:spcAft>
-              <a:spcPct val="35000"/>
-            </a:spcAft>
-          </a:pPr>
-          <a:r>
-            <a:rPr lang="en-US" sz="2200" kern="1200" dirty="0" smtClean="0"/>
-            <a:t>Our Page</a:t>
-          </a:r>
-          <a:endParaRPr lang="en-US" sz="2200" kern="1200" dirty="0"/>
-        </a:p>
-      </dsp:txBody>
-      <dsp:txXfrm>
-        <a:off x="1593598" y="962612"/>
-        <a:ext cx="1318070" cy="659035"/>
-      </dsp:txXfrm>
-    </dsp:sp>
   </dsp:spTree>
 </dsp:drawing>
 </file>
@@ -9047,694 +8365,6 @@
       <dsp:cNvGrpSpPr/>
     </dsp:nvGrpSpPr>
     <dsp:grpSpPr/>
-    <dsp:sp modelId="{0CE327EB-0566-8748-BFA4-085F7A19257C}">
-      <dsp:nvSpPr>
-        <dsp:cNvPr id="0" name=""/>
-        <dsp:cNvSpPr/>
-      </dsp:nvSpPr>
-      <dsp:spPr>
-        <a:xfrm>
-          <a:off x="2361789" y="1022187"/>
-          <a:ext cx="751312" cy="715561"/>
-        </a:xfrm>
-        <a:custGeom>
-          <a:avLst/>
-          <a:gdLst/>
-          <a:ahLst/>
-          <a:cxnLst/>
-          <a:rect l="0" t="0" r="0" b="0"/>
-          <a:pathLst>
-            <a:path>
-              <a:moveTo>
-                <a:pt x="751312" y="0"/>
-              </a:moveTo>
-              <a:lnTo>
-                <a:pt x="0" y="715561"/>
-              </a:lnTo>
-            </a:path>
-          </a:pathLst>
-        </a:custGeom>
-        <a:noFill/>
-        <a:ln w="9525" cap="flat" cmpd="sng" algn="ctr">
-          <a:solidFill>
-            <a:schemeClr val="accent1">
-              <a:shade val="60000"/>
-              <a:hueOff val="0"/>
-              <a:satOff val="0"/>
-              <a:lumOff val="0"/>
-              <a:alphaOff val="0"/>
-            </a:schemeClr>
-          </a:solidFill>
-          <a:prstDash val="solid"/>
-        </a:ln>
-        <a:effectLst/>
-      </dsp:spPr>
-      <dsp:style>
-        <a:lnRef idx="1">
-          <a:scrgbClr r="0" g="0" b="0"/>
-        </a:lnRef>
-        <a:fillRef idx="0">
-          <a:scrgbClr r="0" g="0" b="0"/>
-        </a:fillRef>
-        <a:effectRef idx="0">
-          <a:scrgbClr r="0" g="0" b="0"/>
-        </a:effectRef>
-        <a:fontRef idx="minor"/>
-      </dsp:style>
-    </dsp:sp>
-    <dsp:sp modelId="{7E74B830-BF27-934F-AE86-49257B5A48EB}">
-      <dsp:nvSpPr>
-        <dsp:cNvPr id="0" name=""/>
-        <dsp:cNvSpPr/>
-      </dsp:nvSpPr>
-      <dsp:spPr>
-        <a:xfrm>
-          <a:off x="3113102" y="1022187"/>
-          <a:ext cx="2073792" cy="1576767"/>
-        </a:xfrm>
-        <a:custGeom>
-          <a:avLst/>
-          <a:gdLst/>
-          <a:ahLst/>
-          <a:cxnLst/>
-          <a:rect l="0" t="0" r="0" b="0"/>
-          <a:pathLst>
-            <a:path>
-              <a:moveTo>
-                <a:pt x="0" y="0"/>
-              </a:moveTo>
-              <a:lnTo>
-                <a:pt x="0" y="1396810"/>
-              </a:lnTo>
-              <a:lnTo>
-                <a:pt x="2073792" y="1396810"/>
-              </a:lnTo>
-              <a:lnTo>
-                <a:pt x="2073792" y="1576767"/>
-              </a:lnTo>
-            </a:path>
-          </a:pathLst>
-        </a:custGeom>
-        <a:noFill/>
-        <a:ln w="9525" cap="flat" cmpd="sng" algn="ctr">
-          <a:solidFill>
-            <a:schemeClr val="accent1">
-              <a:shade val="60000"/>
-              <a:hueOff val="0"/>
-              <a:satOff val="0"/>
-              <a:lumOff val="0"/>
-              <a:alphaOff val="0"/>
-            </a:schemeClr>
-          </a:solidFill>
-          <a:prstDash val="solid"/>
-        </a:ln>
-        <a:effectLst/>
-      </dsp:spPr>
-      <dsp:style>
-        <a:lnRef idx="1">
-          <a:scrgbClr r="0" g="0" b="0"/>
-        </a:lnRef>
-        <a:fillRef idx="0">
-          <a:scrgbClr r="0" g="0" b="0"/>
-        </a:fillRef>
-        <a:effectRef idx="0">
-          <a:scrgbClr r="0" g="0" b="0"/>
-        </a:effectRef>
-        <a:fontRef idx="minor"/>
-      </dsp:style>
-    </dsp:sp>
-    <dsp:sp modelId="{78958DEB-F014-4244-9F57-C93DFD0C6983}">
-      <dsp:nvSpPr>
-        <dsp:cNvPr id="0" name=""/>
-        <dsp:cNvSpPr/>
-      </dsp:nvSpPr>
-      <dsp:spPr>
-        <a:xfrm>
-          <a:off x="2933144" y="1022187"/>
-          <a:ext cx="179957" cy="1576767"/>
-        </a:xfrm>
-        <a:custGeom>
-          <a:avLst/>
-          <a:gdLst/>
-          <a:ahLst/>
-          <a:cxnLst/>
-          <a:rect l="0" t="0" r="0" b="0"/>
-          <a:pathLst>
-            <a:path>
-              <a:moveTo>
-                <a:pt x="179957" y="0"/>
-              </a:moveTo>
-              <a:lnTo>
-                <a:pt x="179957" y="1396810"/>
-              </a:lnTo>
-              <a:lnTo>
-                <a:pt x="0" y="1396810"/>
-              </a:lnTo>
-              <a:lnTo>
-                <a:pt x="0" y="1576767"/>
-              </a:lnTo>
-            </a:path>
-          </a:pathLst>
-        </a:custGeom>
-        <a:noFill/>
-        <a:ln w="9525" cap="flat" cmpd="sng" algn="ctr">
-          <a:solidFill>
-            <a:schemeClr val="accent1">
-              <a:shade val="60000"/>
-              <a:hueOff val="0"/>
-              <a:satOff val="0"/>
-              <a:lumOff val="0"/>
-              <a:alphaOff val="0"/>
-            </a:schemeClr>
-          </a:solidFill>
-          <a:prstDash val="solid"/>
-        </a:ln>
-        <a:effectLst/>
-      </dsp:spPr>
-      <dsp:style>
-        <a:lnRef idx="1">
-          <a:scrgbClr r="0" g="0" b="0"/>
-        </a:lnRef>
-        <a:fillRef idx="0">
-          <a:scrgbClr r="0" g="0" b="0"/>
-        </a:fillRef>
-        <a:effectRef idx="0">
-          <a:scrgbClr r="0" g="0" b="0"/>
-        </a:effectRef>
-        <a:fontRef idx="minor"/>
-      </dsp:style>
-    </dsp:sp>
-    <dsp:sp modelId="{8D185E37-8DCA-364C-AB66-B2A89E254564}">
-      <dsp:nvSpPr>
-        <dsp:cNvPr id="0" name=""/>
-        <dsp:cNvSpPr/>
-      </dsp:nvSpPr>
-      <dsp:spPr>
-        <a:xfrm>
-          <a:off x="859352" y="1022187"/>
-          <a:ext cx="2253749" cy="1576767"/>
-        </a:xfrm>
-        <a:custGeom>
-          <a:avLst/>
-          <a:gdLst/>
-          <a:ahLst/>
-          <a:cxnLst/>
-          <a:rect l="0" t="0" r="0" b="0"/>
-          <a:pathLst>
-            <a:path>
-              <a:moveTo>
-                <a:pt x="2253749" y="0"/>
-              </a:moveTo>
-              <a:lnTo>
-                <a:pt x="2253749" y="1396810"/>
-              </a:lnTo>
-              <a:lnTo>
-                <a:pt x="0" y="1396810"/>
-              </a:lnTo>
-              <a:lnTo>
-                <a:pt x="0" y="1576767"/>
-              </a:lnTo>
-            </a:path>
-          </a:pathLst>
-        </a:custGeom>
-        <a:noFill/>
-        <a:ln w="9525" cap="flat" cmpd="sng" algn="ctr">
-          <a:solidFill>
-            <a:schemeClr val="accent1">
-              <a:shade val="60000"/>
-              <a:hueOff val="0"/>
-              <a:satOff val="0"/>
-              <a:lumOff val="0"/>
-              <a:alphaOff val="0"/>
-            </a:schemeClr>
-          </a:solidFill>
-          <a:prstDash val="solid"/>
-        </a:ln>
-        <a:effectLst/>
-      </dsp:spPr>
-      <dsp:style>
-        <a:lnRef idx="1">
-          <a:scrgbClr r="0" g="0" b="0"/>
-        </a:lnRef>
-        <a:fillRef idx="0">
-          <a:scrgbClr r="0" g="0" b="0"/>
-        </a:fillRef>
-        <a:effectRef idx="0">
-          <a:scrgbClr r="0" g="0" b="0"/>
-        </a:effectRef>
-        <a:fontRef idx="minor"/>
-      </dsp:style>
-    </dsp:sp>
-    <dsp:sp modelId="{BCF50F19-E1D6-944F-A305-3A1881F3F899}">
-      <dsp:nvSpPr>
-        <dsp:cNvPr id="0" name=""/>
-        <dsp:cNvSpPr/>
-      </dsp:nvSpPr>
-      <dsp:spPr>
-        <a:xfrm>
-          <a:off x="2256162" y="165248"/>
-          <a:ext cx="1713878" cy="856939"/>
-        </a:xfrm>
-        <a:prstGeom prst="rect">
-          <a:avLst/>
-        </a:prstGeom>
-        <a:gradFill rotWithShape="0">
-          <a:gsLst>
-            <a:gs pos="0">
-              <a:schemeClr val="accent1">
-                <a:hueOff val="0"/>
-                <a:satOff val="0"/>
-                <a:lumOff val="0"/>
-                <a:alphaOff val="0"/>
-              </a:schemeClr>
-            </a:gs>
-            <a:gs pos="100000">
-              <a:schemeClr val="accent1">
-                <a:hueOff val="0"/>
-                <a:satOff val="0"/>
-                <a:lumOff val="0"/>
-                <a:alphaOff val="0"/>
-                <a:shade val="76000"/>
-                <a:lumMod val="90000"/>
-              </a:schemeClr>
-            </a:gs>
-          </a:gsLst>
-          <a:lin ang="5400000" scaled="0"/>
-        </a:gradFill>
-        <a:ln>
-          <a:noFill/>
-        </a:ln>
-        <a:effectLst>
-          <a:outerShdw blurRad="38100" dist="38100" dir="4800000" sx="98000" sy="98000" rotWithShape="0">
-            <a:srgbClr val="000000">
-              <a:alpha val="32000"/>
-            </a:srgbClr>
-          </a:outerShdw>
-        </a:effectLst>
-      </dsp:spPr>
-      <dsp:style>
-        <a:lnRef idx="0">
-          <a:scrgbClr r="0" g="0" b="0"/>
-        </a:lnRef>
-        <a:fillRef idx="3">
-          <a:scrgbClr r="0" g="0" b="0"/>
-        </a:fillRef>
-        <a:effectRef idx="2">
-          <a:scrgbClr r="0" g="0" b="0"/>
-        </a:effectRef>
-        <a:fontRef idx="minor">
-          <a:schemeClr val="lt1"/>
-        </a:fontRef>
-      </dsp:style>
-      <dsp:txBody>
-        <a:bodyPr spcFirstLastPara="0" vert="horz" wrap="square" lIns="17780" tIns="17780" rIns="17780" bIns="17780" numCol="1" spcCol="1270" anchor="ctr" anchorCtr="0">
-          <a:noAutofit/>
-        </a:bodyPr>
-        <a:lstStyle/>
-        <a:p>
-          <a:pPr lvl="0" algn="ctr" defTabSz="1244600">
-            <a:lnSpc>
-              <a:spcPct val="90000"/>
-            </a:lnSpc>
-            <a:spcBef>
-              <a:spcPct val="0"/>
-            </a:spcBef>
-            <a:spcAft>
-              <a:spcPct val="35000"/>
-            </a:spcAft>
-          </a:pPr>
-          <a:r>
-            <a:rPr lang="en-US" sz="2800" kern="1200" dirty="0" smtClean="0"/>
-            <a:t>Homepage</a:t>
-          </a:r>
-          <a:endParaRPr lang="en-US" sz="2800" kern="1200" dirty="0"/>
-        </a:p>
-      </dsp:txBody>
-      <dsp:txXfrm>
-        <a:off x="2256162" y="165248"/>
-        <a:ext cx="1713878" cy="856939"/>
-      </dsp:txXfrm>
-    </dsp:sp>
-    <dsp:sp modelId="{A6998BF2-0C7C-5E47-8FAD-A5F74D1A43B7}">
-      <dsp:nvSpPr>
-        <dsp:cNvPr id="0" name=""/>
-        <dsp:cNvSpPr/>
-      </dsp:nvSpPr>
-      <dsp:spPr>
-        <a:xfrm>
-          <a:off x="2413" y="2598955"/>
-          <a:ext cx="1713878" cy="856939"/>
-        </a:xfrm>
-        <a:prstGeom prst="rect">
-          <a:avLst/>
-        </a:prstGeom>
-        <a:gradFill rotWithShape="0">
-          <a:gsLst>
-            <a:gs pos="0">
-              <a:schemeClr val="accent1">
-                <a:hueOff val="0"/>
-                <a:satOff val="0"/>
-                <a:lumOff val="0"/>
-                <a:alphaOff val="0"/>
-              </a:schemeClr>
-            </a:gs>
-            <a:gs pos="100000">
-              <a:schemeClr val="accent1">
-                <a:hueOff val="0"/>
-                <a:satOff val="0"/>
-                <a:lumOff val="0"/>
-                <a:alphaOff val="0"/>
-                <a:shade val="76000"/>
-                <a:lumMod val="90000"/>
-              </a:schemeClr>
-            </a:gs>
-          </a:gsLst>
-          <a:lin ang="5400000" scaled="0"/>
-        </a:gradFill>
-        <a:ln>
-          <a:noFill/>
-        </a:ln>
-        <a:effectLst>
-          <a:outerShdw blurRad="38100" dist="38100" dir="4800000" sx="98000" sy="98000" rotWithShape="0">
-            <a:srgbClr val="000000">
-              <a:alpha val="32000"/>
-            </a:srgbClr>
-          </a:outerShdw>
-        </a:effectLst>
-      </dsp:spPr>
-      <dsp:style>
-        <a:lnRef idx="0">
-          <a:scrgbClr r="0" g="0" b="0"/>
-        </a:lnRef>
-        <a:fillRef idx="3">
-          <a:scrgbClr r="0" g="0" b="0"/>
-        </a:fillRef>
-        <a:effectRef idx="2">
-          <a:scrgbClr r="0" g="0" b="0"/>
-        </a:effectRef>
-        <a:fontRef idx="minor">
-          <a:schemeClr val="lt1"/>
-        </a:fontRef>
-      </dsp:style>
-      <dsp:txBody>
-        <a:bodyPr spcFirstLastPara="0" vert="horz" wrap="square" lIns="17780" tIns="17780" rIns="17780" bIns="17780" numCol="1" spcCol="1270" anchor="ctr" anchorCtr="0">
-          <a:noAutofit/>
-        </a:bodyPr>
-        <a:lstStyle/>
-        <a:p>
-          <a:pPr lvl="0" algn="ctr" defTabSz="1244600">
-            <a:lnSpc>
-              <a:spcPct val="90000"/>
-            </a:lnSpc>
-            <a:spcBef>
-              <a:spcPct val="0"/>
-            </a:spcBef>
-            <a:spcAft>
-              <a:spcPct val="35000"/>
-            </a:spcAft>
-          </a:pPr>
-          <a:r>
-            <a:rPr lang="en-US" sz="2800" kern="1200" dirty="0" smtClean="0"/>
-            <a:t>Child 1</a:t>
-          </a:r>
-          <a:endParaRPr lang="en-US" sz="2800" kern="1200" dirty="0"/>
-        </a:p>
-      </dsp:txBody>
-      <dsp:txXfrm>
-        <a:off x="2413" y="2598955"/>
-        <a:ext cx="1713878" cy="856939"/>
-      </dsp:txXfrm>
-    </dsp:sp>
-    <dsp:sp modelId="{1F6827FC-FA5C-C948-B5D8-A87E0C3058B3}">
-      <dsp:nvSpPr>
-        <dsp:cNvPr id="0" name=""/>
-        <dsp:cNvSpPr/>
-      </dsp:nvSpPr>
-      <dsp:spPr>
-        <a:xfrm>
-          <a:off x="2076205" y="2598955"/>
-          <a:ext cx="1713878" cy="856939"/>
-        </a:xfrm>
-        <a:prstGeom prst="rect">
-          <a:avLst/>
-        </a:prstGeom>
-        <a:gradFill rotWithShape="0">
-          <a:gsLst>
-            <a:gs pos="0">
-              <a:schemeClr val="accent1">
-                <a:hueOff val="0"/>
-                <a:satOff val="0"/>
-                <a:lumOff val="0"/>
-                <a:alphaOff val="0"/>
-              </a:schemeClr>
-            </a:gs>
-            <a:gs pos="100000">
-              <a:schemeClr val="accent1">
-                <a:hueOff val="0"/>
-                <a:satOff val="0"/>
-                <a:lumOff val="0"/>
-                <a:alphaOff val="0"/>
-                <a:shade val="76000"/>
-                <a:lumMod val="90000"/>
-              </a:schemeClr>
-            </a:gs>
-          </a:gsLst>
-          <a:lin ang="5400000" scaled="0"/>
-        </a:gradFill>
-        <a:ln>
-          <a:noFill/>
-        </a:ln>
-        <a:effectLst>
-          <a:outerShdw blurRad="38100" dist="38100" dir="4800000" sx="98000" sy="98000" rotWithShape="0">
-            <a:srgbClr val="000000">
-              <a:alpha val="32000"/>
-            </a:srgbClr>
-          </a:outerShdw>
-        </a:effectLst>
-      </dsp:spPr>
-      <dsp:style>
-        <a:lnRef idx="0">
-          <a:scrgbClr r="0" g="0" b="0"/>
-        </a:lnRef>
-        <a:fillRef idx="3">
-          <a:scrgbClr r="0" g="0" b="0"/>
-        </a:fillRef>
-        <a:effectRef idx="2">
-          <a:scrgbClr r="0" g="0" b="0"/>
-        </a:effectRef>
-        <a:fontRef idx="minor">
-          <a:schemeClr val="lt1"/>
-        </a:fontRef>
-      </dsp:style>
-      <dsp:txBody>
-        <a:bodyPr spcFirstLastPara="0" vert="horz" wrap="square" lIns="17780" tIns="17780" rIns="17780" bIns="17780" numCol="1" spcCol="1270" anchor="ctr" anchorCtr="0">
-          <a:noAutofit/>
-        </a:bodyPr>
-        <a:lstStyle/>
-        <a:p>
-          <a:pPr lvl="0" algn="ctr" defTabSz="1244600">
-            <a:lnSpc>
-              <a:spcPct val="90000"/>
-            </a:lnSpc>
-            <a:spcBef>
-              <a:spcPct val="0"/>
-            </a:spcBef>
-            <a:spcAft>
-              <a:spcPct val="35000"/>
-            </a:spcAft>
-          </a:pPr>
-          <a:r>
-            <a:rPr lang="en-US" sz="2800" kern="1200" dirty="0" smtClean="0"/>
-            <a:t>Child 2</a:t>
-          </a:r>
-          <a:endParaRPr lang="en-US" sz="2800" kern="1200" dirty="0"/>
-        </a:p>
-      </dsp:txBody>
-      <dsp:txXfrm>
-        <a:off x="2076205" y="2598955"/>
-        <a:ext cx="1713878" cy="856939"/>
-      </dsp:txXfrm>
-    </dsp:sp>
-    <dsp:sp modelId="{6B9D1F3C-082B-9D40-935D-2EEE06F9AB53}">
-      <dsp:nvSpPr>
-        <dsp:cNvPr id="0" name=""/>
-        <dsp:cNvSpPr/>
-      </dsp:nvSpPr>
-      <dsp:spPr>
-        <a:xfrm>
-          <a:off x="4149998" y="2598955"/>
-          <a:ext cx="2073792" cy="856939"/>
-        </a:xfrm>
-        <a:prstGeom prst="rect">
-          <a:avLst/>
-        </a:prstGeom>
-        <a:gradFill rotWithShape="0">
-          <a:gsLst>
-            <a:gs pos="0">
-              <a:schemeClr val="accent1">
-                <a:hueOff val="0"/>
-                <a:satOff val="0"/>
-                <a:lumOff val="0"/>
-                <a:alphaOff val="0"/>
-              </a:schemeClr>
-            </a:gs>
-            <a:gs pos="100000">
-              <a:schemeClr val="accent1">
-                <a:hueOff val="0"/>
-                <a:satOff val="0"/>
-                <a:lumOff val="0"/>
-                <a:alphaOff val="0"/>
-                <a:shade val="76000"/>
-                <a:lumMod val="90000"/>
-              </a:schemeClr>
-            </a:gs>
-          </a:gsLst>
-          <a:lin ang="5400000" scaled="0"/>
-        </a:gradFill>
-        <a:ln>
-          <a:noFill/>
-        </a:ln>
-        <a:effectLst>
-          <a:outerShdw blurRad="38100" dist="38100" dir="4800000" sx="98000" sy="98000" rotWithShape="0">
-            <a:srgbClr val="000000">
-              <a:alpha val="32000"/>
-            </a:srgbClr>
-          </a:outerShdw>
-        </a:effectLst>
-      </dsp:spPr>
-      <dsp:style>
-        <a:lnRef idx="0">
-          <a:scrgbClr r="0" g="0" b="0"/>
-        </a:lnRef>
-        <a:fillRef idx="3">
-          <a:scrgbClr r="0" g="0" b="0"/>
-        </a:fillRef>
-        <a:effectRef idx="2">
-          <a:scrgbClr r="0" g="0" b="0"/>
-        </a:effectRef>
-        <a:fontRef idx="minor">
-          <a:schemeClr val="lt1"/>
-        </a:fontRef>
-      </dsp:style>
-      <dsp:txBody>
-        <a:bodyPr spcFirstLastPara="0" vert="horz" wrap="square" lIns="17780" tIns="17780" rIns="17780" bIns="17780" numCol="1" spcCol="1270" anchor="ctr" anchorCtr="0">
-          <a:noAutofit/>
-        </a:bodyPr>
-        <a:lstStyle/>
-        <a:p>
-          <a:pPr lvl="0" algn="ctr" defTabSz="1244600">
-            <a:lnSpc>
-              <a:spcPct val="90000"/>
-            </a:lnSpc>
-            <a:spcBef>
-              <a:spcPct val="0"/>
-            </a:spcBef>
-            <a:spcAft>
-              <a:spcPct val="35000"/>
-            </a:spcAft>
-          </a:pPr>
-          <a:r>
-            <a:rPr lang="en-US" sz="2800" kern="1200" dirty="0" smtClean="0"/>
-            <a:t>Child 3</a:t>
-          </a:r>
-          <a:endParaRPr lang="en-US" sz="2800" kern="1200" dirty="0"/>
-        </a:p>
-      </dsp:txBody>
-      <dsp:txXfrm>
-        <a:off x="4149998" y="2598955"/>
-        <a:ext cx="2073792" cy="856939"/>
-      </dsp:txXfrm>
-    </dsp:sp>
-    <dsp:sp modelId="{4E2303F9-ACF3-FD4C-9843-B67245D94037}">
-      <dsp:nvSpPr>
-        <dsp:cNvPr id="0" name=""/>
-        <dsp:cNvSpPr/>
-      </dsp:nvSpPr>
-      <dsp:spPr>
-        <a:xfrm>
-          <a:off x="2361789" y="1309279"/>
-          <a:ext cx="1713878" cy="856939"/>
-        </a:xfrm>
-        <a:prstGeom prst="rect">
-          <a:avLst/>
-        </a:prstGeom>
-        <a:gradFill rotWithShape="0">
-          <a:gsLst>
-            <a:gs pos="0">
-              <a:schemeClr val="accent1">
-                <a:hueOff val="0"/>
-                <a:satOff val="0"/>
-                <a:lumOff val="0"/>
-                <a:alphaOff val="0"/>
-              </a:schemeClr>
-            </a:gs>
-            <a:gs pos="100000">
-              <a:schemeClr val="accent1">
-                <a:hueOff val="0"/>
-                <a:satOff val="0"/>
-                <a:lumOff val="0"/>
-                <a:alphaOff val="0"/>
-                <a:shade val="76000"/>
-                <a:lumMod val="90000"/>
-              </a:schemeClr>
-            </a:gs>
-          </a:gsLst>
-          <a:lin ang="5400000" scaled="0"/>
-        </a:gradFill>
-        <a:ln>
-          <a:noFill/>
-        </a:ln>
-        <a:effectLst>
-          <a:outerShdw blurRad="38100" dist="38100" dir="4800000" sx="98000" sy="98000" rotWithShape="0">
-            <a:srgbClr val="000000">
-              <a:alpha val="32000"/>
-            </a:srgbClr>
-          </a:outerShdw>
-        </a:effectLst>
-      </dsp:spPr>
-      <dsp:style>
-        <a:lnRef idx="0">
-          <a:scrgbClr r="0" g="0" b="0"/>
-        </a:lnRef>
-        <a:fillRef idx="3">
-          <a:scrgbClr r="0" g="0" b="0"/>
-        </a:fillRef>
-        <a:effectRef idx="2">
-          <a:scrgbClr r="0" g="0" b="0"/>
-        </a:effectRef>
-        <a:fontRef idx="minor">
-          <a:schemeClr val="lt1"/>
-        </a:fontRef>
-      </dsp:style>
-      <dsp:txBody>
-        <a:bodyPr spcFirstLastPara="0" vert="horz" wrap="square" lIns="17780" tIns="17780" rIns="17780" bIns="17780" numCol="1" spcCol="1270" anchor="ctr" anchorCtr="0">
-          <a:noAutofit/>
-        </a:bodyPr>
-        <a:lstStyle/>
-        <a:p>
-          <a:pPr lvl="0" algn="ctr" defTabSz="1244600">
-            <a:lnSpc>
-              <a:spcPct val="90000"/>
-            </a:lnSpc>
-            <a:spcBef>
-              <a:spcPct val="0"/>
-            </a:spcBef>
-            <a:spcAft>
-              <a:spcPct val="35000"/>
-            </a:spcAft>
-          </a:pPr>
-          <a:r>
-            <a:rPr lang="en-US" sz="2800" kern="1200" dirty="0" smtClean="0"/>
-            <a:t>Our Page</a:t>
-          </a:r>
-          <a:endParaRPr lang="en-US" sz="2800" kern="1200" dirty="0"/>
-        </a:p>
-      </dsp:txBody>
-      <dsp:txXfrm>
-        <a:off x="2361789" y="1309279"/>
-        <a:ext cx="1713878" cy="856939"/>
-      </dsp:txXfrm>
-    </dsp:sp>
   </dsp:spTree>
 </dsp:drawing>
 </file>
@@ -9747,688 +8377,6 @@
       <dsp:cNvGrpSpPr/>
     </dsp:nvGrpSpPr>
     <dsp:grpSpPr/>
-    <dsp:sp modelId="{0CE327EB-0566-8748-BFA4-085F7A19257C}">
-      <dsp:nvSpPr>
-        <dsp:cNvPr id="0" name=""/>
-        <dsp:cNvSpPr/>
-      </dsp:nvSpPr>
-      <dsp:spPr>
-        <a:xfrm>
-          <a:off x="3120813" y="975652"/>
-          <a:ext cx="898290" cy="782087"/>
-        </a:xfrm>
-        <a:custGeom>
-          <a:avLst/>
-          <a:gdLst/>
-          <a:ahLst/>
-          <a:cxnLst/>
-          <a:rect l="0" t="0" r="0" b="0"/>
-          <a:pathLst>
-            <a:path>
-              <a:moveTo>
-                <a:pt x="0" y="0"/>
-              </a:moveTo>
-              <a:lnTo>
-                <a:pt x="898290" y="782087"/>
-              </a:lnTo>
-            </a:path>
-          </a:pathLst>
-        </a:custGeom>
-        <a:noFill/>
-        <a:ln w="9525" cap="flat" cmpd="sng" algn="ctr">
-          <a:solidFill>
-            <a:schemeClr val="accent1">
-              <a:shade val="60000"/>
-              <a:hueOff val="0"/>
-              <a:satOff val="0"/>
-              <a:lumOff val="0"/>
-              <a:alphaOff val="0"/>
-            </a:schemeClr>
-          </a:solidFill>
-          <a:prstDash val="solid"/>
-        </a:ln>
-        <a:effectLst/>
-      </dsp:spPr>
-      <dsp:style>
-        <a:lnRef idx="1">
-          <a:scrgbClr r="0" g="0" b="0"/>
-        </a:lnRef>
-        <a:fillRef idx="0">
-          <a:scrgbClr r="0" g="0" b="0"/>
-        </a:fillRef>
-        <a:effectRef idx="0">
-          <a:scrgbClr r="0" g="0" b="0"/>
-        </a:effectRef>
-        <a:fontRef idx="minor"/>
-      </dsp:style>
-    </dsp:sp>
-    <dsp:sp modelId="{7E74B830-BF27-934F-AE86-49257B5A48EB}">
-      <dsp:nvSpPr>
-        <dsp:cNvPr id="0" name=""/>
-        <dsp:cNvSpPr/>
-      </dsp:nvSpPr>
-      <dsp:spPr>
-        <a:xfrm>
-          <a:off x="3120813" y="975652"/>
-          <a:ext cx="2207998" cy="1678808"/>
-        </a:xfrm>
-        <a:custGeom>
-          <a:avLst/>
-          <a:gdLst/>
-          <a:ahLst/>
-          <a:cxnLst/>
-          <a:rect l="0" t="0" r="0" b="0"/>
-          <a:pathLst>
-            <a:path>
-              <a:moveTo>
-                <a:pt x="0" y="0"/>
-              </a:moveTo>
-              <a:lnTo>
-                <a:pt x="0" y="1487205"/>
-              </a:lnTo>
-              <a:lnTo>
-                <a:pt x="2207998" y="1487205"/>
-              </a:lnTo>
-              <a:lnTo>
-                <a:pt x="2207998" y="1678808"/>
-              </a:lnTo>
-            </a:path>
-          </a:pathLst>
-        </a:custGeom>
-        <a:noFill/>
-        <a:ln w="9525" cap="flat" cmpd="sng" algn="ctr">
-          <a:solidFill>
-            <a:schemeClr val="accent1">
-              <a:shade val="60000"/>
-              <a:hueOff val="0"/>
-              <a:satOff val="0"/>
-              <a:lumOff val="0"/>
-              <a:alphaOff val="0"/>
-            </a:schemeClr>
-          </a:solidFill>
-          <a:prstDash val="solid"/>
-        </a:ln>
-        <a:effectLst/>
-      </dsp:spPr>
-      <dsp:style>
-        <a:lnRef idx="1">
-          <a:scrgbClr r="0" g="0" b="0"/>
-        </a:lnRef>
-        <a:fillRef idx="0">
-          <a:scrgbClr r="0" g="0" b="0"/>
-        </a:fillRef>
-        <a:effectRef idx="0">
-          <a:scrgbClr r="0" g="0" b="0"/>
-        </a:effectRef>
-        <a:fontRef idx="minor"/>
-      </dsp:style>
-    </dsp:sp>
-    <dsp:sp modelId="{78958DEB-F014-4244-9F57-C93DFD0C6983}">
-      <dsp:nvSpPr>
-        <dsp:cNvPr id="0" name=""/>
-        <dsp:cNvSpPr/>
-      </dsp:nvSpPr>
-      <dsp:spPr>
-        <a:xfrm>
-          <a:off x="3075093" y="975652"/>
-          <a:ext cx="91440" cy="1678808"/>
-        </a:xfrm>
-        <a:custGeom>
-          <a:avLst/>
-          <a:gdLst/>
-          <a:ahLst/>
-          <a:cxnLst/>
-          <a:rect l="0" t="0" r="0" b="0"/>
-          <a:pathLst>
-            <a:path>
-              <a:moveTo>
-                <a:pt x="45720" y="0"/>
-              </a:moveTo>
-              <a:lnTo>
-                <a:pt x="45720" y="1678808"/>
-              </a:lnTo>
-            </a:path>
-          </a:pathLst>
-        </a:custGeom>
-        <a:noFill/>
-        <a:ln w="9525" cap="flat" cmpd="sng" algn="ctr">
-          <a:solidFill>
-            <a:schemeClr val="accent1">
-              <a:shade val="60000"/>
-              <a:hueOff val="0"/>
-              <a:satOff val="0"/>
-              <a:lumOff val="0"/>
-              <a:alphaOff val="0"/>
-            </a:schemeClr>
-          </a:solidFill>
-          <a:prstDash val="solid"/>
-        </a:ln>
-        <a:effectLst/>
-      </dsp:spPr>
-      <dsp:style>
-        <a:lnRef idx="1">
-          <a:scrgbClr r="0" g="0" b="0"/>
-        </a:lnRef>
-        <a:fillRef idx="0">
-          <a:scrgbClr r="0" g="0" b="0"/>
-        </a:fillRef>
-        <a:effectRef idx="0">
-          <a:scrgbClr r="0" g="0" b="0"/>
-        </a:effectRef>
-        <a:fontRef idx="minor"/>
-      </dsp:style>
-    </dsp:sp>
-    <dsp:sp modelId="{8D185E37-8DCA-364C-AB66-B2A89E254564}">
-      <dsp:nvSpPr>
-        <dsp:cNvPr id="0" name=""/>
-        <dsp:cNvSpPr/>
-      </dsp:nvSpPr>
-      <dsp:spPr>
-        <a:xfrm>
-          <a:off x="912815" y="975652"/>
-          <a:ext cx="2207998" cy="1678808"/>
-        </a:xfrm>
-        <a:custGeom>
-          <a:avLst/>
-          <a:gdLst/>
-          <a:ahLst/>
-          <a:cxnLst/>
-          <a:rect l="0" t="0" r="0" b="0"/>
-          <a:pathLst>
-            <a:path>
-              <a:moveTo>
-                <a:pt x="2207998" y="0"/>
-              </a:moveTo>
-              <a:lnTo>
-                <a:pt x="2207998" y="1487205"/>
-              </a:lnTo>
-              <a:lnTo>
-                <a:pt x="0" y="1487205"/>
-              </a:lnTo>
-              <a:lnTo>
-                <a:pt x="0" y="1678808"/>
-              </a:lnTo>
-            </a:path>
-          </a:pathLst>
-        </a:custGeom>
-        <a:noFill/>
-        <a:ln w="9525" cap="flat" cmpd="sng" algn="ctr">
-          <a:solidFill>
-            <a:schemeClr val="accent1">
-              <a:shade val="60000"/>
-              <a:hueOff val="0"/>
-              <a:satOff val="0"/>
-              <a:lumOff val="0"/>
-              <a:alphaOff val="0"/>
-            </a:schemeClr>
-          </a:solidFill>
-          <a:prstDash val="solid"/>
-        </a:ln>
-        <a:effectLst/>
-      </dsp:spPr>
-      <dsp:style>
-        <a:lnRef idx="1">
-          <a:scrgbClr r="0" g="0" b="0"/>
-        </a:lnRef>
-        <a:fillRef idx="0">
-          <a:scrgbClr r="0" g="0" b="0"/>
-        </a:fillRef>
-        <a:effectRef idx="0">
-          <a:scrgbClr r="0" g="0" b="0"/>
-        </a:effectRef>
-        <a:fontRef idx="minor"/>
-      </dsp:style>
-    </dsp:sp>
-    <dsp:sp modelId="{BCF50F19-E1D6-944F-A305-3A1881F3F899}">
-      <dsp:nvSpPr>
-        <dsp:cNvPr id="0" name=""/>
-        <dsp:cNvSpPr/>
-      </dsp:nvSpPr>
-      <dsp:spPr>
-        <a:xfrm>
-          <a:off x="2208417" y="63256"/>
-          <a:ext cx="1824792" cy="912396"/>
-        </a:xfrm>
-        <a:prstGeom prst="rect">
-          <a:avLst/>
-        </a:prstGeom>
-        <a:gradFill rotWithShape="0">
-          <a:gsLst>
-            <a:gs pos="0">
-              <a:schemeClr val="accent1">
-                <a:hueOff val="0"/>
-                <a:satOff val="0"/>
-                <a:lumOff val="0"/>
-                <a:alphaOff val="0"/>
-              </a:schemeClr>
-            </a:gs>
-            <a:gs pos="100000">
-              <a:schemeClr val="accent1">
-                <a:hueOff val="0"/>
-                <a:satOff val="0"/>
-                <a:lumOff val="0"/>
-                <a:alphaOff val="0"/>
-                <a:shade val="76000"/>
-                <a:lumMod val="90000"/>
-              </a:schemeClr>
-            </a:gs>
-          </a:gsLst>
-          <a:lin ang="5400000" scaled="0"/>
-        </a:gradFill>
-        <a:ln>
-          <a:noFill/>
-        </a:ln>
-        <a:effectLst>
-          <a:outerShdw blurRad="38100" dist="38100" dir="4800000" sx="98000" sy="98000" rotWithShape="0">
-            <a:srgbClr val="000000">
-              <a:alpha val="32000"/>
-            </a:srgbClr>
-          </a:outerShdw>
-        </a:effectLst>
-      </dsp:spPr>
-      <dsp:style>
-        <a:lnRef idx="0">
-          <a:scrgbClr r="0" g="0" b="0"/>
-        </a:lnRef>
-        <a:fillRef idx="3">
-          <a:scrgbClr r="0" g="0" b="0"/>
-        </a:fillRef>
-        <a:effectRef idx="2">
-          <a:scrgbClr r="0" g="0" b="0"/>
-        </a:effectRef>
-        <a:fontRef idx="minor">
-          <a:schemeClr val="lt1"/>
-        </a:fontRef>
-      </dsp:style>
-      <dsp:txBody>
-        <a:bodyPr spcFirstLastPara="0" vert="horz" wrap="square" lIns="19050" tIns="19050" rIns="19050" bIns="19050" numCol="1" spcCol="1270" anchor="ctr" anchorCtr="0">
-          <a:noAutofit/>
-        </a:bodyPr>
-        <a:lstStyle/>
-        <a:p>
-          <a:pPr lvl="0" algn="ctr" defTabSz="1333500">
-            <a:lnSpc>
-              <a:spcPct val="90000"/>
-            </a:lnSpc>
-            <a:spcBef>
-              <a:spcPct val="0"/>
-            </a:spcBef>
-            <a:spcAft>
-              <a:spcPct val="35000"/>
-            </a:spcAft>
-          </a:pPr>
-          <a:r>
-            <a:rPr lang="en-US" sz="3000" kern="1200" dirty="0" smtClean="0"/>
-            <a:t>Homepage</a:t>
-          </a:r>
-          <a:endParaRPr lang="en-US" sz="3000" kern="1200" dirty="0"/>
-        </a:p>
-      </dsp:txBody>
-      <dsp:txXfrm>
-        <a:off x="2208417" y="63256"/>
-        <a:ext cx="1824792" cy="912396"/>
-      </dsp:txXfrm>
-    </dsp:sp>
-    <dsp:sp modelId="{A6998BF2-0C7C-5E47-8FAD-A5F74D1A43B7}">
-      <dsp:nvSpPr>
-        <dsp:cNvPr id="0" name=""/>
-        <dsp:cNvSpPr/>
-      </dsp:nvSpPr>
-      <dsp:spPr>
-        <a:xfrm>
-          <a:off x="419" y="2654460"/>
-          <a:ext cx="1824792" cy="912396"/>
-        </a:xfrm>
-        <a:prstGeom prst="rect">
-          <a:avLst/>
-        </a:prstGeom>
-        <a:gradFill rotWithShape="0">
-          <a:gsLst>
-            <a:gs pos="0">
-              <a:schemeClr val="accent1">
-                <a:hueOff val="0"/>
-                <a:satOff val="0"/>
-                <a:lumOff val="0"/>
-                <a:alphaOff val="0"/>
-              </a:schemeClr>
-            </a:gs>
-            <a:gs pos="100000">
-              <a:schemeClr val="accent1">
-                <a:hueOff val="0"/>
-                <a:satOff val="0"/>
-                <a:lumOff val="0"/>
-                <a:alphaOff val="0"/>
-                <a:shade val="76000"/>
-                <a:lumMod val="90000"/>
-              </a:schemeClr>
-            </a:gs>
-          </a:gsLst>
-          <a:lin ang="5400000" scaled="0"/>
-        </a:gradFill>
-        <a:ln>
-          <a:noFill/>
-        </a:ln>
-        <a:effectLst>
-          <a:outerShdw blurRad="38100" dist="38100" dir="4800000" sx="98000" sy="98000" rotWithShape="0">
-            <a:srgbClr val="000000">
-              <a:alpha val="32000"/>
-            </a:srgbClr>
-          </a:outerShdw>
-        </a:effectLst>
-      </dsp:spPr>
-      <dsp:style>
-        <a:lnRef idx="0">
-          <a:scrgbClr r="0" g="0" b="0"/>
-        </a:lnRef>
-        <a:fillRef idx="3">
-          <a:scrgbClr r="0" g="0" b="0"/>
-        </a:fillRef>
-        <a:effectRef idx="2">
-          <a:scrgbClr r="0" g="0" b="0"/>
-        </a:effectRef>
-        <a:fontRef idx="minor">
-          <a:schemeClr val="lt1"/>
-        </a:fontRef>
-      </dsp:style>
-      <dsp:txBody>
-        <a:bodyPr spcFirstLastPara="0" vert="horz" wrap="square" lIns="19050" tIns="19050" rIns="19050" bIns="19050" numCol="1" spcCol="1270" anchor="ctr" anchorCtr="0">
-          <a:noAutofit/>
-        </a:bodyPr>
-        <a:lstStyle/>
-        <a:p>
-          <a:pPr lvl="0" algn="ctr" defTabSz="1333500">
-            <a:lnSpc>
-              <a:spcPct val="90000"/>
-            </a:lnSpc>
-            <a:spcBef>
-              <a:spcPct val="0"/>
-            </a:spcBef>
-            <a:spcAft>
-              <a:spcPct val="35000"/>
-            </a:spcAft>
-          </a:pPr>
-          <a:r>
-            <a:rPr lang="en-US" sz="3000" kern="1200" dirty="0" smtClean="0"/>
-            <a:t>Child 1</a:t>
-          </a:r>
-          <a:endParaRPr lang="en-US" sz="3000" kern="1200" dirty="0"/>
-        </a:p>
-      </dsp:txBody>
-      <dsp:txXfrm>
-        <a:off x="419" y="2654460"/>
-        <a:ext cx="1824792" cy="912396"/>
-      </dsp:txXfrm>
-    </dsp:sp>
-    <dsp:sp modelId="{1F6827FC-FA5C-C948-B5D8-A87E0C3058B3}">
-      <dsp:nvSpPr>
-        <dsp:cNvPr id="0" name=""/>
-        <dsp:cNvSpPr/>
-      </dsp:nvSpPr>
-      <dsp:spPr>
-        <a:xfrm>
-          <a:off x="2208417" y="2654460"/>
-          <a:ext cx="1824792" cy="912396"/>
-        </a:xfrm>
-        <a:prstGeom prst="rect">
-          <a:avLst/>
-        </a:prstGeom>
-        <a:gradFill rotWithShape="0">
-          <a:gsLst>
-            <a:gs pos="0">
-              <a:schemeClr val="accent1">
-                <a:hueOff val="0"/>
-                <a:satOff val="0"/>
-                <a:lumOff val="0"/>
-                <a:alphaOff val="0"/>
-              </a:schemeClr>
-            </a:gs>
-            <a:gs pos="100000">
-              <a:schemeClr val="accent1">
-                <a:hueOff val="0"/>
-                <a:satOff val="0"/>
-                <a:lumOff val="0"/>
-                <a:alphaOff val="0"/>
-                <a:shade val="76000"/>
-                <a:lumMod val="90000"/>
-              </a:schemeClr>
-            </a:gs>
-          </a:gsLst>
-          <a:lin ang="5400000" scaled="0"/>
-        </a:gradFill>
-        <a:ln>
-          <a:noFill/>
-        </a:ln>
-        <a:effectLst>
-          <a:outerShdw blurRad="38100" dist="38100" dir="4800000" sx="98000" sy="98000" rotWithShape="0">
-            <a:srgbClr val="000000">
-              <a:alpha val="32000"/>
-            </a:srgbClr>
-          </a:outerShdw>
-        </a:effectLst>
-      </dsp:spPr>
-      <dsp:style>
-        <a:lnRef idx="0">
-          <a:scrgbClr r="0" g="0" b="0"/>
-        </a:lnRef>
-        <a:fillRef idx="3">
-          <a:scrgbClr r="0" g="0" b="0"/>
-        </a:fillRef>
-        <a:effectRef idx="2">
-          <a:scrgbClr r="0" g="0" b="0"/>
-        </a:effectRef>
-        <a:fontRef idx="minor">
-          <a:schemeClr val="lt1"/>
-        </a:fontRef>
-      </dsp:style>
-      <dsp:txBody>
-        <a:bodyPr spcFirstLastPara="0" vert="horz" wrap="square" lIns="19050" tIns="19050" rIns="19050" bIns="19050" numCol="1" spcCol="1270" anchor="ctr" anchorCtr="0">
-          <a:noAutofit/>
-        </a:bodyPr>
-        <a:lstStyle/>
-        <a:p>
-          <a:pPr lvl="0" algn="ctr" defTabSz="1333500">
-            <a:lnSpc>
-              <a:spcPct val="90000"/>
-            </a:lnSpc>
-            <a:spcBef>
-              <a:spcPct val="0"/>
-            </a:spcBef>
-            <a:spcAft>
-              <a:spcPct val="35000"/>
-            </a:spcAft>
-          </a:pPr>
-          <a:r>
-            <a:rPr lang="en-US" sz="3000" kern="1200" dirty="0" smtClean="0"/>
-            <a:t>Child 2</a:t>
-          </a:r>
-          <a:endParaRPr lang="en-US" sz="3000" kern="1200" dirty="0"/>
-        </a:p>
-      </dsp:txBody>
-      <dsp:txXfrm>
-        <a:off x="2208417" y="2654460"/>
-        <a:ext cx="1824792" cy="912396"/>
-      </dsp:txXfrm>
-    </dsp:sp>
-    <dsp:sp modelId="{6B9D1F3C-082B-9D40-935D-2EEE06F9AB53}">
-      <dsp:nvSpPr>
-        <dsp:cNvPr id="0" name=""/>
-        <dsp:cNvSpPr/>
-      </dsp:nvSpPr>
-      <dsp:spPr>
-        <a:xfrm>
-          <a:off x="4416415" y="2654460"/>
-          <a:ext cx="1824792" cy="912396"/>
-        </a:xfrm>
-        <a:prstGeom prst="rect">
-          <a:avLst/>
-        </a:prstGeom>
-        <a:gradFill rotWithShape="0">
-          <a:gsLst>
-            <a:gs pos="0">
-              <a:schemeClr val="accent1">
-                <a:hueOff val="0"/>
-                <a:satOff val="0"/>
-                <a:lumOff val="0"/>
-                <a:alphaOff val="0"/>
-              </a:schemeClr>
-            </a:gs>
-            <a:gs pos="100000">
-              <a:schemeClr val="accent1">
-                <a:hueOff val="0"/>
-                <a:satOff val="0"/>
-                <a:lumOff val="0"/>
-                <a:alphaOff val="0"/>
-                <a:shade val="76000"/>
-                <a:lumMod val="90000"/>
-              </a:schemeClr>
-            </a:gs>
-          </a:gsLst>
-          <a:lin ang="5400000" scaled="0"/>
-        </a:gradFill>
-        <a:ln>
-          <a:noFill/>
-        </a:ln>
-        <a:effectLst>
-          <a:outerShdw blurRad="38100" dist="38100" dir="4800000" sx="98000" sy="98000" rotWithShape="0">
-            <a:srgbClr val="000000">
-              <a:alpha val="32000"/>
-            </a:srgbClr>
-          </a:outerShdw>
-        </a:effectLst>
-      </dsp:spPr>
-      <dsp:style>
-        <a:lnRef idx="0">
-          <a:scrgbClr r="0" g="0" b="0"/>
-        </a:lnRef>
-        <a:fillRef idx="3">
-          <a:scrgbClr r="0" g="0" b="0"/>
-        </a:fillRef>
-        <a:effectRef idx="2">
-          <a:scrgbClr r="0" g="0" b="0"/>
-        </a:effectRef>
-        <a:fontRef idx="minor">
-          <a:schemeClr val="lt1"/>
-        </a:fontRef>
-      </dsp:style>
-      <dsp:txBody>
-        <a:bodyPr spcFirstLastPara="0" vert="horz" wrap="square" lIns="19050" tIns="19050" rIns="19050" bIns="19050" numCol="1" spcCol="1270" anchor="ctr" anchorCtr="0">
-          <a:noAutofit/>
-        </a:bodyPr>
-        <a:lstStyle/>
-        <a:p>
-          <a:pPr lvl="0" algn="ctr" defTabSz="1333500">
-            <a:lnSpc>
-              <a:spcPct val="90000"/>
-            </a:lnSpc>
-            <a:spcBef>
-              <a:spcPct val="0"/>
-            </a:spcBef>
-            <a:spcAft>
-              <a:spcPct val="35000"/>
-            </a:spcAft>
-          </a:pPr>
-          <a:r>
-            <a:rPr lang="en-US" sz="3000" kern="1200" dirty="0" smtClean="0"/>
-            <a:t>Child 3</a:t>
-          </a:r>
-          <a:endParaRPr lang="en-US" sz="3000" kern="1200" dirty="0"/>
-        </a:p>
-      </dsp:txBody>
-      <dsp:txXfrm>
-        <a:off x="4416415" y="2654460"/>
-        <a:ext cx="1824792" cy="912396"/>
-      </dsp:txXfrm>
-    </dsp:sp>
-    <dsp:sp modelId="{4E2303F9-ACF3-FD4C-9843-B67245D94037}">
-      <dsp:nvSpPr>
-        <dsp:cNvPr id="0" name=""/>
-        <dsp:cNvSpPr/>
-      </dsp:nvSpPr>
-      <dsp:spPr>
-        <a:xfrm>
-          <a:off x="2194311" y="1301541"/>
-          <a:ext cx="1824792" cy="912396"/>
-        </a:xfrm>
-        <a:prstGeom prst="rect">
-          <a:avLst/>
-        </a:prstGeom>
-        <a:gradFill rotWithShape="0">
-          <a:gsLst>
-            <a:gs pos="0">
-              <a:schemeClr val="accent1">
-                <a:hueOff val="0"/>
-                <a:satOff val="0"/>
-                <a:lumOff val="0"/>
-                <a:alphaOff val="0"/>
-              </a:schemeClr>
-            </a:gs>
-            <a:gs pos="100000">
-              <a:schemeClr val="accent1">
-                <a:hueOff val="0"/>
-                <a:satOff val="0"/>
-                <a:lumOff val="0"/>
-                <a:alphaOff val="0"/>
-                <a:shade val="76000"/>
-                <a:lumMod val="90000"/>
-              </a:schemeClr>
-            </a:gs>
-          </a:gsLst>
-          <a:lin ang="5400000" scaled="0"/>
-        </a:gradFill>
-        <a:ln>
-          <a:noFill/>
-        </a:ln>
-        <a:effectLst>
-          <a:outerShdw blurRad="38100" dist="38100" dir="4800000" sx="98000" sy="98000" rotWithShape="0">
-            <a:srgbClr val="000000">
-              <a:alpha val="32000"/>
-            </a:srgbClr>
-          </a:outerShdw>
-        </a:effectLst>
-      </dsp:spPr>
-      <dsp:style>
-        <a:lnRef idx="0">
-          <a:scrgbClr r="0" g="0" b="0"/>
-        </a:lnRef>
-        <a:fillRef idx="3">
-          <a:scrgbClr r="0" g="0" b="0"/>
-        </a:fillRef>
-        <a:effectRef idx="2">
-          <a:scrgbClr r="0" g="0" b="0"/>
-        </a:effectRef>
-        <a:fontRef idx="minor">
-          <a:schemeClr val="lt1"/>
-        </a:fontRef>
-      </dsp:style>
-      <dsp:txBody>
-        <a:bodyPr spcFirstLastPara="0" vert="horz" wrap="square" lIns="19050" tIns="19050" rIns="19050" bIns="19050" numCol="1" spcCol="1270" anchor="ctr" anchorCtr="0">
-          <a:noAutofit/>
-        </a:bodyPr>
-        <a:lstStyle/>
-        <a:p>
-          <a:pPr lvl="0" algn="ctr" defTabSz="1333500">
-            <a:lnSpc>
-              <a:spcPct val="90000"/>
-            </a:lnSpc>
-            <a:spcBef>
-              <a:spcPct val="0"/>
-            </a:spcBef>
-            <a:spcAft>
-              <a:spcPct val="35000"/>
-            </a:spcAft>
-          </a:pPr>
-          <a:r>
-            <a:rPr lang="en-US" sz="3000" kern="1200" dirty="0" smtClean="0"/>
-            <a:t>Our Page</a:t>
-          </a:r>
-          <a:endParaRPr lang="en-US" sz="3000" kern="1200" dirty="0"/>
-        </a:p>
-      </dsp:txBody>
-      <dsp:txXfrm>
-        <a:off x="2194311" y="1301541"/>
-        <a:ext cx="1824792" cy="912396"/>
-      </dsp:txXfrm>
-    </dsp:sp>
   </dsp:spTree>
 </dsp:drawing>
 </file>
@@ -20637,7 +18585,7 @@
           <a:p>
             <a:fld id="{9B5D41C8-0A92-DD47-AB00-F0EFFD66679B}" type="datetimeFigureOut">
               <a:rPr lang="en-US" smtClean="0"/>
-              <a:t>9/19/11</a:t>
+              <a:t>9/20/11</a:t>
             </a:fld>
             <a:endParaRPr lang="en-US"/>
           </a:p>
@@ -22490,15 +20438,7 @@
           <a:p>
             <a:r>
               <a:rPr lang="en-US" dirty="0" smtClean="0"/>
-              <a:t>Break – </a:t>
-            </a:r>
-            <a:r>
-              <a:rPr lang="en-US" dirty="0" smtClean="0"/>
-              <a:t>8 </a:t>
-            </a:r>
-            <a:r>
-              <a:rPr lang="en-US" dirty="0" smtClean="0"/>
-              <a:t>minutes</a:t>
+              <a:t>Break – 8 minutes</a:t>
             </a:r>
             <a:endParaRPr lang="en-US" dirty="0"/>
           </a:p>
@@ -24056,7 +21996,7 @@
             <a:fld id="{B7C3F878-F5E8-489B-AC8A-64F2A7E22C28}" type="datetimeFigureOut">
               <a:rPr lang="en-US" smtClean="0"/>
               <a:pPr/>
-              <a:t>9/19/11</a:t>
+              <a:t>9/20/11</a:t>
             </a:fld>
             <a:endParaRPr lang="en-US"/>
           </a:p>
@@ -24263,7 +22203,7 @@
             <a:fld id="{B7C3F878-F5E8-489B-AC8A-64F2A7E22C28}" type="datetimeFigureOut">
               <a:rPr lang="en-US" smtClean="0"/>
               <a:pPr/>
-              <a:t>9/19/11</a:t>
+              <a:t>9/20/11</a:t>
             </a:fld>
             <a:endParaRPr lang="en-US"/>
           </a:p>
@@ -24470,7 +22410,7 @@
             <a:fld id="{B7C3F878-F5E8-489B-AC8A-64F2A7E22C28}" type="datetimeFigureOut">
               <a:rPr lang="en-US" smtClean="0"/>
               <a:pPr/>
-              <a:t>9/19/11</a:t>
+              <a:t>9/20/11</a:t>
             </a:fld>
             <a:endParaRPr lang="en-US"/>
           </a:p>
@@ -24663,7 +22603,7 @@
             <a:fld id="{B7C3F878-F5E8-489B-AC8A-64F2A7E22C28}" type="datetimeFigureOut">
               <a:rPr lang="en-US" smtClean="0"/>
               <a:pPr/>
-              <a:t>9/19/11</a:t>
+              <a:t>9/20/11</a:t>
             </a:fld>
             <a:endParaRPr lang="en-US"/>
           </a:p>
@@ -24904,7 +22844,7 @@
             <a:fld id="{B7C3F878-F5E8-489B-AC8A-64F2A7E22C28}" type="datetimeFigureOut">
               <a:rPr lang="en-US" smtClean="0"/>
               <a:pPr/>
-              <a:t>9/19/11</a:t>
+              <a:t>9/20/11</a:t>
             </a:fld>
             <a:endParaRPr lang="en-US"/>
           </a:p>
@@ -25019,7 +22959,7 @@
             <a:fld id="{B7C3F878-F5E8-489B-AC8A-64F2A7E22C28}" type="datetimeFigureOut">
               <a:rPr lang="en-US" smtClean="0"/>
               <a:pPr/>
-              <a:t>9/19/11</a:t>
+              <a:t>9/20/11</a:t>
             </a:fld>
             <a:endParaRPr lang="en-US"/>
           </a:p>
@@ -25446,7 +23386,7 @@
             <a:fld id="{B7C3F878-F5E8-489B-AC8A-64F2A7E22C28}" type="datetimeFigureOut">
               <a:rPr lang="en-US" smtClean="0"/>
               <a:pPr/>
-              <a:t>9/19/11</a:t>
+              <a:t>9/20/11</a:t>
             </a:fld>
             <a:endParaRPr lang="en-US"/>
           </a:p>
@@ -25727,7 +23667,7 @@
             <a:fld id="{B7C3F878-F5E8-489B-AC8A-64F2A7E22C28}" type="datetimeFigureOut">
               <a:rPr lang="en-US" smtClean="0"/>
               <a:pPr/>
-              <a:t>9/19/11</a:t>
+              <a:t>9/20/11</a:t>
             </a:fld>
             <a:endParaRPr lang="en-US"/>
           </a:p>
@@ -25819,7 +23759,7 @@
             <a:fld id="{B7C3F878-F5E8-489B-AC8A-64F2A7E22C28}" type="datetimeFigureOut">
               <a:rPr lang="en-US" smtClean="0"/>
               <a:pPr/>
-              <a:t>9/19/11</a:t>
+              <a:t>9/20/11</a:t>
             </a:fld>
             <a:endParaRPr lang="en-US"/>
           </a:p>
@@ -26658,7 +24598,7 @@
             <a:fld id="{B7C3F878-F5E8-489B-AC8A-64F2A7E22C28}" type="datetimeFigureOut">
               <a:rPr lang="en-US" smtClean="0"/>
               <a:pPr/>
-              <a:t>9/19/11</a:t>
+              <a:t>9/20/11</a:t>
             </a:fld>
             <a:endParaRPr lang="en-US"/>
           </a:p>
@@ -27491,7 +25431,7 @@
             <a:fld id="{B7C3F878-F5E8-489B-AC8A-64F2A7E22C28}" type="datetimeFigureOut">
               <a:rPr lang="en-US" smtClean="0"/>
               <a:pPr/>
-              <a:t>9/19/11</a:t>
+              <a:t>9/20/11</a:t>
             </a:fld>
             <a:endParaRPr lang="en-US"/>
           </a:p>
@@ -28147,7 +26087,7 @@
             <a:fld id="{B7C3F878-F5E8-489B-AC8A-64F2A7E22C28}" type="datetimeFigureOut">
               <a:rPr lang="en-US" smtClean="0"/>
               <a:pPr/>
-              <a:t>9/19/11</a:t>
+              <a:t>9/20/11</a:t>
             </a:fld>
             <a:endParaRPr lang="en-US" dirty="0"/>
           </a:p>
@@ -36469,13 +34409,8 @@
           <a:p>
             <a:r>
               <a:rPr lang="en-US" dirty="0" smtClean="0"/>
-              <a:t>Consistent and/or </a:t>
-            </a:r>
-            <a:r>
-              <a:rPr lang="en-US" dirty="0" smtClean="0"/>
-              <a:t>permanent</a:t>
-            </a:r>
-            <a:endParaRPr lang="en-US" dirty="0" smtClean="0"/>
+              <a:t>Consistent and/or permanent</a:t>
+            </a:r>
           </a:p>
           <a:p>
             <a:r>
@@ -37269,7 +35204,9 @@
         </p:nvSpPr>
         <p:spPr/>
         <p:txBody>
-          <a:bodyPr/>
+          <a:bodyPr>
+            <a:normAutofit fontScale="92500" lnSpcReduction="10000"/>
+          </a:bodyPr>
           <a:lstStyle/>
           <a:p>
             <a:pPr>
@@ -37366,17 +35303,67 @@
           <a:p>
             <a:r>
               <a:rPr lang="en-US" dirty="0"/>
-              <a:t>Beth - </a:t>
-            </a:r>
-            <a:r>
-              <a:rPr lang="en-US" u="sng" dirty="0">
+              <a:t>Kendra - </a:t>
+            </a:r>
+            <a:r>
+              <a:rPr lang="en-US" dirty="0">
                 <a:hlinkClick r:id="rId7"/>
               </a:rPr>
+              <a:t>http://www.hulu.com</a:t>
+            </a:r>
+            <a:r>
+              <a:rPr lang="en-US" smtClean="0">
+                <a:hlinkClick r:id="rId7"/>
+              </a:rPr>
+              <a:t>/</a:t>
+            </a:r>
+            <a:r>
+              <a:rPr lang="en-US" smtClean="0"/>
+              <a:t> </a:t>
+            </a:r>
+            <a:endParaRPr lang="en-US" dirty="0" smtClean="0"/>
+          </a:p>
+          <a:p>
+            <a:r>
+              <a:rPr lang="en-US" dirty="0" err="1" smtClean="0"/>
+              <a:t>Kameron</a:t>
+            </a:r>
+            <a:r>
+              <a:rPr lang="en-US" dirty="0"/>
+              <a:t> - </a:t>
+            </a:r>
+            <a:r>
+              <a:rPr lang="en-US" dirty="0">
+                <a:hlinkClick r:id="rId8"/>
+              </a:rPr>
+              <a:t>http://www.invisiblechildren.com/</a:t>
+            </a:r>
+            <a:r>
+              <a:rPr lang="en-US" dirty="0" smtClean="0">
+                <a:hlinkClick r:id="rId8"/>
+              </a:rPr>
+              <a:t>about</a:t>
+            </a:r>
+            <a:r>
+              <a:rPr lang="en-US" dirty="0" smtClean="0"/>
+              <a:t> </a:t>
+            </a:r>
+            <a:endParaRPr lang="en-US" dirty="0" smtClean="0"/>
+          </a:p>
+          <a:p>
+            <a:r>
+              <a:rPr lang="en-US" dirty="0"/>
+              <a:t>Beth - </a:t>
+            </a:r>
+            <a:r>
+              <a:rPr lang="en-US" u="sng" dirty="0">
+                <a:hlinkClick r:id="rId9"/>
+              </a:rPr>
               <a:t>http://mrdoob.com/projects/chromeexperiments/google_gravity</a:t>
             </a:r>
             <a:r>
               <a:rPr lang="en-US" u="sng" dirty="0" smtClean="0">
-                <a:hlinkClick r:id="rId7"/>
+                <a:hlinkClick r:id="rId9"/>
               </a:rPr>
               <a:t>/</a:t>
             </a:r>

</xml_diff>

<commit_message>
Minor tweak to HTML example for media tags.
</commit_message>
<xml_diff>
--- a/slides/classtwo/slides.pptx
+++ b/slides/classtwo/slides.pptx
@@ -6752,6 +6752,43 @@
         </a:p>
       </dgm:t>
     </dgm:pt>
+    <dgm:pt modelId="{C0465615-090E-D848-AA39-07F7D3A3CFD5}" type="asst">
+      <dgm:prSet phldrT="[Text]"/>
+      <dgm:spPr/>
+      <dgm:t>
+        <a:bodyPr/>
+        <a:lstStyle/>
+        <a:p>
+          <a:r>
+            <a:rPr lang="en-US" dirty="0" smtClean="0"/>
+            <a:t>Your Page</a:t>
+          </a:r>
+          <a:endParaRPr lang="en-US" dirty="0"/>
+        </a:p>
+      </dgm:t>
+    </dgm:pt>
+    <dgm:pt modelId="{F3FA9A33-7533-D546-8048-4B52782BD5AA}" type="parTrans" cxnId="{0C1DCD5C-1646-5A4F-8762-0A39CC1C5412}">
+      <dgm:prSet/>
+      <dgm:spPr/>
+      <dgm:t>
+        <a:bodyPr/>
+        <a:lstStyle/>
+        <a:p>
+          <a:endParaRPr lang="en-US"/>
+        </a:p>
+      </dgm:t>
+    </dgm:pt>
+    <dgm:pt modelId="{45B9A89E-F758-B64A-8149-310A4C58D698}" type="sibTrans" cxnId="{0C1DCD5C-1646-5A4F-8762-0A39CC1C5412}">
+      <dgm:prSet/>
+      <dgm:spPr/>
+      <dgm:t>
+        <a:bodyPr/>
+        <a:lstStyle/>
+        <a:p>
+          <a:endParaRPr lang="en-US"/>
+        </a:p>
+      </dgm:t>
+    </dgm:pt>
     <dgm:pt modelId="{85644386-30A6-9F44-8B73-004B38C39289}" type="pres">
       <dgm:prSet presAssocID="{6F7E240C-0523-FD48-8161-BEF31F9E2217}" presName="hierChild1" presStyleCnt="0">
         <dgm:presLayoutVars>
@@ -6815,7 +6852,7 @@
       <dgm:spPr/>
     </dgm:pt>
     <dgm:pt modelId="{8D185E37-8DCA-364C-AB66-B2A89E254564}" type="pres">
-      <dgm:prSet presAssocID="{8B25173B-687C-3A45-A9E7-14E1DA0D970F}" presName="Name37" presStyleLbl="parChTrans1D2" presStyleIdx="0" presStyleCnt="4"/>
+      <dgm:prSet presAssocID="{8B25173B-687C-3A45-A9E7-14E1DA0D970F}" presName="Name37" presStyleLbl="parChTrans1D2" presStyleIdx="0" presStyleCnt="5"/>
       <dgm:spPr/>
       <dgm:t>
         <a:bodyPr/>
@@ -6872,7 +6909,7 @@
       <dgm:spPr/>
     </dgm:pt>
     <dgm:pt modelId="{78958DEB-F014-4244-9F57-C93DFD0C6983}" type="pres">
-      <dgm:prSet presAssocID="{CFC2E973-1EA4-364D-8B93-878D86EE0FA4}" presName="Name37" presStyleLbl="parChTrans1D2" presStyleIdx="1" presStyleCnt="4"/>
+      <dgm:prSet presAssocID="{CFC2E973-1EA4-364D-8B93-878D86EE0FA4}" presName="Name37" presStyleLbl="parChTrans1D2" presStyleIdx="1" presStyleCnt="5"/>
       <dgm:spPr/>
       <dgm:t>
         <a:bodyPr/>
@@ -6929,7 +6966,7 @@
       <dgm:spPr/>
     </dgm:pt>
     <dgm:pt modelId="{7E74B830-BF27-934F-AE86-49257B5A48EB}" type="pres">
-      <dgm:prSet presAssocID="{F9C956E6-272D-184D-A757-2C4F9D5903CE}" presName="Name37" presStyleLbl="parChTrans1D2" presStyleIdx="2" presStyleCnt="4"/>
+      <dgm:prSet presAssocID="{F9C956E6-272D-184D-A757-2C4F9D5903CE}" presName="Name37" presStyleLbl="parChTrans1D2" presStyleIdx="2" presStyleCnt="5"/>
       <dgm:spPr/>
       <dgm:t>
         <a:bodyPr/>
@@ -6990,7 +7027,7 @@
       <dgm:spPr/>
     </dgm:pt>
     <dgm:pt modelId="{0CE327EB-0566-8748-BFA4-085F7A19257C}" type="pres">
-      <dgm:prSet presAssocID="{F685E825-1930-B64C-923F-609466183635}" presName="Name111" presStyleLbl="parChTrans1D2" presStyleIdx="3" presStyleCnt="4"/>
+      <dgm:prSet presAssocID="{F685E825-1930-B64C-923F-609466183635}" presName="Name111" presStyleLbl="parChTrans1D2" presStyleIdx="3" presStyleCnt="5"/>
       <dgm:spPr/>
       <dgm:t>
         <a:bodyPr/>
@@ -7013,7 +7050,7 @@
       <dgm:spPr/>
     </dgm:pt>
     <dgm:pt modelId="{4E2303F9-ACF3-FD4C-9843-B67245D94037}" type="pres">
-      <dgm:prSet presAssocID="{00F9853C-3FCE-7C43-A0B1-02C3B15FD044}" presName="rootText3" presStyleLbl="asst1" presStyleIdx="0" presStyleCnt="1" custLinFactNeighborX="59727" custLinFactNeighborY="-6282">
+      <dgm:prSet presAssocID="{00F9853C-3FCE-7C43-A0B1-02C3B15FD044}" presName="rootText3" presStyleLbl="asst1" presStyleIdx="0" presStyleCnt="2" custLinFactNeighborX="59727" custLinFactNeighborY="-6282">
         <dgm:presLayoutVars>
           <dgm:chPref val="3"/>
         </dgm:presLayoutVars>
@@ -7028,7 +7065,7 @@
       </dgm:t>
     </dgm:pt>
     <dgm:pt modelId="{46622B6C-940B-9445-8EC8-73F4615404AC}" type="pres">
-      <dgm:prSet presAssocID="{00F9853C-3FCE-7C43-A0B1-02C3B15FD044}" presName="rootConnector3" presStyleLbl="asst1" presStyleIdx="0" presStyleCnt="1"/>
+      <dgm:prSet presAssocID="{00F9853C-3FCE-7C43-A0B1-02C3B15FD044}" presName="rootConnector3" presStyleLbl="asst1" presStyleIdx="0" presStyleCnt="2"/>
       <dgm:spPr/>
       <dgm:t>
         <a:bodyPr/>
@@ -7046,27 +7083,81 @@
       <dgm:prSet presAssocID="{00F9853C-3FCE-7C43-A0B1-02C3B15FD044}" presName="hierChild7" presStyleCnt="0"/>
       <dgm:spPr/>
     </dgm:pt>
+    <dgm:pt modelId="{449C0065-964B-2445-BAD8-1B050D81108E}" type="pres">
+      <dgm:prSet presAssocID="{F3FA9A33-7533-D546-8048-4B52782BD5AA}" presName="Name111" presStyleLbl="parChTrans1D2" presStyleIdx="4" presStyleCnt="5"/>
+      <dgm:spPr/>
+    </dgm:pt>
+    <dgm:pt modelId="{403879B0-372D-F344-858D-3A8FC08563DD}" type="pres">
+      <dgm:prSet presAssocID="{C0465615-090E-D848-AA39-07F7D3A3CFD5}" presName="hierRoot3" presStyleCnt="0">
+        <dgm:presLayoutVars>
+          <dgm:hierBranch val="init"/>
+        </dgm:presLayoutVars>
+      </dgm:prSet>
+      <dgm:spPr/>
+    </dgm:pt>
+    <dgm:pt modelId="{EC7429A5-997B-1247-93A2-EEBF2F2CB7CD}" type="pres">
+      <dgm:prSet presAssocID="{C0465615-090E-D848-AA39-07F7D3A3CFD5}" presName="rootComposite3" presStyleCnt="0"/>
+      <dgm:spPr/>
+    </dgm:pt>
+    <dgm:pt modelId="{2933DB08-27E9-C746-B6A8-538B198985C7}" type="pres">
+      <dgm:prSet presAssocID="{C0465615-090E-D848-AA39-07F7D3A3CFD5}" presName="rootText3" presStyleLbl="asst1" presStyleIdx="1" presStyleCnt="2" custLinFactNeighborX="60523" custLinFactNeighborY="-69193">
+        <dgm:presLayoutVars>
+          <dgm:chPref val="3"/>
+        </dgm:presLayoutVars>
+      </dgm:prSet>
+      <dgm:spPr/>
+      <dgm:t>
+        <a:bodyPr/>
+        <a:lstStyle/>
+        <a:p>
+          <a:endParaRPr lang="en-US"/>
+        </a:p>
+      </dgm:t>
+    </dgm:pt>
+    <dgm:pt modelId="{0BE51D93-3649-2845-9A07-B2CE1D905866}" type="pres">
+      <dgm:prSet presAssocID="{C0465615-090E-D848-AA39-07F7D3A3CFD5}" presName="rootConnector3" presStyleLbl="asst1" presStyleIdx="1" presStyleCnt="2"/>
+      <dgm:spPr/>
+      <dgm:t>
+        <a:bodyPr/>
+        <a:lstStyle/>
+        <a:p>
+          <a:endParaRPr lang="en-US"/>
+        </a:p>
+      </dgm:t>
+    </dgm:pt>
+    <dgm:pt modelId="{ADCDA6B3-7045-2143-BF82-612656E133B9}" type="pres">
+      <dgm:prSet presAssocID="{C0465615-090E-D848-AA39-07F7D3A3CFD5}" presName="hierChild6" presStyleCnt="0"/>
+      <dgm:spPr/>
+    </dgm:pt>
+    <dgm:pt modelId="{A09842AD-A70E-4345-A2D0-47B2AD87970D}" type="pres">
+      <dgm:prSet presAssocID="{C0465615-090E-D848-AA39-07F7D3A3CFD5}" presName="hierChild7" presStyleCnt="0"/>
+      <dgm:spPr/>
+    </dgm:pt>
   </dgm:ptLst>
   <dgm:cxnLst>
     <dgm:cxn modelId="{E341E47D-B202-F54B-BF70-58D2E12CCB5D}" type="presOf" srcId="{6F7E240C-0523-FD48-8161-BEF31F9E2217}" destId="{85644386-30A6-9F44-8B73-004B38C39289}" srcOrd="0" destOrd="0" presId="urn:microsoft.com/office/officeart/2005/8/layout/orgChart1"/>
+    <dgm:cxn modelId="{E127AF73-AA35-E747-BFA2-EB7E0E29B3EB}" type="presOf" srcId="{F3FA9A33-7533-D546-8048-4B52782BD5AA}" destId="{449C0065-964B-2445-BAD8-1B050D81108E}" srcOrd="0" destOrd="0" presId="urn:microsoft.com/office/officeart/2005/8/layout/orgChart1"/>
     <dgm:cxn modelId="{CC98A73E-F54D-204B-A593-9C692DE6D88F}" type="presOf" srcId="{F685E825-1930-B64C-923F-609466183635}" destId="{0CE327EB-0566-8748-BFA4-085F7A19257C}" srcOrd="0" destOrd="0" presId="urn:microsoft.com/office/officeart/2005/8/layout/orgChart1"/>
     <dgm:cxn modelId="{09AE9EC2-6B3F-FC44-B6FF-8CDCAFE35EB5}" type="presOf" srcId="{00F9853C-3FCE-7C43-A0B1-02C3B15FD044}" destId="{4E2303F9-ACF3-FD4C-9843-B67245D94037}" srcOrd="0" destOrd="0" presId="urn:microsoft.com/office/officeart/2005/8/layout/orgChart1"/>
-    <dgm:cxn modelId="{7DBF346B-E165-7045-BCCB-71DD067CB8BF}" srcId="{9F75284A-CA7F-8944-9586-42780C7161C5}" destId="{75F68E7A-4969-D94A-BFF1-2AFCA33DF883}" srcOrd="2" destOrd="0" parTransId="{CFC2E973-1EA4-364D-8B93-878D86EE0FA4}" sibTransId="{1D8C6CBE-9387-5D4A-AF3E-D81279287BAF}"/>
+    <dgm:cxn modelId="{7DBF346B-E165-7045-BCCB-71DD067CB8BF}" srcId="{9F75284A-CA7F-8944-9586-42780C7161C5}" destId="{75F68E7A-4969-D94A-BFF1-2AFCA33DF883}" srcOrd="3" destOrd="0" parTransId="{CFC2E973-1EA4-364D-8B93-878D86EE0FA4}" sibTransId="{1D8C6CBE-9387-5D4A-AF3E-D81279287BAF}"/>
     <dgm:cxn modelId="{C1C285C7-DB0F-8249-A7BF-CEFD488AF67C}" type="presOf" srcId="{11F35BFD-36F6-CA4A-8030-99719264AFE0}" destId="{6B9D1F3C-082B-9D40-935D-2EEE06F9AB53}" srcOrd="0" destOrd="0" presId="urn:microsoft.com/office/officeart/2005/8/layout/orgChart1"/>
     <dgm:cxn modelId="{521375B7-BC18-8D4D-94E9-046686B01E8E}" type="presOf" srcId="{00F9853C-3FCE-7C43-A0B1-02C3B15FD044}" destId="{46622B6C-940B-9445-8EC8-73F4615404AC}" srcOrd="1" destOrd="0" presId="urn:microsoft.com/office/officeart/2005/8/layout/orgChart1"/>
     <dgm:cxn modelId="{B9589A0E-3B16-654C-84D3-F535EF336BBC}" type="presOf" srcId="{11F35BFD-36F6-CA4A-8030-99719264AFE0}" destId="{B499DEFE-2B98-6A45-A6AC-EF212EA73BBA}" srcOrd="1" destOrd="0" presId="urn:microsoft.com/office/officeart/2005/8/layout/orgChart1"/>
     <dgm:cxn modelId="{A6978D46-CEFE-BB4C-992B-66667E6DA8E4}" type="presOf" srcId="{8B25173B-687C-3A45-A9E7-14E1DA0D970F}" destId="{8D185E37-8DCA-364C-AB66-B2A89E254564}" srcOrd="0" destOrd="0" presId="urn:microsoft.com/office/officeart/2005/8/layout/orgChart1"/>
+    <dgm:cxn modelId="{0C1DCD5C-1646-5A4F-8762-0A39CC1C5412}" srcId="{9F75284A-CA7F-8944-9586-42780C7161C5}" destId="{C0465615-090E-D848-AA39-07F7D3A3CFD5}" srcOrd="1" destOrd="0" parTransId="{F3FA9A33-7533-D546-8048-4B52782BD5AA}" sibTransId="{45B9A89E-F758-B64A-8149-310A4C58D698}"/>
     <dgm:cxn modelId="{A13BA37E-DEAD-0D43-9A8C-6E1F32A2EE8A}" srcId="{6F7E240C-0523-FD48-8161-BEF31F9E2217}" destId="{9F75284A-CA7F-8944-9586-42780C7161C5}" srcOrd="0" destOrd="0" parTransId="{EE11F4DE-9EAB-E944-A30D-DAB1D2D19FF2}" sibTransId="{73A5206B-F1D5-A741-B81E-FDC6C2E8C00D}"/>
-    <dgm:cxn modelId="{AA5B6416-DE30-0247-95DE-2812D92F5FC4}" srcId="{9F75284A-CA7F-8944-9586-42780C7161C5}" destId="{7CBDCF44-FF93-3740-8C12-AE9C793932DC}" srcOrd="1" destOrd="0" parTransId="{8B25173B-687C-3A45-A9E7-14E1DA0D970F}" sibTransId="{976C0AE3-5F04-5A4B-914E-BCA77314F0F4}"/>
+    <dgm:cxn modelId="{AA5B6416-DE30-0247-95DE-2812D92F5FC4}" srcId="{9F75284A-CA7F-8944-9586-42780C7161C5}" destId="{7CBDCF44-FF93-3740-8C12-AE9C793932DC}" srcOrd="2" destOrd="0" parTransId="{8B25173B-687C-3A45-A9E7-14E1DA0D970F}" sibTransId="{976C0AE3-5F04-5A4B-914E-BCA77314F0F4}"/>
+    <dgm:cxn modelId="{1E164D7A-CB8A-964C-A191-35D8FF1881AF}" type="presOf" srcId="{C0465615-090E-D848-AA39-07F7D3A3CFD5}" destId="{0BE51D93-3649-2845-9A07-B2CE1D905866}" srcOrd="1" destOrd="0" presId="urn:microsoft.com/office/officeart/2005/8/layout/orgChart1"/>
     <dgm:cxn modelId="{9122D6EB-592A-6D4C-B642-40C36F8E36D5}" type="presOf" srcId="{75F68E7A-4969-D94A-BFF1-2AFCA33DF883}" destId="{1F6827FC-FA5C-C948-B5D8-A87E0C3058B3}" srcOrd="0" destOrd="0" presId="urn:microsoft.com/office/officeart/2005/8/layout/orgChart1"/>
     <dgm:cxn modelId="{58B640F8-9D20-864D-BD63-645771FEC282}" type="presOf" srcId="{7CBDCF44-FF93-3740-8C12-AE9C793932DC}" destId="{02E4B982-A7C5-BA44-AB04-CF2EE786CAA7}" srcOrd="1" destOrd="0" presId="urn:microsoft.com/office/officeart/2005/8/layout/orgChart1"/>
     <dgm:cxn modelId="{06A4A1B1-0871-B449-99D2-84AA2FAA045B}" type="presOf" srcId="{9F75284A-CA7F-8944-9586-42780C7161C5}" destId="{A34BD3ED-5CE5-6E4E-B2C6-B56D35692BA4}" srcOrd="1" destOrd="0" presId="urn:microsoft.com/office/officeart/2005/8/layout/orgChart1"/>
-    <dgm:cxn modelId="{8F9F89EE-0DB0-3346-89EC-4906113B28C1}" srcId="{9F75284A-CA7F-8944-9586-42780C7161C5}" destId="{11F35BFD-36F6-CA4A-8030-99719264AFE0}" srcOrd="3" destOrd="0" parTransId="{F9C956E6-272D-184D-A757-2C4F9D5903CE}" sibTransId="{27C5A2F6-719B-214C-B646-35900568CA8E}"/>
+    <dgm:cxn modelId="{8F9F89EE-0DB0-3346-89EC-4906113B28C1}" srcId="{9F75284A-CA7F-8944-9586-42780C7161C5}" destId="{11F35BFD-36F6-CA4A-8030-99719264AFE0}" srcOrd="4" destOrd="0" parTransId="{F9C956E6-272D-184D-A757-2C4F9D5903CE}" sibTransId="{27C5A2F6-719B-214C-B646-35900568CA8E}"/>
     <dgm:cxn modelId="{4CEBAC77-7604-8D48-91DA-BEE606F2F7F9}" srcId="{9F75284A-CA7F-8944-9586-42780C7161C5}" destId="{00F9853C-3FCE-7C43-A0B1-02C3B15FD044}" srcOrd="0" destOrd="0" parTransId="{F685E825-1930-B64C-923F-609466183635}" sibTransId="{EB116105-471C-5944-97E2-8B35F0FAEC1F}"/>
     <dgm:cxn modelId="{6C4C2475-4CDA-AA4E-8BA7-043589C6EC02}" type="presOf" srcId="{9F75284A-CA7F-8944-9586-42780C7161C5}" destId="{BCF50F19-E1D6-944F-A305-3A1881F3F899}" srcOrd="0" destOrd="0" presId="urn:microsoft.com/office/officeart/2005/8/layout/orgChart1"/>
     <dgm:cxn modelId="{DF2CBD66-03F6-7C4D-AEFE-0C881FA1B25F}" type="presOf" srcId="{F9C956E6-272D-184D-A757-2C4F9D5903CE}" destId="{7E74B830-BF27-934F-AE86-49257B5A48EB}" srcOrd="0" destOrd="0" presId="urn:microsoft.com/office/officeart/2005/8/layout/orgChart1"/>
     <dgm:cxn modelId="{2DDF9FF5-D693-1944-B75C-CBE03FCF2D8D}" type="presOf" srcId="{CFC2E973-1EA4-364D-8B93-878D86EE0FA4}" destId="{78958DEB-F014-4244-9F57-C93DFD0C6983}" srcOrd="0" destOrd="0" presId="urn:microsoft.com/office/officeart/2005/8/layout/orgChart1"/>
     <dgm:cxn modelId="{C412E637-47C1-B143-B864-031B4F36FED5}" type="presOf" srcId="{7CBDCF44-FF93-3740-8C12-AE9C793932DC}" destId="{A6998BF2-0C7C-5E47-8FAD-A5F74D1A43B7}" srcOrd="0" destOrd="0" presId="urn:microsoft.com/office/officeart/2005/8/layout/orgChart1"/>
+    <dgm:cxn modelId="{A73BE20C-4667-A740-8942-4DDC356D7360}" type="presOf" srcId="{C0465615-090E-D848-AA39-07F7D3A3CFD5}" destId="{2933DB08-27E9-C746-B6A8-538B198985C7}" srcOrd="0" destOrd="0" presId="urn:microsoft.com/office/officeart/2005/8/layout/orgChart1"/>
     <dgm:cxn modelId="{66B6287B-864F-2F48-B148-EAF04FD48D67}" type="presOf" srcId="{75F68E7A-4969-D94A-BFF1-2AFCA33DF883}" destId="{4E119A15-194F-C24E-8716-224E234A4DAE}" srcOrd="1" destOrd="0" presId="urn:microsoft.com/office/officeart/2005/8/layout/orgChart1"/>
     <dgm:cxn modelId="{D16AA995-EF96-B443-B606-2DFD98C5CB96}" type="presParOf" srcId="{85644386-30A6-9F44-8B73-004B38C39289}" destId="{3B94EB36-DE63-4E4D-B103-5FC475538237}" srcOrd="0" destOrd="0" presId="urn:microsoft.com/office/officeart/2005/8/layout/orgChart1"/>
     <dgm:cxn modelId="{B9CD46B0-21CC-2F45-BCD3-F865E13468A1}" type="presParOf" srcId="{3B94EB36-DE63-4E4D-B103-5FC475538237}" destId="{496875E1-96A0-9046-BCF7-3CFC0D190B21}" srcOrd="0" destOrd="0" presId="urn:microsoft.com/office/officeart/2005/8/layout/orgChart1"/>
@@ -7102,6 +7193,13 @@
     <dgm:cxn modelId="{D7304D07-74C1-B14B-821A-0D4640079500}" type="presParOf" srcId="{5CE0C838-F786-5A47-B373-F81EDF34B134}" destId="{46622B6C-940B-9445-8EC8-73F4615404AC}" srcOrd="1" destOrd="0" presId="urn:microsoft.com/office/officeart/2005/8/layout/orgChart1"/>
     <dgm:cxn modelId="{9F37C6FD-5B69-394B-8FB8-3EC5B87C9A7E}" type="presParOf" srcId="{D2E81B2C-14BD-B44B-B18F-4D9818D164BA}" destId="{CD779155-6F30-2D42-B18E-19B639F6F975}" srcOrd="1" destOrd="0" presId="urn:microsoft.com/office/officeart/2005/8/layout/orgChart1"/>
     <dgm:cxn modelId="{D4D2BB30-CC1B-3B49-AE37-D1C432EF9A91}" type="presParOf" srcId="{D2E81B2C-14BD-B44B-B18F-4D9818D164BA}" destId="{F7C9BCD3-98BE-7146-B297-C2A80CE46BB2}" srcOrd="2" destOrd="0" presId="urn:microsoft.com/office/officeart/2005/8/layout/orgChart1"/>
+    <dgm:cxn modelId="{188B3F45-83BB-0142-B702-0C4956F19A2F}" type="presParOf" srcId="{F97DD33A-C423-8944-9241-35D51BF3564F}" destId="{449C0065-964B-2445-BAD8-1B050D81108E}" srcOrd="2" destOrd="0" presId="urn:microsoft.com/office/officeart/2005/8/layout/orgChart1"/>
+    <dgm:cxn modelId="{9AAF0900-08B6-134E-A52A-7432DAD38318}" type="presParOf" srcId="{F97DD33A-C423-8944-9241-35D51BF3564F}" destId="{403879B0-372D-F344-858D-3A8FC08563DD}" srcOrd="3" destOrd="0" presId="urn:microsoft.com/office/officeart/2005/8/layout/orgChart1"/>
+    <dgm:cxn modelId="{F1DB25FA-47E4-B548-9B1F-A2589C7B0ED4}" type="presParOf" srcId="{403879B0-372D-F344-858D-3A8FC08563DD}" destId="{EC7429A5-997B-1247-93A2-EEBF2F2CB7CD}" srcOrd="0" destOrd="0" presId="urn:microsoft.com/office/officeart/2005/8/layout/orgChart1"/>
+    <dgm:cxn modelId="{E1BC6F5F-C897-984A-850E-3E8E18AF1AC0}" type="presParOf" srcId="{EC7429A5-997B-1247-93A2-EEBF2F2CB7CD}" destId="{2933DB08-27E9-C746-B6A8-538B198985C7}" srcOrd="0" destOrd="0" presId="urn:microsoft.com/office/officeart/2005/8/layout/orgChart1"/>
+    <dgm:cxn modelId="{FA2E8876-6E9E-1E49-B49B-9563B47CF740}" type="presParOf" srcId="{EC7429A5-997B-1247-93A2-EEBF2F2CB7CD}" destId="{0BE51D93-3649-2845-9A07-B2CE1D905866}" srcOrd="1" destOrd="0" presId="urn:microsoft.com/office/officeart/2005/8/layout/orgChart1"/>
+    <dgm:cxn modelId="{A1CA0E5F-BC9F-2348-9D61-A18ABC8C60D0}" type="presParOf" srcId="{403879B0-372D-F344-858D-3A8FC08563DD}" destId="{ADCDA6B3-7045-2143-BF82-612656E133B9}" srcOrd="1" destOrd="0" presId="urn:microsoft.com/office/officeart/2005/8/layout/orgChart1"/>
+    <dgm:cxn modelId="{F0013901-5D8F-EE4D-93F0-403E24734661}" type="presParOf" srcId="{403879B0-372D-F344-858D-3A8FC08563DD}" destId="{A09842AD-A70E-4345-A2D0-47B2AD87970D}" srcOrd="2" destOrd="0" presId="urn:microsoft.com/office/officeart/2005/8/layout/orgChart1"/>
   </dgm:cxnLst>
   <dgm:bg/>
   <dgm:whole/>
@@ -8353,6 +8451,688 @@
       <dsp:cNvGrpSpPr/>
     </dsp:nvGrpSpPr>
     <dsp:grpSpPr/>
+    <dsp:sp modelId="{0CE327EB-0566-8748-BFA4-085F7A19257C}">
+      <dsp:nvSpPr>
+        <dsp:cNvPr id="0" name=""/>
+        <dsp:cNvSpPr/>
+      </dsp:nvSpPr>
+      <dsp:spPr>
+        <a:xfrm>
+          <a:off x="2254202" y="704725"/>
+          <a:ext cx="657466" cy="587404"/>
+        </a:xfrm>
+        <a:custGeom>
+          <a:avLst/>
+          <a:gdLst/>
+          <a:ahLst/>
+          <a:cxnLst/>
+          <a:rect l="0" t="0" r="0" b="0"/>
+          <a:pathLst>
+            <a:path>
+              <a:moveTo>
+                <a:pt x="0" y="0"/>
+              </a:moveTo>
+              <a:lnTo>
+                <a:pt x="657466" y="587404"/>
+              </a:lnTo>
+            </a:path>
+          </a:pathLst>
+        </a:custGeom>
+        <a:noFill/>
+        <a:ln w="9525" cap="flat" cmpd="sng" algn="ctr">
+          <a:solidFill>
+            <a:schemeClr val="accent1">
+              <a:shade val="60000"/>
+              <a:hueOff val="0"/>
+              <a:satOff val="0"/>
+              <a:lumOff val="0"/>
+              <a:alphaOff val="0"/>
+            </a:schemeClr>
+          </a:solidFill>
+          <a:prstDash val="solid"/>
+        </a:ln>
+        <a:effectLst/>
+      </dsp:spPr>
+      <dsp:style>
+        <a:lnRef idx="1">
+          <a:scrgbClr r="0" g="0" b="0"/>
+        </a:lnRef>
+        <a:fillRef idx="0">
+          <a:scrgbClr r="0" g="0" b="0"/>
+        </a:fillRef>
+        <a:effectRef idx="0">
+          <a:scrgbClr r="0" g="0" b="0"/>
+        </a:effectRef>
+        <a:fontRef idx="minor"/>
+      </dsp:style>
+    </dsp:sp>
+    <dsp:sp modelId="{7E74B830-BF27-934F-AE86-49257B5A48EB}">
+      <dsp:nvSpPr>
+        <dsp:cNvPr id="0" name=""/>
+        <dsp:cNvSpPr/>
+      </dsp:nvSpPr>
+      <dsp:spPr>
+        <a:xfrm>
+          <a:off x="2254202" y="704725"/>
+          <a:ext cx="1594864" cy="1212624"/>
+        </a:xfrm>
+        <a:custGeom>
+          <a:avLst/>
+          <a:gdLst/>
+          <a:ahLst/>
+          <a:cxnLst/>
+          <a:rect l="0" t="0" r="0" b="0"/>
+          <a:pathLst>
+            <a:path>
+              <a:moveTo>
+                <a:pt x="0" y="0"/>
+              </a:moveTo>
+              <a:lnTo>
+                <a:pt x="0" y="1074227"/>
+              </a:lnTo>
+              <a:lnTo>
+                <a:pt x="1594864" y="1074227"/>
+              </a:lnTo>
+              <a:lnTo>
+                <a:pt x="1594864" y="1212624"/>
+              </a:lnTo>
+            </a:path>
+          </a:pathLst>
+        </a:custGeom>
+        <a:noFill/>
+        <a:ln w="9525" cap="flat" cmpd="sng" algn="ctr">
+          <a:solidFill>
+            <a:schemeClr val="accent1">
+              <a:shade val="60000"/>
+              <a:hueOff val="0"/>
+              <a:satOff val="0"/>
+              <a:lumOff val="0"/>
+              <a:alphaOff val="0"/>
+            </a:schemeClr>
+          </a:solidFill>
+          <a:prstDash val="solid"/>
+        </a:ln>
+        <a:effectLst/>
+      </dsp:spPr>
+      <dsp:style>
+        <a:lnRef idx="1">
+          <a:scrgbClr r="0" g="0" b="0"/>
+        </a:lnRef>
+        <a:fillRef idx="0">
+          <a:scrgbClr r="0" g="0" b="0"/>
+        </a:fillRef>
+        <a:effectRef idx="0">
+          <a:scrgbClr r="0" g="0" b="0"/>
+        </a:effectRef>
+        <a:fontRef idx="minor"/>
+      </dsp:style>
+    </dsp:sp>
+    <dsp:sp modelId="{78958DEB-F014-4244-9F57-C93DFD0C6983}">
+      <dsp:nvSpPr>
+        <dsp:cNvPr id="0" name=""/>
+        <dsp:cNvSpPr/>
+      </dsp:nvSpPr>
+      <dsp:spPr>
+        <a:xfrm>
+          <a:off x="2208482" y="704725"/>
+          <a:ext cx="91440" cy="1212624"/>
+        </a:xfrm>
+        <a:custGeom>
+          <a:avLst/>
+          <a:gdLst/>
+          <a:ahLst/>
+          <a:cxnLst/>
+          <a:rect l="0" t="0" r="0" b="0"/>
+          <a:pathLst>
+            <a:path>
+              <a:moveTo>
+                <a:pt x="45720" y="0"/>
+              </a:moveTo>
+              <a:lnTo>
+                <a:pt x="45720" y="1212624"/>
+              </a:lnTo>
+            </a:path>
+          </a:pathLst>
+        </a:custGeom>
+        <a:noFill/>
+        <a:ln w="9525" cap="flat" cmpd="sng" algn="ctr">
+          <a:solidFill>
+            <a:schemeClr val="accent1">
+              <a:shade val="60000"/>
+              <a:hueOff val="0"/>
+              <a:satOff val="0"/>
+              <a:lumOff val="0"/>
+              <a:alphaOff val="0"/>
+            </a:schemeClr>
+          </a:solidFill>
+          <a:prstDash val="solid"/>
+        </a:ln>
+        <a:effectLst/>
+      </dsp:spPr>
+      <dsp:style>
+        <a:lnRef idx="1">
+          <a:scrgbClr r="0" g="0" b="0"/>
+        </a:lnRef>
+        <a:fillRef idx="0">
+          <a:scrgbClr r="0" g="0" b="0"/>
+        </a:fillRef>
+        <a:effectRef idx="0">
+          <a:scrgbClr r="0" g="0" b="0"/>
+        </a:effectRef>
+        <a:fontRef idx="minor"/>
+      </dsp:style>
+    </dsp:sp>
+    <dsp:sp modelId="{8D185E37-8DCA-364C-AB66-B2A89E254564}">
+      <dsp:nvSpPr>
+        <dsp:cNvPr id="0" name=""/>
+        <dsp:cNvSpPr/>
+      </dsp:nvSpPr>
+      <dsp:spPr>
+        <a:xfrm>
+          <a:off x="659337" y="704725"/>
+          <a:ext cx="1594864" cy="1212624"/>
+        </a:xfrm>
+        <a:custGeom>
+          <a:avLst/>
+          <a:gdLst/>
+          <a:ahLst/>
+          <a:cxnLst/>
+          <a:rect l="0" t="0" r="0" b="0"/>
+          <a:pathLst>
+            <a:path>
+              <a:moveTo>
+                <a:pt x="1594864" y="0"/>
+              </a:moveTo>
+              <a:lnTo>
+                <a:pt x="1594864" y="1074227"/>
+              </a:lnTo>
+              <a:lnTo>
+                <a:pt x="0" y="1074227"/>
+              </a:lnTo>
+              <a:lnTo>
+                <a:pt x="0" y="1212624"/>
+              </a:lnTo>
+            </a:path>
+          </a:pathLst>
+        </a:custGeom>
+        <a:noFill/>
+        <a:ln w="9525" cap="flat" cmpd="sng" algn="ctr">
+          <a:solidFill>
+            <a:schemeClr val="accent1">
+              <a:shade val="60000"/>
+              <a:hueOff val="0"/>
+              <a:satOff val="0"/>
+              <a:lumOff val="0"/>
+              <a:alphaOff val="0"/>
+            </a:schemeClr>
+          </a:solidFill>
+          <a:prstDash val="solid"/>
+        </a:ln>
+        <a:effectLst/>
+      </dsp:spPr>
+      <dsp:style>
+        <a:lnRef idx="1">
+          <a:scrgbClr r="0" g="0" b="0"/>
+        </a:lnRef>
+        <a:fillRef idx="0">
+          <a:scrgbClr r="0" g="0" b="0"/>
+        </a:fillRef>
+        <a:effectRef idx="0">
+          <a:scrgbClr r="0" g="0" b="0"/>
+        </a:effectRef>
+        <a:fontRef idx="minor"/>
+      </dsp:style>
+    </dsp:sp>
+    <dsp:sp modelId="{BCF50F19-E1D6-944F-A305-3A1881F3F899}">
+      <dsp:nvSpPr>
+        <dsp:cNvPr id="0" name=""/>
+        <dsp:cNvSpPr/>
+      </dsp:nvSpPr>
+      <dsp:spPr>
+        <a:xfrm>
+          <a:off x="1595167" y="45690"/>
+          <a:ext cx="1318070" cy="659035"/>
+        </a:xfrm>
+        <a:prstGeom prst="rect">
+          <a:avLst/>
+        </a:prstGeom>
+        <a:gradFill rotWithShape="0">
+          <a:gsLst>
+            <a:gs pos="0">
+              <a:schemeClr val="accent1">
+                <a:hueOff val="0"/>
+                <a:satOff val="0"/>
+                <a:lumOff val="0"/>
+                <a:alphaOff val="0"/>
+              </a:schemeClr>
+            </a:gs>
+            <a:gs pos="100000">
+              <a:schemeClr val="accent1">
+                <a:hueOff val="0"/>
+                <a:satOff val="0"/>
+                <a:lumOff val="0"/>
+                <a:alphaOff val="0"/>
+                <a:shade val="76000"/>
+                <a:lumMod val="90000"/>
+              </a:schemeClr>
+            </a:gs>
+          </a:gsLst>
+          <a:lin ang="5400000" scaled="0"/>
+        </a:gradFill>
+        <a:ln>
+          <a:noFill/>
+        </a:ln>
+        <a:effectLst>
+          <a:outerShdw blurRad="38100" dist="38100" dir="4800000" sx="98000" sy="98000" rotWithShape="0">
+            <a:srgbClr val="000000">
+              <a:alpha val="32000"/>
+            </a:srgbClr>
+          </a:outerShdw>
+        </a:effectLst>
+      </dsp:spPr>
+      <dsp:style>
+        <a:lnRef idx="0">
+          <a:scrgbClr r="0" g="0" b="0"/>
+        </a:lnRef>
+        <a:fillRef idx="3">
+          <a:scrgbClr r="0" g="0" b="0"/>
+        </a:fillRef>
+        <a:effectRef idx="2">
+          <a:scrgbClr r="0" g="0" b="0"/>
+        </a:effectRef>
+        <a:fontRef idx="minor">
+          <a:schemeClr val="lt1"/>
+        </a:fontRef>
+      </dsp:style>
+      <dsp:txBody>
+        <a:bodyPr spcFirstLastPara="0" vert="horz" wrap="square" lIns="13970" tIns="13970" rIns="13970" bIns="13970" numCol="1" spcCol="1270" anchor="ctr" anchorCtr="0">
+          <a:noAutofit/>
+        </a:bodyPr>
+        <a:lstStyle/>
+        <a:p>
+          <a:pPr lvl="0" algn="ctr" defTabSz="977900">
+            <a:lnSpc>
+              <a:spcPct val="90000"/>
+            </a:lnSpc>
+            <a:spcBef>
+              <a:spcPct val="0"/>
+            </a:spcBef>
+            <a:spcAft>
+              <a:spcPct val="35000"/>
+            </a:spcAft>
+          </a:pPr>
+          <a:r>
+            <a:rPr lang="en-US" sz="2200" kern="1200" dirty="0" smtClean="0"/>
+            <a:t>Homepage</a:t>
+          </a:r>
+          <a:endParaRPr lang="en-US" sz="2200" kern="1200" dirty="0"/>
+        </a:p>
+      </dsp:txBody>
+      <dsp:txXfrm>
+        <a:off x="1595167" y="45690"/>
+        <a:ext cx="1318070" cy="659035"/>
+      </dsp:txXfrm>
+    </dsp:sp>
+    <dsp:sp modelId="{A6998BF2-0C7C-5E47-8FAD-A5F74D1A43B7}">
+      <dsp:nvSpPr>
+        <dsp:cNvPr id="0" name=""/>
+        <dsp:cNvSpPr/>
+      </dsp:nvSpPr>
+      <dsp:spPr>
+        <a:xfrm>
+          <a:off x="302" y="1917350"/>
+          <a:ext cx="1318070" cy="659035"/>
+        </a:xfrm>
+        <a:prstGeom prst="rect">
+          <a:avLst/>
+        </a:prstGeom>
+        <a:gradFill rotWithShape="0">
+          <a:gsLst>
+            <a:gs pos="0">
+              <a:schemeClr val="accent1">
+                <a:hueOff val="0"/>
+                <a:satOff val="0"/>
+                <a:lumOff val="0"/>
+                <a:alphaOff val="0"/>
+              </a:schemeClr>
+            </a:gs>
+            <a:gs pos="100000">
+              <a:schemeClr val="accent1">
+                <a:hueOff val="0"/>
+                <a:satOff val="0"/>
+                <a:lumOff val="0"/>
+                <a:alphaOff val="0"/>
+                <a:shade val="76000"/>
+                <a:lumMod val="90000"/>
+              </a:schemeClr>
+            </a:gs>
+          </a:gsLst>
+          <a:lin ang="5400000" scaled="0"/>
+        </a:gradFill>
+        <a:ln>
+          <a:noFill/>
+        </a:ln>
+        <a:effectLst>
+          <a:outerShdw blurRad="38100" dist="38100" dir="4800000" sx="98000" sy="98000" rotWithShape="0">
+            <a:srgbClr val="000000">
+              <a:alpha val="32000"/>
+            </a:srgbClr>
+          </a:outerShdw>
+        </a:effectLst>
+      </dsp:spPr>
+      <dsp:style>
+        <a:lnRef idx="0">
+          <a:scrgbClr r="0" g="0" b="0"/>
+        </a:lnRef>
+        <a:fillRef idx="3">
+          <a:scrgbClr r="0" g="0" b="0"/>
+        </a:fillRef>
+        <a:effectRef idx="2">
+          <a:scrgbClr r="0" g="0" b="0"/>
+        </a:effectRef>
+        <a:fontRef idx="minor">
+          <a:schemeClr val="lt1"/>
+        </a:fontRef>
+      </dsp:style>
+      <dsp:txBody>
+        <a:bodyPr spcFirstLastPara="0" vert="horz" wrap="square" lIns="13970" tIns="13970" rIns="13970" bIns="13970" numCol="1" spcCol="1270" anchor="ctr" anchorCtr="0">
+          <a:noAutofit/>
+        </a:bodyPr>
+        <a:lstStyle/>
+        <a:p>
+          <a:pPr lvl="0" algn="ctr" defTabSz="977900">
+            <a:lnSpc>
+              <a:spcPct val="90000"/>
+            </a:lnSpc>
+            <a:spcBef>
+              <a:spcPct val="0"/>
+            </a:spcBef>
+            <a:spcAft>
+              <a:spcPct val="35000"/>
+            </a:spcAft>
+          </a:pPr>
+          <a:r>
+            <a:rPr lang="en-US" sz="2200" kern="1200" dirty="0" smtClean="0"/>
+            <a:t>Child 1</a:t>
+          </a:r>
+          <a:endParaRPr lang="en-US" sz="2200" kern="1200" dirty="0"/>
+        </a:p>
+      </dsp:txBody>
+      <dsp:txXfrm>
+        <a:off x="302" y="1917350"/>
+        <a:ext cx="1318070" cy="659035"/>
+      </dsp:txXfrm>
+    </dsp:sp>
+    <dsp:sp modelId="{1F6827FC-FA5C-C948-B5D8-A87E0C3058B3}">
+      <dsp:nvSpPr>
+        <dsp:cNvPr id="0" name=""/>
+        <dsp:cNvSpPr/>
+      </dsp:nvSpPr>
+      <dsp:spPr>
+        <a:xfrm>
+          <a:off x="1595167" y="1917350"/>
+          <a:ext cx="1318070" cy="659035"/>
+        </a:xfrm>
+        <a:prstGeom prst="rect">
+          <a:avLst/>
+        </a:prstGeom>
+        <a:gradFill rotWithShape="0">
+          <a:gsLst>
+            <a:gs pos="0">
+              <a:schemeClr val="accent1">
+                <a:hueOff val="0"/>
+                <a:satOff val="0"/>
+                <a:lumOff val="0"/>
+                <a:alphaOff val="0"/>
+              </a:schemeClr>
+            </a:gs>
+            <a:gs pos="100000">
+              <a:schemeClr val="accent1">
+                <a:hueOff val="0"/>
+                <a:satOff val="0"/>
+                <a:lumOff val="0"/>
+                <a:alphaOff val="0"/>
+                <a:shade val="76000"/>
+                <a:lumMod val="90000"/>
+              </a:schemeClr>
+            </a:gs>
+          </a:gsLst>
+          <a:lin ang="5400000" scaled="0"/>
+        </a:gradFill>
+        <a:ln>
+          <a:noFill/>
+        </a:ln>
+        <a:effectLst>
+          <a:outerShdw blurRad="38100" dist="38100" dir="4800000" sx="98000" sy="98000" rotWithShape="0">
+            <a:srgbClr val="000000">
+              <a:alpha val="32000"/>
+            </a:srgbClr>
+          </a:outerShdw>
+        </a:effectLst>
+      </dsp:spPr>
+      <dsp:style>
+        <a:lnRef idx="0">
+          <a:scrgbClr r="0" g="0" b="0"/>
+        </a:lnRef>
+        <a:fillRef idx="3">
+          <a:scrgbClr r="0" g="0" b="0"/>
+        </a:fillRef>
+        <a:effectRef idx="2">
+          <a:scrgbClr r="0" g="0" b="0"/>
+        </a:effectRef>
+        <a:fontRef idx="minor">
+          <a:schemeClr val="lt1"/>
+        </a:fontRef>
+      </dsp:style>
+      <dsp:txBody>
+        <a:bodyPr spcFirstLastPara="0" vert="horz" wrap="square" lIns="13970" tIns="13970" rIns="13970" bIns="13970" numCol="1" spcCol="1270" anchor="ctr" anchorCtr="0">
+          <a:noAutofit/>
+        </a:bodyPr>
+        <a:lstStyle/>
+        <a:p>
+          <a:pPr lvl="0" algn="ctr" defTabSz="977900">
+            <a:lnSpc>
+              <a:spcPct val="90000"/>
+            </a:lnSpc>
+            <a:spcBef>
+              <a:spcPct val="0"/>
+            </a:spcBef>
+            <a:spcAft>
+              <a:spcPct val="35000"/>
+            </a:spcAft>
+          </a:pPr>
+          <a:r>
+            <a:rPr lang="en-US" sz="2200" kern="1200" dirty="0" smtClean="0"/>
+            <a:t>Child 2</a:t>
+          </a:r>
+          <a:endParaRPr lang="en-US" sz="2200" kern="1200" dirty="0"/>
+        </a:p>
+      </dsp:txBody>
+      <dsp:txXfrm>
+        <a:off x="1595167" y="1917350"/>
+        <a:ext cx="1318070" cy="659035"/>
+      </dsp:txXfrm>
+    </dsp:sp>
+    <dsp:sp modelId="{6B9D1F3C-082B-9D40-935D-2EEE06F9AB53}">
+      <dsp:nvSpPr>
+        <dsp:cNvPr id="0" name=""/>
+        <dsp:cNvSpPr/>
+      </dsp:nvSpPr>
+      <dsp:spPr>
+        <a:xfrm>
+          <a:off x="3190032" y="1917350"/>
+          <a:ext cx="1318070" cy="659035"/>
+        </a:xfrm>
+        <a:prstGeom prst="rect">
+          <a:avLst/>
+        </a:prstGeom>
+        <a:gradFill rotWithShape="0">
+          <a:gsLst>
+            <a:gs pos="0">
+              <a:schemeClr val="accent1">
+                <a:hueOff val="0"/>
+                <a:satOff val="0"/>
+                <a:lumOff val="0"/>
+                <a:alphaOff val="0"/>
+              </a:schemeClr>
+            </a:gs>
+            <a:gs pos="100000">
+              <a:schemeClr val="accent1">
+                <a:hueOff val="0"/>
+                <a:satOff val="0"/>
+                <a:lumOff val="0"/>
+                <a:alphaOff val="0"/>
+                <a:shade val="76000"/>
+                <a:lumMod val="90000"/>
+              </a:schemeClr>
+            </a:gs>
+          </a:gsLst>
+          <a:lin ang="5400000" scaled="0"/>
+        </a:gradFill>
+        <a:ln>
+          <a:noFill/>
+        </a:ln>
+        <a:effectLst>
+          <a:outerShdw blurRad="38100" dist="38100" dir="4800000" sx="98000" sy="98000" rotWithShape="0">
+            <a:srgbClr val="000000">
+              <a:alpha val="32000"/>
+            </a:srgbClr>
+          </a:outerShdw>
+        </a:effectLst>
+      </dsp:spPr>
+      <dsp:style>
+        <a:lnRef idx="0">
+          <a:scrgbClr r="0" g="0" b="0"/>
+        </a:lnRef>
+        <a:fillRef idx="3">
+          <a:scrgbClr r="0" g="0" b="0"/>
+        </a:fillRef>
+        <a:effectRef idx="2">
+          <a:scrgbClr r="0" g="0" b="0"/>
+        </a:effectRef>
+        <a:fontRef idx="minor">
+          <a:schemeClr val="lt1"/>
+        </a:fontRef>
+      </dsp:style>
+      <dsp:txBody>
+        <a:bodyPr spcFirstLastPara="0" vert="horz" wrap="square" lIns="13970" tIns="13970" rIns="13970" bIns="13970" numCol="1" spcCol="1270" anchor="ctr" anchorCtr="0">
+          <a:noAutofit/>
+        </a:bodyPr>
+        <a:lstStyle/>
+        <a:p>
+          <a:pPr lvl="0" algn="ctr" defTabSz="977900">
+            <a:lnSpc>
+              <a:spcPct val="90000"/>
+            </a:lnSpc>
+            <a:spcBef>
+              <a:spcPct val="0"/>
+            </a:spcBef>
+            <a:spcAft>
+              <a:spcPct val="35000"/>
+            </a:spcAft>
+          </a:pPr>
+          <a:r>
+            <a:rPr lang="en-US" sz="2200" kern="1200" dirty="0" smtClean="0"/>
+            <a:t>Child 3</a:t>
+          </a:r>
+          <a:endParaRPr lang="en-US" sz="2200" kern="1200" dirty="0"/>
+        </a:p>
+      </dsp:txBody>
+      <dsp:txXfrm>
+        <a:off x="3190032" y="1917350"/>
+        <a:ext cx="1318070" cy="659035"/>
+      </dsp:txXfrm>
+    </dsp:sp>
+    <dsp:sp modelId="{4E2303F9-ACF3-FD4C-9843-B67245D94037}">
+      <dsp:nvSpPr>
+        <dsp:cNvPr id="0" name=""/>
+        <dsp:cNvSpPr/>
+      </dsp:nvSpPr>
+      <dsp:spPr>
+        <a:xfrm>
+          <a:off x="1593598" y="962612"/>
+          <a:ext cx="1318070" cy="659035"/>
+        </a:xfrm>
+        <a:prstGeom prst="rect">
+          <a:avLst/>
+        </a:prstGeom>
+        <a:gradFill rotWithShape="0">
+          <a:gsLst>
+            <a:gs pos="0">
+              <a:schemeClr val="accent1">
+                <a:hueOff val="0"/>
+                <a:satOff val="0"/>
+                <a:lumOff val="0"/>
+                <a:alphaOff val="0"/>
+              </a:schemeClr>
+            </a:gs>
+            <a:gs pos="100000">
+              <a:schemeClr val="accent1">
+                <a:hueOff val="0"/>
+                <a:satOff val="0"/>
+                <a:lumOff val="0"/>
+                <a:alphaOff val="0"/>
+                <a:shade val="76000"/>
+                <a:lumMod val="90000"/>
+              </a:schemeClr>
+            </a:gs>
+          </a:gsLst>
+          <a:lin ang="5400000" scaled="0"/>
+        </a:gradFill>
+        <a:ln>
+          <a:noFill/>
+        </a:ln>
+        <a:effectLst>
+          <a:outerShdw blurRad="38100" dist="38100" dir="4800000" sx="98000" sy="98000" rotWithShape="0">
+            <a:srgbClr val="000000">
+              <a:alpha val="32000"/>
+            </a:srgbClr>
+          </a:outerShdw>
+        </a:effectLst>
+      </dsp:spPr>
+      <dsp:style>
+        <a:lnRef idx="0">
+          <a:scrgbClr r="0" g="0" b="0"/>
+        </a:lnRef>
+        <a:fillRef idx="3">
+          <a:scrgbClr r="0" g="0" b="0"/>
+        </a:fillRef>
+        <a:effectRef idx="2">
+          <a:scrgbClr r="0" g="0" b="0"/>
+        </a:effectRef>
+        <a:fontRef idx="minor">
+          <a:schemeClr val="lt1"/>
+        </a:fontRef>
+      </dsp:style>
+      <dsp:txBody>
+        <a:bodyPr spcFirstLastPara="0" vert="horz" wrap="square" lIns="13970" tIns="13970" rIns="13970" bIns="13970" numCol="1" spcCol="1270" anchor="ctr" anchorCtr="0">
+          <a:noAutofit/>
+        </a:bodyPr>
+        <a:lstStyle/>
+        <a:p>
+          <a:pPr lvl="0" algn="ctr" defTabSz="977900">
+            <a:lnSpc>
+              <a:spcPct val="90000"/>
+            </a:lnSpc>
+            <a:spcBef>
+              <a:spcPct val="0"/>
+            </a:spcBef>
+            <a:spcAft>
+              <a:spcPct val="35000"/>
+            </a:spcAft>
+          </a:pPr>
+          <a:r>
+            <a:rPr lang="en-US" sz="2200" kern="1200" dirty="0" smtClean="0"/>
+            <a:t>Our Page</a:t>
+          </a:r>
+          <a:endParaRPr lang="en-US" sz="2200" kern="1200" dirty="0"/>
+        </a:p>
+      </dsp:txBody>
+      <dsp:txXfrm>
+        <a:off x="1593598" y="962612"/>
+        <a:ext cx="1318070" cy="659035"/>
+      </dsp:txXfrm>
+    </dsp:sp>
   </dsp:spTree>
 </dsp:drawing>
 </file>
@@ -8365,6 +9145,694 @@
       <dsp:cNvGrpSpPr/>
     </dsp:nvGrpSpPr>
     <dsp:grpSpPr/>
+    <dsp:sp modelId="{0CE327EB-0566-8748-BFA4-085F7A19257C}">
+      <dsp:nvSpPr>
+        <dsp:cNvPr id="0" name=""/>
+        <dsp:cNvSpPr/>
+      </dsp:nvSpPr>
+      <dsp:spPr>
+        <a:xfrm>
+          <a:off x="2361789" y="1022187"/>
+          <a:ext cx="751312" cy="715561"/>
+        </a:xfrm>
+        <a:custGeom>
+          <a:avLst/>
+          <a:gdLst/>
+          <a:ahLst/>
+          <a:cxnLst/>
+          <a:rect l="0" t="0" r="0" b="0"/>
+          <a:pathLst>
+            <a:path>
+              <a:moveTo>
+                <a:pt x="751312" y="0"/>
+              </a:moveTo>
+              <a:lnTo>
+                <a:pt x="0" y="715561"/>
+              </a:lnTo>
+            </a:path>
+          </a:pathLst>
+        </a:custGeom>
+        <a:noFill/>
+        <a:ln w="9525" cap="flat" cmpd="sng" algn="ctr">
+          <a:solidFill>
+            <a:schemeClr val="accent1">
+              <a:shade val="60000"/>
+              <a:hueOff val="0"/>
+              <a:satOff val="0"/>
+              <a:lumOff val="0"/>
+              <a:alphaOff val="0"/>
+            </a:schemeClr>
+          </a:solidFill>
+          <a:prstDash val="solid"/>
+        </a:ln>
+        <a:effectLst/>
+      </dsp:spPr>
+      <dsp:style>
+        <a:lnRef idx="1">
+          <a:scrgbClr r="0" g="0" b="0"/>
+        </a:lnRef>
+        <a:fillRef idx="0">
+          <a:scrgbClr r="0" g="0" b="0"/>
+        </a:fillRef>
+        <a:effectRef idx="0">
+          <a:scrgbClr r="0" g="0" b="0"/>
+        </a:effectRef>
+        <a:fontRef idx="minor"/>
+      </dsp:style>
+    </dsp:sp>
+    <dsp:sp modelId="{7E74B830-BF27-934F-AE86-49257B5A48EB}">
+      <dsp:nvSpPr>
+        <dsp:cNvPr id="0" name=""/>
+        <dsp:cNvSpPr/>
+      </dsp:nvSpPr>
+      <dsp:spPr>
+        <a:xfrm>
+          <a:off x="3113102" y="1022187"/>
+          <a:ext cx="2073792" cy="1576767"/>
+        </a:xfrm>
+        <a:custGeom>
+          <a:avLst/>
+          <a:gdLst/>
+          <a:ahLst/>
+          <a:cxnLst/>
+          <a:rect l="0" t="0" r="0" b="0"/>
+          <a:pathLst>
+            <a:path>
+              <a:moveTo>
+                <a:pt x="0" y="0"/>
+              </a:moveTo>
+              <a:lnTo>
+                <a:pt x="0" y="1396810"/>
+              </a:lnTo>
+              <a:lnTo>
+                <a:pt x="2073792" y="1396810"/>
+              </a:lnTo>
+              <a:lnTo>
+                <a:pt x="2073792" y="1576767"/>
+              </a:lnTo>
+            </a:path>
+          </a:pathLst>
+        </a:custGeom>
+        <a:noFill/>
+        <a:ln w="9525" cap="flat" cmpd="sng" algn="ctr">
+          <a:solidFill>
+            <a:schemeClr val="accent1">
+              <a:shade val="60000"/>
+              <a:hueOff val="0"/>
+              <a:satOff val="0"/>
+              <a:lumOff val="0"/>
+              <a:alphaOff val="0"/>
+            </a:schemeClr>
+          </a:solidFill>
+          <a:prstDash val="solid"/>
+        </a:ln>
+        <a:effectLst/>
+      </dsp:spPr>
+      <dsp:style>
+        <a:lnRef idx="1">
+          <a:scrgbClr r="0" g="0" b="0"/>
+        </a:lnRef>
+        <a:fillRef idx="0">
+          <a:scrgbClr r="0" g="0" b="0"/>
+        </a:fillRef>
+        <a:effectRef idx="0">
+          <a:scrgbClr r="0" g="0" b="0"/>
+        </a:effectRef>
+        <a:fontRef idx="minor"/>
+      </dsp:style>
+    </dsp:sp>
+    <dsp:sp modelId="{78958DEB-F014-4244-9F57-C93DFD0C6983}">
+      <dsp:nvSpPr>
+        <dsp:cNvPr id="0" name=""/>
+        <dsp:cNvSpPr/>
+      </dsp:nvSpPr>
+      <dsp:spPr>
+        <a:xfrm>
+          <a:off x="2933144" y="1022187"/>
+          <a:ext cx="179957" cy="1576767"/>
+        </a:xfrm>
+        <a:custGeom>
+          <a:avLst/>
+          <a:gdLst/>
+          <a:ahLst/>
+          <a:cxnLst/>
+          <a:rect l="0" t="0" r="0" b="0"/>
+          <a:pathLst>
+            <a:path>
+              <a:moveTo>
+                <a:pt x="179957" y="0"/>
+              </a:moveTo>
+              <a:lnTo>
+                <a:pt x="179957" y="1396810"/>
+              </a:lnTo>
+              <a:lnTo>
+                <a:pt x="0" y="1396810"/>
+              </a:lnTo>
+              <a:lnTo>
+                <a:pt x="0" y="1576767"/>
+              </a:lnTo>
+            </a:path>
+          </a:pathLst>
+        </a:custGeom>
+        <a:noFill/>
+        <a:ln w="9525" cap="flat" cmpd="sng" algn="ctr">
+          <a:solidFill>
+            <a:schemeClr val="accent1">
+              <a:shade val="60000"/>
+              <a:hueOff val="0"/>
+              <a:satOff val="0"/>
+              <a:lumOff val="0"/>
+              <a:alphaOff val="0"/>
+            </a:schemeClr>
+          </a:solidFill>
+          <a:prstDash val="solid"/>
+        </a:ln>
+        <a:effectLst/>
+      </dsp:spPr>
+      <dsp:style>
+        <a:lnRef idx="1">
+          <a:scrgbClr r="0" g="0" b="0"/>
+        </a:lnRef>
+        <a:fillRef idx="0">
+          <a:scrgbClr r="0" g="0" b="0"/>
+        </a:fillRef>
+        <a:effectRef idx="0">
+          <a:scrgbClr r="0" g="0" b="0"/>
+        </a:effectRef>
+        <a:fontRef idx="minor"/>
+      </dsp:style>
+    </dsp:sp>
+    <dsp:sp modelId="{8D185E37-8DCA-364C-AB66-B2A89E254564}">
+      <dsp:nvSpPr>
+        <dsp:cNvPr id="0" name=""/>
+        <dsp:cNvSpPr/>
+      </dsp:nvSpPr>
+      <dsp:spPr>
+        <a:xfrm>
+          <a:off x="859352" y="1022187"/>
+          <a:ext cx="2253749" cy="1576767"/>
+        </a:xfrm>
+        <a:custGeom>
+          <a:avLst/>
+          <a:gdLst/>
+          <a:ahLst/>
+          <a:cxnLst/>
+          <a:rect l="0" t="0" r="0" b="0"/>
+          <a:pathLst>
+            <a:path>
+              <a:moveTo>
+                <a:pt x="2253749" y="0"/>
+              </a:moveTo>
+              <a:lnTo>
+                <a:pt x="2253749" y="1396810"/>
+              </a:lnTo>
+              <a:lnTo>
+                <a:pt x="0" y="1396810"/>
+              </a:lnTo>
+              <a:lnTo>
+                <a:pt x="0" y="1576767"/>
+              </a:lnTo>
+            </a:path>
+          </a:pathLst>
+        </a:custGeom>
+        <a:noFill/>
+        <a:ln w="9525" cap="flat" cmpd="sng" algn="ctr">
+          <a:solidFill>
+            <a:schemeClr val="accent1">
+              <a:shade val="60000"/>
+              <a:hueOff val="0"/>
+              <a:satOff val="0"/>
+              <a:lumOff val="0"/>
+              <a:alphaOff val="0"/>
+            </a:schemeClr>
+          </a:solidFill>
+          <a:prstDash val="solid"/>
+        </a:ln>
+        <a:effectLst/>
+      </dsp:spPr>
+      <dsp:style>
+        <a:lnRef idx="1">
+          <a:scrgbClr r="0" g="0" b="0"/>
+        </a:lnRef>
+        <a:fillRef idx="0">
+          <a:scrgbClr r="0" g="0" b="0"/>
+        </a:fillRef>
+        <a:effectRef idx="0">
+          <a:scrgbClr r="0" g="0" b="0"/>
+        </a:effectRef>
+        <a:fontRef idx="minor"/>
+      </dsp:style>
+    </dsp:sp>
+    <dsp:sp modelId="{BCF50F19-E1D6-944F-A305-3A1881F3F899}">
+      <dsp:nvSpPr>
+        <dsp:cNvPr id="0" name=""/>
+        <dsp:cNvSpPr/>
+      </dsp:nvSpPr>
+      <dsp:spPr>
+        <a:xfrm>
+          <a:off x="2256162" y="165248"/>
+          <a:ext cx="1713878" cy="856939"/>
+        </a:xfrm>
+        <a:prstGeom prst="rect">
+          <a:avLst/>
+        </a:prstGeom>
+        <a:gradFill rotWithShape="0">
+          <a:gsLst>
+            <a:gs pos="0">
+              <a:schemeClr val="accent1">
+                <a:hueOff val="0"/>
+                <a:satOff val="0"/>
+                <a:lumOff val="0"/>
+                <a:alphaOff val="0"/>
+              </a:schemeClr>
+            </a:gs>
+            <a:gs pos="100000">
+              <a:schemeClr val="accent1">
+                <a:hueOff val="0"/>
+                <a:satOff val="0"/>
+                <a:lumOff val="0"/>
+                <a:alphaOff val="0"/>
+                <a:shade val="76000"/>
+                <a:lumMod val="90000"/>
+              </a:schemeClr>
+            </a:gs>
+          </a:gsLst>
+          <a:lin ang="5400000" scaled="0"/>
+        </a:gradFill>
+        <a:ln>
+          <a:noFill/>
+        </a:ln>
+        <a:effectLst>
+          <a:outerShdw blurRad="38100" dist="38100" dir="4800000" sx="98000" sy="98000" rotWithShape="0">
+            <a:srgbClr val="000000">
+              <a:alpha val="32000"/>
+            </a:srgbClr>
+          </a:outerShdw>
+        </a:effectLst>
+      </dsp:spPr>
+      <dsp:style>
+        <a:lnRef idx="0">
+          <a:scrgbClr r="0" g="0" b="0"/>
+        </a:lnRef>
+        <a:fillRef idx="3">
+          <a:scrgbClr r="0" g="0" b="0"/>
+        </a:fillRef>
+        <a:effectRef idx="2">
+          <a:scrgbClr r="0" g="0" b="0"/>
+        </a:effectRef>
+        <a:fontRef idx="minor">
+          <a:schemeClr val="lt1"/>
+        </a:fontRef>
+      </dsp:style>
+      <dsp:txBody>
+        <a:bodyPr spcFirstLastPara="0" vert="horz" wrap="square" lIns="17780" tIns="17780" rIns="17780" bIns="17780" numCol="1" spcCol="1270" anchor="ctr" anchorCtr="0">
+          <a:noAutofit/>
+        </a:bodyPr>
+        <a:lstStyle/>
+        <a:p>
+          <a:pPr lvl="0" algn="ctr" defTabSz="1244600">
+            <a:lnSpc>
+              <a:spcPct val="90000"/>
+            </a:lnSpc>
+            <a:spcBef>
+              <a:spcPct val="0"/>
+            </a:spcBef>
+            <a:spcAft>
+              <a:spcPct val="35000"/>
+            </a:spcAft>
+          </a:pPr>
+          <a:r>
+            <a:rPr lang="en-US" sz="2800" kern="1200" dirty="0" smtClean="0"/>
+            <a:t>Homepage</a:t>
+          </a:r>
+          <a:endParaRPr lang="en-US" sz="2800" kern="1200" dirty="0"/>
+        </a:p>
+      </dsp:txBody>
+      <dsp:txXfrm>
+        <a:off x="2256162" y="165248"/>
+        <a:ext cx="1713878" cy="856939"/>
+      </dsp:txXfrm>
+    </dsp:sp>
+    <dsp:sp modelId="{A6998BF2-0C7C-5E47-8FAD-A5F74D1A43B7}">
+      <dsp:nvSpPr>
+        <dsp:cNvPr id="0" name=""/>
+        <dsp:cNvSpPr/>
+      </dsp:nvSpPr>
+      <dsp:spPr>
+        <a:xfrm>
+          <a:off x="2413" y="2598955"/>
+          <a:ext cx="1713878" cy="856939"/>
+        </a:xfrm>
+        <a:prstGeom prst="rect">
+          <a:avLst/>
+        </a:prstGeom>
+        <a:gradFill rotWithShape="0">
+          <a:gsLst>
+            <a:gs pos="0">
+              <a:schemeClr val="accent1">
+                <a:hueOff val="0"/>
+                <a:satOff val="0"/>
+                <a:lumOff val="0"/>
+                <a:alphaOff val="0"/>
+              </a:schemeClr>
+            </a:gs>
+            <a:gs pos="100000">
+              <a:schemeClr val="accent1">
+                <a:hueOff val="0"/>
+                <a:satOff val="0"/>
+                <a:lumOff val="0"/>
+                <a:alphaOff val="0"/>
+                <a:shade val="76000"/>
+                <a:lumMod val="90000"/>
+              </a:schemeClr>
+            </a:gs>
+          </a:gsLst>
+          <a:lin ang="5400000" scaled="0"/>
+        </a:gradFill>
+        <a:ln>
+          <a:noFill/>
+        </a:ln>
+        <a:effectLst>
+          <a:outerShdw blurRad="38100" dist="38100" dir="4800000" sx="98000" sy="98000" rotWithShape="0">
+            <a:srgbClr val="000000">
+              <a:alpha val="32000"/>
+            </a:srgbClr>
+          </a:outerShdw>
+        </a:effectLst>
+      </dsp:spPr>
+      <dsp:style>
+        <a:lnRef idx="0">
+          <a:scrgbClr r="0" g="0" b="0"/>
+        </a:lnRef>
+        <a:fillRef idx="3">
+          <a:scrgbClr r="0" g="0" b="0"/>
+        </a:fillRef>
+        <a:effectRef idx="2">
+          <a:scrgbClr r="0" g="0" b="0"/>
+        </a:effectRef>
+        <a:fontRef idx="minor">
+          <a:schemeClr val="lt1"/>
+        </a:fontRef>
+      </dsp:style>
+      <dsp:txBody>
+        <a:bodyPr spcFirstLastPara="0" vert="horz" wrap="square" lIns="17780" tIns="17780" rIns="17780" bIns="17780" numCol="1" spcCol="1270" anchor="ctr" anchorCtr="0">
+          <a:noAutofit/>
+        </a:bodyPr>
+        <a:lstStyle/>
+        <a:p>
+          <a:pPr lvl="0" algn="ctr" defTabSz="1244600">
+            <a:lnSpc>
+              <a:spcPct val="90000"/>
+            </a:lnSpc>
+            <a:spcBef>
+              <a:spcPct val="0"/>
+            </a:spcBef>
+            <a:spcAft>
+              <a:spcPct val="35000"/>
+            </a:spcAft>
+          </a:pPr>
+          <a:r>
+            <a:rPr lang="en-US" sz="2800" kern="1200" dirty="0" smtClean="0"/>
+            <a:t>Child 1</a:t>
+          </a:r>
+          <a:endParaRPr lang="en-US" sz="2800" kern="1200" dirty="0"/>
+        </a:p>
+      </dsp:txBody>
+      <dsp:txXfrm>
+        <a:off x="2413" y="2598955"/>
+        <a:ext cx="1713878" cy="856939"/>
+      </dsp:txXfrm>
+    </dsp:sp>
+    <dsp:sp modelId="{1F6827FC-FA5C-C948-B5D8-A87E0C3058B3}">
+      <dsp:nvSpPr>
+        <dsp:cNvPr id="0" name=""/>
+        <dsp:cNvSpPr/>
+      </dsp:nvSpPr>
+      <dsp:spPr>
+        <a:xfrm>
+          <a:off x="2076205" y="2598955"/>
+          <a:ext cx="1713878" cy="856939"/>
+        </a:xfrm>
+        <a:prstGeom prst="rect">
+          <a:avLst/>
+        </a:prstGeom>
+        <a:gradFill rotWithShape="0">
+          <a:gsLst>
+            <a:gs pos="0">
+              <a:schemeClr val="accent1">
+                <a:hueOff val="0"/>
+                <a:satOff val="0"/>
+                <a:lumOff val="0"/>
+                <a:alphaOff val="0"/>
+              </a:schemeClr>
+            </a:gs>
+            <a:gs pos="100000">
+              <a:schemeClr val="accent1">
+                <a:hueOff val="0"/>
+                <a:satOff val="0"/>
+                <a:lumOff val="0"/>
+                <a:alphaOff val="0"/>
+                <a:shade val="76000"/>
+                <a:lumMod val="90000"/>
+              </a:schemeClr>
+            </a:gs>
+          </a:gsLst>
+          <a:lin ang="5400000" scaled="0"/>
+        </a:gradFill>
+        <a:ln>
+          <a:noFill/>
+        </a:ln>
+        <a:effectLst>
+          <a:outerShdw blurRad="38100" dist="38100" dir="4800000" sx="98000" sy="98000" rotWithShape="0">
+            <a:srgbClr val="000000">
+              <a:alpha val="32000"/>
+            </a:srgbClr>
+          </a:outerShdw>
+        </a:effectLst>
+      </dsp:spPr>
+      <dsp:style>
+        <a:lnRef idx="0">
+          <a:scrgbClr r="0" g="0" b="0"/>
+        </a:lnRef>
+        <a:fillRef idx="3">
+          <a:scrgbClr r="0" g="0" b="0"/>
+        </a:fillRef>
+        <a:effectRef idx="2">
+          <a:scrgbClr r="0" g="0" b="0"/>
+        </a:effectRef>
+        <a:fontRef idx="minor">
+          <a:schemeClr val="lt1"/>
+        </a:fontRef>
+      </dsp:style>
+      <dsp:txBody>
+        <a:bodyPr spcFirstLastPara="0" vert="horz" wrap="square" lIns="17780" tIns="17780" rIns="17780" bIns="17780" numCol="1" spcCol="1270" anchor="ctr" anchorCtr="0">
+          <a:noAutofit/>
+        </a:bodyPr>
+        <a:lstStyle/>
+        <a:p>
+          <a:pPr lvl="0" algn="ctr" defTabSz="1244600">
+            <a:lnSpc>
+              <a:spcPct val="90000"/>
+            </a:lnSpc>
+            <a:spcBef>
+              <a:spcPct val="0"/>
+            </a:spcBef>
+            <a:spcAft>
+              <a:spcPct val="35000"/>
+            </a:spcAft>
+          </a:pPr>
+          <a:r>
+            <a:rPr lang="en-US" sz="2800" kern="1200" dirty="0" smtClean="0"/>
+            <a:t>Child 2</a:t>
+          </a:r>
+          <a:endParaRPr lang="en-US" sz="2800" kern="1200" dirty="0"/>
+        </a:p>
+      </dsp:txBody>
+      <dsp:txXfrm>
+        <a:off x="2076205" y="2598955"/>
+        <a:ext cx="1713878" cy="856939"/>
+      </dsp:txXfrm>
+    </dsp:sp>
+    <dsp:sp modelId="{6B9D1F3C-082B-9D40-935D-2EEE06F9AB53}">
+      <dsp:nvSpPr>
+        <dsp:cNvPr id="0" name=""/>
+        <dsp:cNvSpPr/>
+      </dsp:nvSpPr>
+      <dsp:spPr>
+        <a:xfrm>
+          <a:off x="4149998" y="2598955"/>
+          <a:ext cx="2073792" cy="856939"/>
+        </a:xfrm>
+        <a:prstGeom prst="rect">
+          <a:avLst/>
+        </a:prstGeom>
+        <a:gradFill rotWithShape="0">
+          <a:gsLst>
+            <a:gs pos="0">
+              <a:schemeClr val="accent1">
+                <a:hueOff val="0"/>
+                <a:satOff val="0"/>
+                <a:lumOff val="0"/>
+                <a:alphaOff val="0"/>
+              </a:schemeClr>
+            </a:gs>
+            <a:gs pos="100000">
+              <a:schemeClr val="accent1">
+                <a:hueOff val="0"/>
+                <a:satOff val="0"/>
+                <a:lumOff val="0"/>
+                <a:alphaOff val="0"/>
+                <a:shade val="76000"/>
+                <a:lumMod val="90000"/>
+              </a:schemeClr>
+            </a:gs>
+          </a:gsLst>
+          <a:lin ang="5400000" scaled="0"/>
+        </a:gradFill>
+        <a:ln>
+          <a:noFill/>
+        </a:ln>
+        <a:effectLst>
+          <a:outerShdw blurRad="38100" dist="38100" dir="4800000" sx="98000" sy="98000" rotWithShape="0">
+            <a:srgbClr val="000000">
+              <a:alpha val="32000"/>
+            </a:srgbClr>
+          </a:outerShdw>
+        </a:effectLst>
+      </dsp:spPr>
+      <dsp:style>
+        <a:lnRef idx="0">
+          <a:scrgbClr r="0" g="0" b="0"/>
+        </a:lnRef>
+        <a:fillRef idx="3">
+          <a:scrgbClr r="0" g="0" b="0"/>
+        </a:fillRef>
+        <a:effectRef idx="2">
+          <a:scrgbClr r="0" g="0" b="0"/>
+        </a:effectRef>
+        <a:fontRef idx="minor">
+          <a:schemeClr val="lt1"/>
+        </a:fontRef>
+      </dsp:style>
+      <dsp:txBody>
+        <a:bodyPr spcFirstLastPara="0" vert="horz" wrap="square" lIns="17780" tIns="17780" rIns="17780" bIns="17780" numCol="1" spcCol="1270" anchor="ctr" anchorCtr="0">
+          <a:noAutofit/>
+        </a:bodyPr>
+        <a:lstStyle/>
+        <a:p>
+          <a:pPr lvl="0" algn="ctr" defTabSz="1244600">
+            <a:lnSpc>
+              <a:spcPct val="90000"/>
+            </a:lnSpc>
+            <a:spcBef>
+              <a:spcPct val="0"/>
+            </a:spcBef>
+            <a:spcAft>
+              <a:spcPct val="35000"/>
+            </a:spcAft>
+          </a:pPr>
+          <a:r>
+            <a:rPr lang="en-US" sz="2800" kern="1200" dirty="0" smtClean="0"/>
+            <a:t>Child 3</a:t>
+          </a:r>
+          <a:endParaRPr lang="en-US" sz="2800" kern="1200" dirty="0"/>
+        </a:p>
+      </dsp:txBody>
+      <dsp:txXfrm>
+        <a:off x="4149998" y="2598955"/>
+        <a:ext cx="2073792" cy="856939"/>
+      </dsp:txXfrm>
+    </dsp:sp>
+    <dsp:sp modelId="{4E2303F9-ACF3-FD4C-9843-B67245D94037}">
+      <dsp:nvSpPr>
+        <dsp:cNvPr id="0" name=""/>
+        <dsp:cNvSpPr/>
+      </dsp:nvSpPr>
+      <dsp:spPr>
+        <a:xfrm>
+          <a:off x="2361789" y="1309279"/>
+          <a:ext cx="1713878" cy="856939"/>
+        </a:xfrm>
+        <a:prstGeom prst="rect">
+          <a:avLst/>
+        </a:prstGeom>
+        <a:gradFill rotWithShape="0">
+          <a:gsLst>
+            <a:gs pos="0">
+              <a:schemeClr val="accent1">
+                <a:hueOff val="0"/>
+                <a:satOff val="0"/>
+                <a:lumOff val="0"/>
+                <a:alphaOff val="0"/>
+              </a:schemeClr>
+            </a:gs>
+            <a:gs pos="100000">
+              <a:schemeClr val="accent1">
+                <a:hueOff val="0"/>
+                <a:satOff val="0"/>
+                <a:lumOff val="0"/>
+                <a:alphaOff val="0"/>
+                <a:shade val="76000"/>
+                <a:lumMod val="90000"/>
+              </a:schemeClr>
+            </a:gs>
+          </a:gsLst>
+          <a:lin ang="5400000" scaled="0"/>
+        </a:gradFill>
+        <a:ln>
+          <a:noFill/>
+        </a:ln>
+        <a:effectLst>
+          <a:outerShdw blurRad="38100" dist="38100" dir="4800000" sx="98000" sy="98000" rotWithShape="0">
+            <a:srgbClr val="000000">
+              <a:alpha val="32000"/>
+            </a:srgbClr>
+          </a:outerShdw>
+        </a:effectLst>
+      </dsp:spPr>
+      <dsp:style>
+        <a:lnRef idx="0">
+          <a:scrgbClr r="0" g="0" b="0"/>
+        </a:lnRef>
+        <a:fillRef idx="3">
+          <a:scrgbClr r="0" g="0" b="0"/>
+        </a:fillRef>
+        <a:effectRef idx="2">
+          <a:scrgbClr r="0" g="0" b="0"/>
+        </a:effectRef>
+        <a:fontRef idx="minor">
+          <a:schemeClr val="lt1"/>
+        </a:fontRef>
+      </dsp:style>
+      <dsp:txBody>
+        <a:bodyPr spcFirstLastPara="0" vert="horz" wrap="square" lIns="17780" tIns="17780" rIns="17780" bIns="17780" numCol="1" spcCol="1270" anchor="ctr" anchorCtr="0">
+          <a:noAutofit/>
+        </a:bodyPr>
+        <a:lstStyle/>
+        <a:p>
+          <a:pPr lvl="0" algn="ctr" defTabSz="1244600">
+            <a:lnSpc>
+              <a:spcPct val="90000"/>
+            </a:lnSpc>
+            <a:spcBef>
+              <a:spcPct val="0"/>
+            </a:spcBef>
+            <a:spcAft>
+              <a:spcPct val="35000"/>
+            </a:spcAft>
+          </a:pPr>
+          <a:r>
+            <a:rPr lang="en-US" sz="2800" kern="1200" dirty="0" smtClean="0"/>
+            <a:t>Our Page</a:t>
+          </a:r>
+          <a:endParaRPr lang="en-US" sz="2800" kern="1200" dirty="0"/>
+        </a:p>
+      </dsp:txBody>
+      <dsp:txXfrm>
+        <a:off x="2361789" y="1309279"/>
+        <a:ext cx="1713878" cy="856939"/>
+      </dsp:txXfrm>
+    </dsp:sp>
   </dsp:spTree>
 </dsp:drawing>
 </file>
@@ -8377,6 +9845,836 @@
       <dsp:cNvGrpSpPr/>
     </dsp:nvGrpSpPr>
     <dsp:grpSpPr/>
+    <dsp:sp modelId="{449C0065-964B-2445-BAD8-1B050D81108E}">
+      <dsp:nvSpPr>
+        <dsp:cNvPr id="0" name=""/>
+        <dsp:cNvSpPr/>
+      </dsp:nvSpPr>
+      <dsp:spPr>
+        <a:xfrm>
+          <a:off x="3120813" y="975652"/>
+          <a:ext cx="1296021" cy="208090"/>
+        </a:xfrm>
+        <a:custGeom>
+          <a:avLst/>
+          <a:gdLst/>
+          <a:ahLst/>
+          <a:cxnLst/>
+          <a:rect l="0" t="0" r="0" b="0"/>
+          <a:pathLst>
+            <a:path>
+              <a:moveTo>
+                <a:pt x="0" y="0"/>
+              </a:moveTo>
+              <a:lnTo>
+                <a:pt x="0" y="208090"/>
+              </a:lnTo>
+              <a:lnTo>
+                <a:pt x="1296021" y="208090"/>
+              </a:lnTo>
+            </a:path>
+          </a:pathLst>
+        </a:custGeom>
+        <a:noFill/>
+        <a:ln w="9525" cap="flat" cmpd="sng" algn="ctr">
+          <a:solidFill>
+            <a:schemeClr val="accent1">
+              <a:shade val="60000"/>
+              <a:hueOff val="0"/>
+              <a:satOff val="0"/>
+              <a:lumOff val="0"/>
+              <a:alphaOff val="0"/>
+            </a:schemeClr>
+          </a:solidFill>
+          <a:prstDash val="solid"/>
+        </a:ln>
+        <a:effectLst/>
+      </dsp:spPr>
+      <dsp:style>
+        <a:lnRef idx="1">
+          <a:scrgbClr r="0" g="0" b="0"/>
+        </a:lnRef>
+        <a:fillRef idx="0">
+          <a:scrgbClr r="0" g="0" b="0"/>
+        </a:fillRef>
+        <a:effectRef idx="0">
+          <a:scrgbClr r="0" g="0" b="0"/>
+        </a:effectRef>
+        <a:fontRef idx="minor"/>
+      </dsp:style>
+    </dsp:sp>
+    <dsp:sp modelId="{0CE327EB-0566-8748-BFA4-085F7A19257C}">
+      <dsp:nvSpPr>
+        <dsp:cNvPr id="0" name=""/>
+        <dsp:cNvSpPr/>
+      </dsp:nvSpPr>
+      <dsp:spPr>
+        <a:xfrm>
+          <a:off x="3120813" y="975652"/>
+          <a:ext cx="898290" cy="782087"/>
+        </a:xfrm>
+        <a:custGeom>
+          <a:avLst/>
+          <a:gdLst/>
+          <a:ahLst/>
+          <a:cxnLst/>
+          <a:rect l="0" t="0" r="0" b="0"/>
+          <a:pathLst>
+            <a:path>
+              <a:moveTo>
+                <a:pt x="0" y="0"/>
+              </a:moveTo>
+              <a:lnTo>
+                <a:pt x="898290" y="782087"/>
+              </a:lnTo>
+            </a:path>
+          </a:pathLst>
+        </a:custGeom>
+        <a:noFill/>
+        <a:ln w="9525" cap="flat" cmpd="sng" algn="ctr">
+          <a:solidFill>
+            <a:schemeClr val="accent1">
+              <a:shade val="60000"/>
+              <a:hueOff val="0"/>
+              <a:satOff val="0"/>
+              <a:lumOff val="0"/>
+              <a:alphaOff val="0"/>
+            </a:schemeClr>
+          </a:solidFill>
+          <a:prstDash val="solid"/>
+        </a:ln>
+        <a:effectLst/>
+      </dsp:spPr>
+      <dsp:style>
+        <a:lnRef idx="1">
+          <a:scrgbClr r="0" g="0" b="0"/>
+        </a:lnRef>
+        <a:fillRef idx="0">
+          <a:scrgbClr r="0" g="0" b="0"/>
+        </a:fillRef>
+        <a:effectRef idx="0">
+          <a:scrgbClr r="0" g="0" b="0"/>
+        </a:effectRef>
+        <a:fontRef idx="minor"/>
+      </dsp:style>
+    </dsp:sp>
+    <dsp:sp modelId="{7E74B830-BF27-934F-AE86-49257B5A48EB}">
+      <dsp:nvSpPr>
+        <dsp:cNvPr id="0" name=""/>
+        <dsp:cNvSpPr/>
+      </dsp:nvSpPr>
+      <dsp:spPr>
+        <a:xfrm>
+          <a:off x="3120813" y="975652"/>
+          <a:ext cx="2207998" cy="1678808"/>
+        </a:xfrm>
+        <a:custGeom>
+          <a:avLst/>
+          <a:gdLst/>
+          <a:ahLst/>
+          <a:cxnLst/>
+          <a:rect l="0" t="0" r="0" b="0"/>
+          <a:pathLst>
+            <a:path>
+              <a:moveTo>
+                <a:pt x="0" y="0"/>
+              </a:moveTo>
+              <a:lnTo>
+                <a:pt x="0" y="1487205"/>
+              </a:lnTo>
+              <a:lnTo>
+                <a:pt x="2207998" y="1487205"/>
+              </a:lnTo>
+              <a:lnTo>
+                <a:pt x="2207998" y="1678808"/>
+              </a:lnTo>
+            </a:path>
+          </a:pathLst>
+        </a:custGeom>
+        <a:noFill/>
+        <a:ln w="9525" cap="flat" cmpd="sng" algn="ctr">
+          <a:solidFill>
+            <a:schemeClr val="accent1">
+              <a:shade val="60000"/>
+              <a:hueOff val="0"/>
+              <a:satOff val="0"/>
+              <a:lumOff val="0"/>
+              <a:alphaOff val="0"/>
+            </a:schemeClr>
+          </a:solidFill>
+          <a:prstDash val="solid"/>
+        </a:ln>
+        <a:effectLst/>
+      </dsp:spPr>
+      <dsp:style>
+        <a:lnRef idx="1">
+          <a:scrgbClr r="0" g="0" b="0"/>
+        </a:lnRef>
+        <a:fillRef idx="0">
+          <a:scrgbClr r="0" g="0" b="0"/>
+        </a:fillRef>
+        <a:effectRef idx="0">
+          <a:scrgbClr r="0" g="0" b="0"/>
+        </a:effectRef>
+        <a:fontRef idx="minor"/>
+      </dsp:style>
+    </dsp:sp>
+    <dsp:sp modelId="{78958DEB-F014-4244-9F57-C93DFD0C6983}">
+      <dsp:nvSpPr>
+        <dsp:cNvPr id="0" name=""/>
+        <dsp:cNvSpPr/>
+      </dsp:nvSpPr>
+      <dsp:spPr>
+        <a:xfrm>
+          <a:off x="3075093" y="975652"/>
+          <a:ext cx="91440" cy="1678808"/>
+        </a:xfrm>
+        <a:custGeom>
+          <a:avLst/>
+          <a:gdLst/>
+          <a:ahLst/>
+          <a:cxnLst/>
+          <a:rect l="0" t="0" r="0" b="0"/>
+          <a:pathLst>
+            <a:path>
+              <a:moveTo>
+                <a:pt x="45720" y="0"/>
+              </a:moveTo>
+              <a:lnTo>
+                <a:pt x="45720" y="1678808"/>
+              </a:lnTo>
+            </a:path>
+          </a:pathLst>
+        </a:custGeom>
+        <a:noFill/>
+        <a:ln w="9525" cap="flat" cmpd="sng" algn="ctr">
+          <a:solidFill>
+            <a:schemeClr val="accent1">
+              <a:shade val="60000"/>
+              <a:hueOff val="0"/>
+              <a:satOff val="0"/>
+              <a:lumOff val="0"/>
+              <a:alphaOff val="0"/>
+            </a:schemeClr>
+          </a:solidFill>
+          <a:prstDash val="solid"/>
+        </a:ln>
+        <a:effectLst/>
+      </dsp:spPr>
+      <dsp:style>
+        <a:lnRef idx="1">
+          <a:scrgbClr r="0" g="0" b="0"/>
+        </a:lnRef>
+        <a:fillRef idx="0">
+          <a:scrgbClr r="0" g="0" b="0"/>
+        </a:fillRef>
+        <a:effectRef idx="0">
+          <a:scrgbClr r="0" g="0" b="0"/>
+        </a:effectRef>
+        <a:fontRef idx="minor"/>
+      </dsp:style>
+    </dsp:sp>
+    <dsp:sp modelId="{8D185E37-8DCA-364C-AB66-B2A89E254564}">
+      <dsp:nvSpPr>
+        <dsp:cNvPr id="0" name=""/>
+        <dsp:cNvSpPr/>
+      </dsp:nvSpPr>
+      <dsp:spPr>
+        <a:xfrm>
+          <a:off x="912815" y="975652"/>
+          <a:ext cx="2207998" cy="1678808"/>
+        </a:xfrm>
+        <a:custGeom>
+          <a:avLst/>
+          <a:gdLst/>
+          <a:ahLst/>
+          <a:cxnLst/>
+          <a:rect l="0" t="0" r="0" b="0"/>
+          <a:pathLst>
+            <a:path>
+              <a:moveTo>
+                <a:pt x="2207998" y="0"/>
+              </a:moveTo>
+              <a:lnTo>
+                <a:pt x="2207998" y="1487205"/>
+              </a:lnTo>
+              <a:lnTo>
+                <a:pt x="0" y="1487205"/>
+              </a:lnTo>
+              <a:lnTo>
+                <a:pt x="0" y="1678808"/>
+              </a:lnTo>
+            </a:path>
+          </a:pathLst>
+        </a:custGeom>
+        <a:noFill/>
+        <a:ln w="9525" cap="flat" cmpd="sng" algn="ctr">
+          <a:solidFill>
+            <a:schemeClr val="accent1">
+              <a:shade val="60000"/>
+              <a:hueOff val="0"/>
+              <a:satOff val="0"/>
+              <a:lumOff val="0"/>
+              <a:alphaOff val="0"/>
+            </a:schemeClr>
+          </a:solidFill>
+          <a:prstDash val="solid"/>
+        </a:ln>
+        <a:effectLst/>
+      </dsp:spPr>
+      <dsp:style>
+        <a:lnRef idx="1">
+          <a:scrgbClr r="0" g="0" b="0"/>
+        </a:lnRef>
+        <a:fillRef idx="0">
+          <a:scrgbClr r="0" g="0" b="0"/>
+        </a:fillRef>
+        <a:effectRef idx="0">
+          <a:scrgbClr r="0" g="0" b="0"/>
+        </a:effectRef>
+        <a:fontRef idx="minor"/>
+      </dsp:style>
+    </dsp:sp>
+    <dsp:sp modelId="{BCF50F19-E1D6-944F-A305-3A1881F3F899}">
+      <dsp:nvSpPr>
+        <dsp:cNvPr id="0" name=""/>
+        <dsp:cNvSpPr/>
+      </dsp:nvSpPr>
+      <dsp:spPr>
+        <a:xfrm>
+          <a:off x="2208417" y="63256"/>
+          <a:ext cx="1824792" cy="912396"/>
+        </a:xfrm>
+        <a:prstGeom prst="rect">
+          <a:avLst/>
+        </a:prstGeom>
+        <a:gradFill rotWithShape="0">
+          <a:gsLst>
+            <a:gs pos="0">
+              <a:schemeClr val="accent1">
+                <a:hueOff val="0"/>
+                <a:satOff val="0"/>
+                <a:lumOff val="0"/>
+                <a:alphaOff val="0"/>
+              </a:schemeClr>
+            </a:gs>
+            <a:gs pos="100000">
+              <a:schemeClr val="accent1">
+                <a:hueOff val="0"/>
+                <a:satOff val="0"/>
+                <a:lumOff val="0"/>
+                <a:alphaOff val="0"/>
+                <a:shade val="76000"/>
+                <a:lumMod val="90000"/>
+              </a:schemeClr>
+            </a:gs>
+          </a:gsLst>
+          <a:lin ang="5400000" scaled="0"/>
+        </a:gradFill>
+        <a:ln>
+          <a:noFill/>
+        </a:ln>
+        <a:effectLst>
+          <a:outerShdw blurRad="38100" dist="38100" dir="4800000" sx="98000" sy="98000" rotWithShape="0">
+            <a:srgbClr val="000000">
+              <a:alpha val="32000"/>
+            </a:srgbClr>
+          </a:outerShdw>
+        </a:effectLst>
+      </dsp:spPr>
+      <dsp:style>
+        <a:lnRef idx="0">
+          <a:scrgbClr r="0" g="0" b="0"/>
+        </a:lnRef>
+        <a:fillRef idx="3">
+          <a:scrgbClr r="0" g="0" b="0"/>
+        </a:fillRef>
+        <a:effectRef idx="2">
+          <a:scrgbClr r="0" g="0" b="0"/>
+        </a:effectRef>
+        <a:fontRef idx="minor">
+          <a:schemeClr val="lt1"/>
+        </a:fontRef>
+      </dsp:style>
+      <dsp:txBody>
+        <a:bodyPr spcFirstLastPara="0" vert="horz" wrap="square" lIns="19050" tIns="19050" rIns="19050" bIns="19050" numCol="1" spcCol="1270" anchor="ctr" anchorCtr="0">
+          <a:noAutofit/>
+        </a:bodyPr>
+        <a:lstStyle/>
+        <a:p>
+          <a:pPr lvl="0" algn="ctr" defTabSz="1333500">
+            <a:lnSpc>
+              <a:spcPct val="90000"/>
+            </a:lnSpc>
+            <a:spcBef>
+              <a:spcPct val="0"/>
+            </a:spcBef>
+            <a:spcAft>
+              <a:spcPct val="35000"/>
+            </a:spcAft>
+          </a:pPr>
+          <a:r>
+            <a:rPr lang="en-US" sz="3000" kern="1200" dirty="0" smtClean="0"/>
+            <a:t>Homepage</a:t>
+          </a:r>
+          <a:endParaRPr lang="en-US" sz="3000" kern="1200" dirty="0"/>
+        </a:p>
+      </dsp:txBody>
+      <dsp:txXfrm>
+        <a:off x="2208417" y="63256"/>
+        <a:ext cx="1824792" cy="912396"/>
+      </dsp:txXfrm>
+    </dsp:sp>
+    <dsp:sp modelId="{A6998BF2-0C7C-5E47-8FAD-A5F74D1A43B7}">
+      <dsp:nvSpPr>
+        <dsp:cNvPr id="0" name=""/>
+        <dsp:cNvSpPr/>
+      </dsp:nvSpPr>
+      <dsp:spPr>
+        <a:xfrm>
+          <a:off x="419" y="2654460"/>
+          <a:ext cx="1824792" cy="912396"/>
+        </a:xfrm>
+        <a:prstGeom prst="rect">
+          <a:avLst/>
+        </a:prstGeom>
+        <a:gradFill rotWithShape="0">
+          <a:gsLst>
+            <a:gs pos="0">
+              <a:schemeClr val="accent1">
+                <a:hueOff val="0"/>
+                <a:satOff val="0"/>
+                <a:lumOff val="0"/>
+                <a:alphaOff val="0"/>
+              </a:schemeClr>
+            </a:gs>
+            <a:gs pos="100000">
+              <a:schemeClr val="accent1">
+                <a:hueOff val="0"/>
+                <a:satOff val="0"/>
+                <a:lumOff val="0"/>
+                <a:alphaOff val="0"/>
+                <a:shade val="76000"/>
+                <a:lumMod val="90000"/>
+              </a:schemeClr>
+            </a:gs>
+          </a:gsLst>
+          <a:lin ang="5400000" scaled="0"/>
+        </a:gradFill>
+        <a:ln>
+          <a:noFill/>
+        </a:ln>
+        <a:effectLst>
+          <a:outerShdw blurRad="38100" dist="38100" dir="4800000" sx="98000" sy="98000" rotWithShape="0">
+            <a:srgbClr val="000000">
+              <a:alpha val="32000"/>
+            </a:srgbClr>
+          </a:outerShdw>
+        </a:effectLst>
+      </dsp:spPr>
+      <dsp:style>
+        <a:lnRef idx="0">
+          <a:scrgbClr r="0" g="0" b="0"/>
+        </a:lnRef>
+        <a:fillRef idx="3">
+          <a:scrgbClr r="0" g="0" b="0"/>
+        </a:fillRef>
+        <a:effectRef idx="2">
+          <a:scrgbClr r="0" g="0" b="0"/>
+        </a:effectRef>
+        <a:fontRef idx="minor">
+          <a:schemeClr val="lt1"/>
+        </a:fontRef>
+      </dsp:style>
+      <dsp:txBody>
+        <a:bodyPr spcFirstLastPara="0" vert="horz" wrap="square" lIns="19050" tIns="19050" rIns="19050" bIns="19050" numCol="1" spcCol="1270" anchor="ctr" anchorCtr="0">
+          <a:noAutofit/>
+        </a:bodyPr>
+        <a:lstStyle/>
+        <a:p>
+          <a:pPr lvl="0" algn="ctr" defTabSz="1333500">
+            <a:lnSpc>
+              <a:spcPct val="90000"/>
+            </a:lnSpc>
+            <a:spcBef>
+              <a:spcPct val="0"/>
+            </a:spcBef>
+            <a:spcAft>
+              <a:spcPct val="35000"/>
+            </a:spcAft>
+          </a:pPr>
+          <a:r>
+            <a:rPr lang="en-US" sz="3000" kern="1200" dirty="0" smtClean="0"/>
+            <a:t>Child 1</a:t>
+          </a:r>
+          <a:endParaRPr lang="en-US" sz="3000" kern="1200" dirty="0"/>
+        </a:p>
+      </dsp:txBody>
+      <dsp:txXfrm>
+        <a:off x="419" y="2654460"/>
+        <a:ext cx="1824792" cy="912396"/>
+      </dsp:txXfrm>
+    </dsp:sp>
+    <dsp:sp modelId="{1F6827FC-FA5C-C948-B5D8-A87E0C3058B3}">
+      <dsp:nvSpPr>
+        <dsp:cNvPr id="0" name=""/>
+        <dsp:cNvSpPr/>
+      </dsp:nvSpPr>
+      <dsp:spPr>
+        <a:xfrm>
+          <a:off x="2208417" y="2654460"/>
+          <a:ext cx="1824792" cy="912396"/>
+        </a:xfrm>
+        <a:prstGeom prst="rect">
+          <a:avLst/>
+        </a:prstGeom>
+        <a:gradFill rotWithShape="0">
+          <a:gsLst>
+            <a:gs pos="0">
+              <a:schemeClr val="accent1">
+                <a:hueOff val="0"/>
+                <a:satOff val="0"/>
+                <a:lumOff val="0"/>
+                <a:alphaOff val="0"/>
+              </a:schemeClr>
+            </a:gs>
+            <a:gs pos="100000">
+              <a:schemeClr val="accent1">
+                <a:hueOff val="0"/>
+                <a:satOff val="0"/>
+                <a:lumOff val="0"/>
+                <a:alphaOff val="0"/>
+                <a:shade val="76000"/>
+                <a:lumMod val="90000"/>
+              </a:schemeClr>
+            </a:gs>
+          </a:gsLst>
+          <a:lin ang="5400000" scaled="0"/>
+        </a:gradFill>
+        <a:ln>
+          <a:noFill/>
+        </a:ln>
+        <a:effectLst>
+          <a:outerShdw blurRad="38100" dist="38100" dir="4800000" sx="98000" sy="98000" rotWithShape="0">
+            <a:srgbClr val="000000">
+              <a:alpha val="32000"/>
+            </a:srgbClr>
+          </a:outerShdw>
+        </a:effectLst>
+      </dsp:spPr>
+      <dsp:style>
+        <a:lnRef idx="0">
+          <a:scrgbClr r="0" g="0" b="0"/>
+        </a:lnRef>
+        <a:fillRef idx="3">
+          <a:scrgbClr r="0" g="0" b="0"/>
+        </a:fillRef>
+        <a:effectRef idx="2">
+          <a:scrgbClr r="0" g="0" b="0"/>
+        </a:effectRef>
+        <a:fontRef idx="minor">
+          <a:schemeClr val="lt1"/>
+        </a:fontRef>
+      </dsp:style>
+      <dsp:txBody>
+        <a:bodyPr spcFirstLastPara="0" vert="horz" wrap="square" lIns="19050" tIns="19050" rIns="19050" bIns="19050" numCol="1" spcCol="1270" anchor="ctr" anchorCtr="0">
+          <a:noAutofit/>
+        </a:bodyPr>
+        <a:lstStyle/>
+        <a:p>
+          <a:pPr lvl="0" algn="ctr" defTabSz="1333500">
+            <a:lnSpc>
+              <a:spcPct val="90000"/>
+            </a:lnSpc>
+            <a:spcBef>
+              <a:spcPct val="0"/>
+            </a:spcBef>
+            <a:spcAft>
+              <a:spcPct val="35000"/>
+            </a:spcAft>
+          </a:pPr>
+          <a:r>
+            <a:rPr lang="en-US" sz="3000" kern="1200" dirty="0" smtClean="0"/>
+            <a:t>Child 2</a:t>
+          </a:r>
+          <a:endParaRPr lang="en-US" sz="3000" kern="1200" dirty="0"/>
+        </a:p>
+      </dsp:txBody>
+      <dsp:txXfrm>
+        <a:off x="2208417" y="2654460"/>
+        <a:ext cx="1824792" cy="912396"/>
+      </dsp:txXfrm>
+    </dsp:sp>
+    <dsp:sp modelId="{6B9D1F3C-082B-9D40-935D-2EEE06F9AB53}">
+      <dsp:nvSpPr>
+        <dsp:cNvPr id="0" name=""/>
+        <dsp:cNvSpPr/>
+      </dsp:nvSpPr>
+      <dsp:spPr>
+        <a:xfrm>
+          <a:off x="4416415" y="2654460"/>
+          <a:ext cx="1824792" cy="912396"/>
+        </a:xfrm>
+        <a:prstGeom prst="rect">
+          <a:avLst/>
+        </a:prstGeom>
+        <a:gradFill rotWithShape="0">
+          <a:gsLst>
+            <a:gs pos="0">
+              <a:schemeClr val="accent1">
+                <a:hueOff val="0"/>
+                <a:satOff val="0"/>
+                <a:lumOff val="0"/>
+                <a:alphaOff val="0"/>
+              </a:schemeClr>
+            </a:gs>
+            <a:gs pos="100000">
+              <a:schemeClr val="accent1">
+                <a:hueOff val="0"/>
+                <a:satOff val="0"/>
+                <a:lumOff val="0"/>
+                <a:alphaOff val="0"/>
+                <a:shade val="76000"/>
+                <a:lumMod val="90000"/>
+              </a:schemeClr>
+            </a:gs>
+          </a:gsLst>
+          <a:lin ang="5400000" scaled="0"/>
+        </a:gradFill>
+        <a:ln>
+          <a:noFill/>
+        </a:ln>
+        <a:effectLst>
+          <a:outerShdw blurRad="38100" dist="38100" dir="4800000" sx="98000" sy="98000" rotWithShape="0">
+            <a:srgbClr val="000000">
+              <a:alpha val="32000"/>
+            </a:srgbClr>
+          </a:outerShdw>
+        </a:effectLst>
+      </dsp:spPr>
+      <dsp:style>
+        <a:lnRef idx="0">
+          <a:scrgbClr r="0" g="0" b="0"/>
+        </a:lnRef>
+        <a:fillRef idx="3">
+          <a:scrgbClr r="0" g="0" b="0"/>
+        </a:fillRef>
+        <a:effectRef idx="2">
+          <a:scrgbClr r="0" g="0" b="0"/>
+        </a:effectRef>
+        <a:fontRef idx="minor">
+          <a:schemeClr val="lt1"/>
+        </a:fontRef>
+      </dsp:style>
+      <dsp:txBody>
+        <a:bodyPr spcFirstLastPara="0" vert="horz" wrap="square" lIns="19050" tIns="19050" rIns="19050" bIns="19050" numCol="1" spcCol="1270" anchor="ctr" anchorCtr="0">
+          <a:noAutofit/>
+        </a:bodyPr>
+        <a:lstStyle/>
+        <a:p>
+          <a:pPr lvl="0" algn="ctr" defTabSz="1333500">
+            <a:lnSpc>
+              <a:spcPct val="90000"/>
+            </a:lnSpc>
+            <a:spcBef>
+              <a:spcPct val="0"/>
+            </a:spcBef>
+            <a:spcAft>
+              <a:spcPct val="35000"/>
+            </a:spcAft>
+          </a:pPr>
+          <a:r>
+            <a:rPr lang="en-US" sz="3000" kern="1200" dirty="0" smtClean="0"/>
+            <a:t>Child 3</a:t>
+          </a:r>
+          <a:endParaRPr lang="en-US" sz="3000" kern="1200" dirty="0"/>
+        </a:p>
+      </dsp:txBody>
+      <dsp:txXfrm>
+        <a:off x="4416415" y="2654460"/>
+        <a:ext cx="1824792" cy="912396"/>
+      </dsp:txXfrm>
+    </dsp:sp>
+    <dsp:sp modelId="{4E2303F9-ACF3-FD4C-9843-B67245D94037}">
+      <dsp:nvSpPr>
+        <dsp:cNvPr id="0" name=""/>
+        <dsp:cNvSpPr/>
+      </dsp:nvSpPr>
+      <dsp:spPr>
+        <a:xfrm>
+          <a:off x="2194311" y="1301541"/>
+          <a:ext cx="1824792" cy="912396"/>
+        </a:xfrm>
+        <a:prstGeom prst="rect">
+          <a:avLst/>
+        </a:prstGeom>
+        <a:gradFill rotWithShape="0">
+          <a:gsLst>
+            <a:gs pos="0">
+              <a:schemeClr val="accent1">
+                <a:hueOff val="0"/>
+                <a:satOff val="0"/>
+                <a:lumOff val="0"/>
+                <a:alphaOff val="0"/>
+              </a:schemeClr>
+            </a:gs>
+            <a:gs pos="100000">
+              <a:schemeClr val="accent1">
+                <a:hueOff val="0"/>
+                <a:satOff val="0"/>
+                <a:lumOff val="0"/>
+                <a:alphaOff val="0"/>
+                <a:shade val="76000"/>
+                <a:lumMod val="90000"/>
+              </a:schemeClr>
+            </a:gs>
+          </a:gsLst>
+          <a:lin ang="5400000" scaled="0"/>
+        </a:gradFill>
+        <a:ln>
+          <a:noFill/>
+        </a:ln>
+        <a:effectLst>
+          <a:outerShdw blurRad="38100" dist="38100" dir="4800000" sx="98000" sy="98000" rotWithShape="0">
+            <a:srgbClr val="000000">
+              <a:alpha val="32000"/>
+            </a:srgbClr>
+          </a:outerShdw>
+        </a:effectLst>
+      </dsp:spPr>
+      <dsp:style>
+        <a:lnRef idx="0">
+          <a:scrgbClr r="0" g="0" b="0"/>
+        </a:lnRef>
+        <a:fillRef idx="3">
+          <a:scrgbClr r="0" g="0" b="0"/>
+        </a:fillRef>
+        <a:effectRef idx="2">
+          <a:scrgbClr r="0" g="0" b="0"/>
+        </a:effectRef>
+        <a:fontRef idx="minor">
+          <a:schemeClr val="lt1"/>
+        </a:fontRef>
+      </dsp:style>
+      <dsp:txBody>
+        <a:bodyPr spcFirstLastPara="0" vert="horz" wrap="square" lIns="19050" tIns="19050" rIns="19050" bIns="19050" numCol="1" spcCol="1270" anchor="ctr" anchorCtr="0">
+          <a:noAutofit/>
+        </a:bodyPr>
+        <a:lstStyle/>
+        <a:p>
+          <a:pPr lvl="0" algn="ctr" defTabSz="1333500">
+            <a:lnSpc>
+              <a:spcPct val="90000"/>
+            </a:lnSpc>
+            <a:spcBef>
+              <a:spcPct val="0"/>
+            </a:spcBef>
+            <a:spcAft>
+              <a:spcPct val="35000"/>
+            </a:spcAft>
+          </a:pPr>
+          <a:r>
+            <a:rPr lang="en-US" sz="3000" kern="1200" dirty="0" smtClean="0"/>
+            <a:t>Our Page</a:t>
+          </a:r>
+          <a:endParaRPr lang="en-US" sz="3000" kern="1200" dirty="0"/>
+        </a:p>
+      </dsp:txBody>
+      <dsp:txXfrm>
+        <a:off x="2194311" y="1301541"/>
+        <a:ext cx="1824792" cy="912396"/>
+      </dsp:txXfrm>
+    </dsp:sp>
+    <dsp:sp modelId="{2933DB08-27E9-C746-B6A8-538B198985C7}">
+      <dsp:nvSpPr>
+        <dsp:cNvPr id="0" name=""/>
+        <dsp:cNvSpPr/>
+      </dsp:nvSpPr>
+      <dsp:spPr>
+        <a:xfrm>
+          <a:off x="4416834" y="727544"/>
+          <a:ext cx="1824792" cy="912396"/>
+        </a:xfrm>
+        <a:prstGeom prst="rect">
+          <a:avLst/>
+        </a:prstGeom>
+        <a:gradFill rotWithShape="0">
+          <a:gsLst>
+            <a:gs pos="0">
+              <a:schemeClr val="accent1">
+                <a:hueOff val="0"/>
+                <a:satOff val="0"/>
+                <a:lumOff val="0"/>
+                <a:alphaOff val="0"/>
+              </a:schemeClr>
+            </a:gs>
+            <a:gs pos="100000">
+              <a:schemeClr val="accent1">
+                <a:hueOff val="0"/>
+                <a:satOff val="0"/>
+                <a:lumOff val="0"/>
+                <a:alphaOff val="0"/>
+                <a:shade val="76000"/>
+                <a:lumMod val="90000"/>
+              </a:schemeClr>
+            </a:gs>
+          </a:gsLst>
+          <a:lin ang="5400000" scaled="0"/>
+        </a:gradFill>
+        <a:ln>
+          <a:noFill/>
+        </a:ln>
+        <a:effectLst>
+          <a:outerShdw blurRad="38100" dist="38100" dir="4800000" sx="98000" sy="98000" rotWithShape="0">
+            <a:srgbClr val="000000">
+              <a:alpha val="32000"/>
+            </a:srgbClr>
+          </a:outerShdw>
+        </a:effectLst>
+      </dsp:spPr>
+      <dsp:style>
+        <a:lnRef idx="0">
+          <a:scrgbClr r="0" g="0" b="0"/>
+        </a:lnRef>
+        <a:fillRef idx="3">
+          <a:scrgbClr r="0" g="0" b="0"/>
+        </a:fillRef>
+        <a:effectRef idx="2">
+          <a:scrgbClr r="0" g="0" b="0"/>
+        </a:effectRef>
+        <a:fontRef idx="minor">
+          <a:schemeClr val="lt1"/>
+        </a:fontRef>
+      </dsp:style>
+      <dsp:txBody>
+        <a:bodyPr spcFirstLastPara="0" vert="horz" wrap="square" lIns="19050" tIns="19050" rIns="19050" bIns="19050" numCol="1" spcCol="1270" anchor="ctr" anchorCtr="0">
+          <a:noAutofit/>
+        </a:bodyPr>
+        <a:lstStyle/>
+        <a:p>
+          <a:pPr lvl="0" algn="ctr" defTabSz="1333500">
+            <a:lnSpc>
+              <a:spcPct val="90000"/>
+            </a:lnSpc>
+            <a:spcBef>
+              <a:spcPct val="0"/>
+            </a:spcBef>
+            <a:spcAft>
+              <a:spcPct val="35000"/>
+            </a:spcAft>
+          </a:pPr>
+          <a:r>
+            <a:rPr lang="en-US" sz="3000" kern="1200" dirty="0" smtClean="0"/>
+            <a:t>Your Page</a:t>
+          </a:r>
+          <a:endParaRPr lang="en-US" sz="3000" kern="1200" dirty="0"/>
+        </a:p>
+      </dsp:txBody>
+      <dsp:txXfrm>
+        <a:off x="4416834" y="727544"/>
+        <a:ext cx="1824792" cy="912396"/>
+      </dsp:txXfrm>
+    </dsp:sp>
   </dsp:spTree>
 </dsp:drawing>
 </file>
@@ -27078,6 +29376,13 @@
   <p:clrMapOvr>
     <a:masterClrMapping/>
   </p:clrMapOvr>
+  <p:timing>
+    <p:tnLst>
+      <p:par>
+        <p:cTn xmlns:p14="http://schemas.microsoft.com/office/powerpoint/2010/main" id="1" dur="indefinite" restart="never" nodeType="tmRoot"/>
+      </p:par>
+    </p:tnLst>
+  </p:timing>
 </p:sld>
 </file>
 
@@ -30811,18 +33116,25 @@
               <a:t> width="450</a:t>
             </a:r>
             <a:r>
+              <a:rPr lang="en-US" sz="3200" dirty="0" smtClean="0">
+                <a:latin typeface="Courier New"/>
+                <a:cs typeface="Courier New"/>
+              </a:rPr>
+              <a:t>" alt="University of Sioux Falls: A Christian Liberal Arts University" title</a:t>
+            </a:r>
+            <a:r>
               <a:rPr lang="en-US" sz="3200" dirty="0">
                 <a:latin typeface="Courier New"/>
                 <a:cs typeface="Courier New"/>
               </a:rPr>
-              <a:t>"</a:t>
+              <a:t>="University of Sioux Falls" </a:t>
             </a:r>
             <a:r>
               <a:rPr lang="en-US" sz="3200" dirty="0" smtClean="0">
                 <a:latin typeface="Courier New"/>
                 <a:cs typeface="Courier New"/>
               </a:rPr>
-              <a:t> /&gt;</a:t>
+              <a:t>/&gt;</a:t>
             </a:r>
           </a:p>
           <a:p>
@@ -31089,6 +33401,13 @@
   <p:clrMapOvr>
     <a:masterClrMapping/>
   </p:clrMapOvr>
+  <p:timing>
+    <p:tnLst>
+      <p:par>
+        <p:cTn xmlns:p14="http://schemas.microsoft.com/office/powerpoint/2010/main" id="1" dur="indefinite" restart="never" nodeType="tmRoot"/>
+      </p:par>
+    </p:tnLst>
+  </p:timing>
 </p:sld>
 </file>
 
@@ -31224,6 +33543,13 @@
   <p:clrMapOvr>
     <a:masterClrMapping/>
   </p:clrMapOvr>
+  <p:timing>
+    <p:tnLst>
+      <p:par>
+        <p:cTn xmlns:p14="http://schemas.microsoft.com/office/powerpoint/2010/main" id="1" dur="indefinite" restart="never" nodeType="tmRoot"/>
+      </p:par>
+    </p:tnLst>
+  </p:timing>
 </p:sld>
 </file>
 
@@ -31414,7 +33740,12 @@
             <p:ph idx="1"/>
           </p:nvPr>
         </p:nvSpPr>
-        <p:spPr/>
+        <p:spPr>
+          <a:xfrm>
+            <a:off x="1463040" y="2119257"/>
+            <a:ext cx="6196405" cy="3603812"/>
+          </a:xfrm>
+        </p:spPr>
         <p:txBody>
           <a:bodyPr>
             <a:normAutofit fontScale="62500" lnSpcReduction="20000"/>
@@ -31572,7 +33903,7 @@
                 <a:latin typeface="Courier New"/>
                 <a:cs typeface="Courier New"/>
               </a:rPr>
-              <a:t>span&lt;</a:t>
+              <a:t>span&gt;&lt;</a:t>
             </a:r>
             <a:r>
               <a:rPr lang="en-US" sz="3200" dirty="0">
@@ -31871,6 +34202,13 @@
   <p:clrMapOvr>
     <a:masterClrMapping/>
   </p:clrMapOvr>
+  <p:timing>
+    <p:tnLst>
+      <p:par>
+        <p:cTn xmlns:p14="http://schemas.microsoft.com/office/powerpoint/2010/main" id="1" dur="indefinite" restart="never" nodeType="tmRoot"/>
+      </p:par>
+    </p:tnLst>
+  </p:timing>
 </p:sld>
 </file>
 
@@ -33343,7 +35681,7 @@
             <p:ph idx="1"/>
             <p:extLst>
               <p:ext uri="{D42A27DB-BD31-4B8C-83A1-F6EECF244321}">
-                <p14:modId xmlns:p14="http://schemas.microsoft.com/office/powerpoint/2010/main" val="3637869718"/>
+                <p14:modId xmlns:p14="http://schemas.microsoft.com/office/powerpoint/2010/main" val="969788399"/>
               </p:ext>
             </p:extLst>
           </p:nvPr>
@@ -33366,8 +35704,8 @@
         </p:nvSpPr>
         <p:spPr>
           <a:xfrm>
-            <a:off x="2775113" y="1456267"/>
-            <a:ext cx="3596996" cy="369332"/>
+            <a:off x="2570601" y="1456267"/>
+            <a:ext cx="4006024" cy="369332"/>
           </a:xfrm>
           <a:prstGeom prst="rect">
             <a:avLst/>
@@ -33391,7 +35729,23 @@
             </a:r>
             <a:r>
               <a:rPr lang="en-US" dirty="0" smtClean="0"/>
-              <a:t>="child1/"&gt;</a:t>
+              <a:t>=</a:t>
+            </a:r>
+            <a:r>
+              <a:rPr lang="en-US" dirty="0" smtClean="0"/>
+              <a:t>"../</a:t>
+            </a:r>
+            <a:r>
+              <a:rPr lang="en-US" dirty="0" err="1" smtClean="0"/>
+              <a:t>yourpage</a:t>
+            </a:r>
+            <a:r>
+              <a:rPr lang="en-US" dirty="0" smtClean="0"/>
+              <a:t>/</a:t>
+            </a:r>
+            <a:r>
+              <a:rPr lang="en-US" dirty="0" smtClean="0"/>
+              <a:t>"&gt;</a:t>
             </a:r>
             <a:r>
               <a:rPr lang="en-US" dirty="0"/>
@@ -34463,6 +36817,13 @@
   <p:clrMapOvr>
     <a:masterClrMapping/>
   </p:clrMapOvr>
+  <p:timing>
+    <p:tnLst>
+      <p:par>
+        <p:cTn xmlns:p14="http://schemas.microsoft.com/office/powerpoint/2010/main" id="1" dur="indefinite" restart="never" nodeType="tmRoot"/>
+      </p:par>
+    </p:tnLst>
+  </p:timing>
 </p:sld>
 </file>
 
@@ -34557,6 +36918,13 @@
   <p:clrMapOvr>
     <a:masterClrMapping/>
   </p:clrMapOvr>
+  <p:timing>
+    <p:tnLst>
+      <p:par>
+        <p:cTn xmlns:p14="http://schemas.microsoft.com/office/powerpoint/2010/main" id="1" dur="indefinite" restart="never" nodeType="tmRoot"/>
+      </p:par>
+    </p:tnLst>
+  </p:timing>
 </p:sld>
 </file>
 
@@ -34683,6 +37051,13 @@
   <p:clrMapOvr>
     <a:masterClrMapping/>
   </p:clrMapOvr>
+  <p:timing>
+    <p:tnLst>
+      <p:par>
+        <p:cTn xmlns:p14="http://schemas.microsoft.com/office/powerpoint/2010/main" id="1" dur="indefinite" restart="never" nodeType="tmRoot"/>
+      </p:par>
+    </p:tnLst>
+  </p:timing>
 </p:sld>
 </file>
 
@@ -34783,6 +37158,13 @@
   <p:clrMapOvr>
     <a:masterClrMapping/>
   </p:clrMapOvr>
+  <p:timing>
+    <p:tnLst>
+      <p:par>
+        <p:cTn xmlns:p14="http://schemas.microsoft.com/office/powerpoint/2010/main" id="1" dur="indefinite" restart="never" nodeType="tmRoot"/>
+      </p:par>
+    </p:tnLst>
+  </p:timing>
 </p:sld>
 </file>
 
@@ -35312,13 +37694,13 @@
               <a:t>http://www.hulu.com</a:t>
             </a:r>
             <a:r>
-              <a:rPr lang="en-US" smtClean="0">
+              <a:rPr lang="en-US" dirty="0" smtClean="0">
                 <a:hlinkClick r:id="rId7"/>
               </a:rPr>
               <a:t>/</a:t>
             </a:r>
             <a:r>
-              <a:rPr lang="en-US" smtClean="0"/>
+              <a:rPr lang="en-US" dirty="0" smtClean="0"/>
               <a:t> </a:t>
             </a:r>
             <a:endParaRPr lang="en-US" dirty="0" smtClean="0"/>
@@ -35553,6 +37935,13 @@
   <p:clrMapOvr>
     <a:masterClrMapping/>
   </p:clrMapOvr>
+  <p:timing>
+    <p:tnLst>
+      <p:par>
+        <p:cTn xmlns:p14="http://schemas.microsoft.com/office/powerpoint/2010/main" id="1" dur="indefinite" restart="never" nodeType="tmRoot"/>
+      </p:par>
+    </p:tnLst>
+  </p:timing>
 </p:sld>
 </file>
 
@@ -35787,6 +38176,13 @@
   <p:clrMapOvr>
     <a:masterClrMapping/>
   </p:clrMapOvr>
+  <p:timing>
+    <p:tnLst>
+      <p:par>
+        <p:cTn xmlns:p14="http://schemas.microsoft.com/office/powerpoint/2010/main" id="1" dur="indefinite" restart="never" nodeType="tmRoot"/>
+      </p:par>
+    </p:tnLst>
+  </p:timing>
 </p:sld>
 </file>
 
@@ -35884,6 +38280,13 @@
   <p:clrMapOvr>
     <a:masterClrMapping/>
   </p:clrMapOvr>
+  <p:timing>
+    <p:tnLst>
+      <p:par>
+        <p:cTn xmlns:p14="http://schemas.microsoft.com/office/powerpoint/2010/main" id="1" dur="indefinite" restart="never" nodeType="tmRoot"/>
+      </p:par>
+    </p:tnLst>
+  </p:timing>
 </p:sld>
 </file>
 

</xml_diff>